<commit_message>
ERRATA parag numeration Design document+presentati
</commit_message>
<xml_diff>
--- a/All/final presentation/Final presentation.pptx
+++ b/All/final presentation/Final presentation.pptx
@@ -19,6 +19,12 @@
     <p:sldId id="267" r:id="rId13"/>
     <p:sldId id="268" r:id="rId14"/>
     <p:sldId id="269" r:id="rId15"/>
+    <p:sldId id="271" r:id="rId16"/>
+    <p:sldId id="272" r:id="rId17"/>
+    <p:sldId id="273" r:id="rId18"/>
+    <p:sldId id="274" r:id="rId19"/>
+    <p:sldId id="275" r:id="rId20"/>
+    <p:sldId id="276" r:id="rId21"/>
   </p:sldIdLst>
   <p:sldSz cx="12192000" cy="6858000"/>
   <p:notesSz cx="6858000" cy="9144000"/>
@@ -257,7 +263,7 @@
             <a:fld id="{5923F103-BC34-4FE4-A40E-EDDEECFDA5D0}" type="datetimeFigureOut">
               <a:rPr lang="en-US" smtClean="0"/>
               <a:pPr/>
-              <a:t>2/4/16</a:t>
+              <a:t>2/5/2016</a:t>
             </a:fld>
             <a:endParaRPr lang="en-US" dirty="0"/>
           </a:p>
@@ -305,7 +311,7 @@
             <a:fld id="{D57F1E4F-1CFF-5643-939E-217C01CDF565}" type="slidenum">
               <a:rPr lang="en-US" smtClean="0"/>
               <a:pPr/>
-              <a:t>‹n.›</a:t>
+              <a:t>‹N›</a:t>
             </a:fld>
             <a:endParaRPr lang="en-US" dirty="0"/>
           </a:p>
@@ -433,7 +439,7 @@
           <a:p>
             <a:fld id="{53086D93-FCAC-47E0-A2EE-787E62CA814C}" type="datetimeFigureOut">
               <a:rPr lang="en-US" smtClean="0"/>
-              <a:t>2/4/16</a:t>
+              <a:t>2/5/2016</a:t>
             </a:fld>
             <a:endParaRPr lang="en-US" dirty="0"/>
           </a:p>
@@ -481,7 +487,7 @@
             <a:fld id="{D57F1E4F-1CFF-5643-939E-217C01CDF565}" type="slidenum">
               <a:rPr lang="en-US" smtClean="0"/>
               <a:pPr/>
-              <a:t>‹n.›</a:t>
+              <a:t>‹N›</a:t>
             </a:fld>
             <a:endParaRPr lang="en-US" dirty="0"/>
           </a:p>
@@ -619,7 +625,7 @@
           <a:p>
             <a:fld id="{CDA879A6-0FD0-4734-A311-86BFCA472E6E}" type="datetimeFigureOut">
               <a:rPr lang="en-US" smtClean="0"/>
-              <a:t>2/4/16</a:t>
+              <a:t>2/5/2016</a:t>
             </a:fld>
             <a:endParaRPr lang="en-US" dirty="0"/>
           </a:p>
@@ -667,7 +673,7 @@
             <a:fld id="{D57F1E4F-1CFF-5643-939E-217C01CDF565}" type="slidenum">
               <a:rPr lang="en-US" smtClean="0"/>
               <a:pPr/>
-              <a:t>‹n.›</a:t>
+              <a:t>‹N›</a:t>
             </a:fld>
             <a:endParaRPr lang="en-US" dirty="0"/>
           </a:p>
@@ -795,7 +801,7 @@
           <a:p>
             <a:fld id="{19C9CA7B-DFD4-44B5-8C60-D14B8CD1FB59}" type="datetimeFigureOut">
               <a:rPr lang="en-US" smtClean="0"/>
-              <a:t>2/4/16</a:t>
+              <a:t>2/5/2016</a:t>
             </a:fld>
             <a:endParaRPr lang="en-US" dirty="0"/>
           </a:p>
@@ -843,7 +849,7 @@
             <a:fld id="{D57F1E4F-1CFF-5643-939E-217C01CDF565}" type="slidenum">
               <a:rPr lang="en-US" smtClean="0"/>
               <a:pPr/>
-              <a:t>‹n.›</a:t>
+              <a:t>‹N›</a:t>
             </a:fld>
             <a:endParaRPr lang="en-US" dirty="0"/>
           </a:p>
@@ -1047,7 +1053,7 @@
           <a:p>
             <a:fld id="{F34E6425-0181-43F2-84FC-787E803FD2F8}" type="datetimeFigureOut">
               <a:rPr lang="en-US" smtClean="0"/>
-              <a:t>2/4/16</a:t>
+              <a:t>2/5/2016</a:t>
             </a:fld>
             <a:endParaRPr lang="en-US" dirty="0"/>
           </a:p>
@@ -1095,7 +1101,7 @@
             <a:fld id="{D57F1E4F-1CFF-5643-939E-217C01CDF565}" type="slidenum">
               <a:rPr lang="en-US" smtClean="0"/>
               <a:pPr/>
-              <a:t>‹n.›</a:t>
+              <a:t>‹N›</a:t>
             </a:fld>
             <a:endParaRPr lang="en-US" dirty="0"/>
           </a:p>
@@ -1285,7 +1291,7 @@
           <a:p>
             <a:fld id="{3BDB8791-F1B0-41E7-B7FD-A781E65C4266}" type="datetimeFigureOut">
               <a:rPr lang="en-US" smtClean="0"/>
-              <a:t>2/4/16</a:t>
+              <a:t>2/5/2016</a:t>
             </a:fld>
             <a:endParaRPr lang="en-US" dirty="0"/>
           </a:p>
@@ -1333,7 +1339,7 @@
             <a:fld id="{D57F1E4F-1CFF-5643-939E-217C01CDF565}" type="slidenum">
               <a:rPr lang="en-US" smtClean="0"/>
               <a:pPr/>
-              <a:t>‹n.›</a:t>
+              <a:t>‹N›</a:t>
             </a:fld>
             <a:endParaRPr lang="en-US" dirty="0"/>
           </a:p>
@@ -1658,7 +1664,7 @@
           <a:p>
             <a:fld id="{5FDD63B2-E120-4ED8-B27B-C685F510A5FE}" type="datetimeFigureOut">
               <a:rPr lang="en-US" smtClean="0"/>
-              <a:t>2/4/16</a:t>
+              <a:t>2/5/2016</a:t>
             </a:fld>
             <a:endParaRPr lang="en-US" dirty="0"/>
           </a:p>
@@ -1706,7 +1712,7 @@
             <a:fld id="{D57F1E4F-1CFF-5643-939E-217C01CDF565}" type="slidenum">
               <a:rPr lang="en-US" smtClean="0"/>
               <a:pPr/>
-              <a:t>‹n.›</a:t>
+              <a:t>‹N›</a:t>
             </a:fld>
             <a:endParaRPr lang="en-US" dirty="0"/>
           </a:p>
@@ -1782,7 +1788,7 @@
           <a:p>
             <a:fld id="{7AA18ACC-A947-437B-A130-35BD54FDF1E9}" type="datetimeFigureOut">
               <a:rPr lang="en-US" smtClean="0"/>
-              <a:t>2/4/16</a:t>
+              <a:t>2/5/2016</a:t>
             </a:fld>
             <a:endParaRPr lang="en-US" dirty="0"/>
           </a:p>
@@ -1830,7 +1836,7 @@
             <a:fld id="{D57F1E4F-1CFF-5643-939E-217C01CDF565}" type="slidenum">
               <a:rPr lang="en-US" smtClean="0"/>
               <a:pPr/>
-              <a:t>‹n.›</a:t>
+              <a:t>‹N›</a:t>
             </a:fld>
             <a:endParaRPr lang="en-US" dirty="0"/>
           </a:p>
@@ -1883,7 +1889,7 @@
           <a:p>
             <a:fld id="{7C8D7E02-BCB8-4D50-A234-369438C08659}" type="datetimeFigureOut">
               <a:rPr lang="en-US" smtClean="0"/>
-              <a:t>2/4/16</a:t>
+              <a:t>2/5/2016</a:t>
             </a:fld>
             <a:endParaRPr lang="en-US" dirty="0"/>
           </a:p>
@@ -1931,7 +1937,7 @@
             <a:fld id="{D57F1E4F-1CFF-5643-939E-217C01CDF565}" type="slidenum">
               <a:rPr lang="en-US" smtClean="0"/>
               <a:pPr/>
-              <a:t>‹n.›</a:t>
+              <a:t>‹N›</a:t>
             </a:fld>
             <a:endParaRPr lang="en-US" dirty="0"/>
           </a:p>
@@ -2166,7 +2172,7 @@
           <a:p>
             <a:fld id="{76E86A4C-8E40-4F87-A4F0-01A0687C5742}" type="datetimeFigureOut">
               <a:rPr lang="en-US" smtClean="0"/>
-              <a:t>2/4/16</a:t>
+              <a:t>2/5/2016</a:t>
             </a:fld>
             <a:endParaRPr lang="en-US" dirty="0"/>
           </a:p>
@@ -2214,7 +2220,7 @@
             <a:fld id="{D57F1E4F-1CFF-5643-939E-217C01CDF565}" type="slidenum">
               <a:rPr lang="en-US" smtClean="0"/>
               <a:pPr/>
-              <a:t>‹n.›</a:t>
+              <a:t>‹N›</a:t>
             </a:fld>
             <a:endParaRPr lang="en-US" dirty="0"/>
           </a:p>
@@ -2425,7 +2431,7 @@
           <a:p>
             <a:fld id="{35E72C73-2D91-4E12-BA25-F0AA0C03599B}" type="datetimeFigureOut">
               <a:rPr lang="en-US" smtClean="0"/>
-              <a:t>2/4/16</a:t>
+              <a:t>2/5/2016</a:t>
             </a:fld>
             <a:endParaRPr lang="en-US" dirty="0"/>
           </a:p>
@@ -2473,7 +2479,7 @@
             <a:fld id="{D57F1E4F-1CFF-5643-939E-217C01CDF565}" type="slidenum">
               <a:rPr lang="en-US" smtClean="0"/>
               <a:pPr/>
-              <a:t>‹n.›</a:t>
+              <a:t>‹N›</a:t>
             </a:fld>
             <a:endParaRPr lang="en-US" dirty="0"/>
           </a:p>
@@ -2667,7 +2673,7 @@
           <a:p>
             <a:fld id="{2BE451C3-0FF4-47C4-B829-773ADF60F88C}" type="datetimeFigureOut">
               <a:rPr lang="en-US" smtClean="0"/>
-              <a:t>2/4/16</a:t>
+              <a:t>2/5/2016</a:t>
             </a:fld>
             <a:endParaRPr lang="en-US" dirty="0"/>
           </a:p>
@@ -2751,7 +2757,7 @@
             <a:fld id="{D57F1E4F-1CFF-5643-939E-217C01CDF565}" type="slidenum">
               <a:rPr lang="en-US" smtClean="0"/>
               <a:pPr/>
-              <a:t>‹n.›</a:t>
+              <a:t>‹N›</a:t>
             </a:fld>
             <a:endParaRPr lang="en-US" dirty="0"/>
           </a:p>
@@ -3150,7 +3156,7 @@
                 <a:effectLst>
                   <a:reflection blurRad="101600" stA="28000" endPos="35500" dist="12700" dir="5400000" sy="-90000" algn="bl" rotWithShape="0"/>
                 </a:effectLst>
-                <a:latin typeface="+mn-lt"/>
+                <a:latin typeface="Century Gothic" panose="020B0502020202020204" pitchFamily="34" charset="0"/>
               </a:rPr>
               <a:t>My Taxi Service</a:t>
             </a:r>
@@ -3177,7 +3183,7 @@
               <a:effectLst>
                 <a:reflection blurRad="101600" stA="28000" endPos="35500" dist="12700" dir="5400000" sy="-90000" algn="bl" rotWithShape="0"/>
               </a:effectLst>
-              <a:latin typeface="+mn-lt"/>
+              <a:latin typeface="Century Gothic" panose="020B0502020202020204" pitchFamily="34" charset="0"/>
             </a:endParaRPr>
           </a:p>
         </p:txBody>
@@ -3205,7 +3211,7 @@
           <a:lstStyle/>
           <a:p>
             <a:r>
-              <a:rPr lang="en-GB" sz="3200" dirty="0" smtClean="0">
+              <a:rPr lang="en-GB" sz="3600" dirty="0" smtClean="0">
                 <a:ln w="0">
                   <a:solidFill>
                     <a:schemeClr val="tx1">
@@ -3227,7 +3233,7 @@
               <a:t>Project of Software </a:t>
             </a:r>
             <a:r>
-              <a:rPr lang="en-GB" sz="3200" dirty="0">
+              <a:rPr lang="en-GB" sz="3600" dirty="0">
                 <a:ln w="0">
                   <a:solidFill>
                     <a:schemeClr val="tx1">
@@ -3249,7 +3255,7 @@
               <a:t>E</a:t>
             </a:r>
             <a:r>
-              <a:rPr lang="en-GB" sz="3200" dirty="0" smtClean="0">
+              <a:rPr lang="en-GB" sz="3600" dirty="0" smtClean="0">
                 <a:ln w="0">
                   <a:solidFill>
                     <a:schemeClr val="tx1">
@@ -3305,7 +3311,7 @@
         <p:spPr>
           <a:xfrm>
             <a:off x="4996544" y="3904570"/>
-            <a:ext cx="6059588" cy="1821183"/>
+            <a:ext cx="6453928" cy="1821183"/>
           </a:xfrm>
           <a:prstGeom prst="rect">
             <a:avLst/>
@@ -3313,7 +3319,7 @@
         </p:spPr>
         <p:txBody>
           <a:bodyPr vert="horz" lIns="91440" tIns="45720" rIns="91440" bIns="45720" rtlCol="0">
-            <a:normAutofit/>
+            <a:normAutofit fontScale="92500"/>
           </a:bodyPr>
           <a:lstStyle>
             <a:lvl1pPr marL="0" indent="0" algn="ctr" defTabSz="914400" rtl="0" eaLnBrk="1" latinLnBrk="0" hangingPunct="1">
@@ -3482,7 +3488,7 @@
           <a:p>
             <a:pPr algn="l"/>
             <a:r>
-              <a:rPr lang="en-GB" sz="2800" dirty="0" smtClean="0">
+              <a:rPr lang="en-GB" sz="3200" dirty="0" smtClean="0">
                 <a:ln w="0">
                   <a:solidFill>
                     <a:schemeClr val="tx1">
@@ -3510,7 +3516,7 @@
               <a:buChar char="•"/>
             </a:pPr>
             <a:r>
-              <a:rPr lang="en-GB" sz="2800" dirty="0" smtClean="0">
+              <a:rPr lang="en-GB" sz="3200" dirty="0" smtClean="0">
                 <a:ln w="0">
                   <a:solidFill>
                     <a:schemeClr val="tx1">
@@ -3532,7 +3538,7 @@
               <a:t>Giuseppe </a:t>
             </a:r>
             <a:r>
-              <a:rPr lang="en-GB" sz="2800" dirty="0" err="1" smtClean="0">
+              <a:rPr lang="en-GB" sz="3200" dirty="0" err="1" smtClean="0">
                 <a:ln w="0">
                   <a:solidFill>
                     <a:schemeClr val="tx1">
@@ -3554,7 +3560,7 @@
               <a:t>Manzi</a:t>
             </a:r>
             <a:r>
-              <a:rPr lang="en-GB" sz="2800" dirty="0" smtClean="0">
+              <a:rPr lang="en-GB" sz="3200" dirty="0" smtClean="0">
                 <a:ln w="0">
                   <a:solidFill>
                     <a:schemeClr val="tx1">
@@ -3582,7 +3588,7 @@
               <a:buChar char="•"/>
             </a:pPr>
             <a:r>
-              <a:rPr lang="en-GB" sz="2800" dirty="0" smtClean="0">
+              <a:rPr lang="en-GB" sz="3200" dirty="0" smtClean="0">
                 <a:ln w="0">
                   <a:solidFill>
                     <a:schemeClr val="tx1">
@@ -3604,7 +3610,7 @@
               <a:t>Alessandro </a:t>
             </a:r>
             <a:r>
-              <a:rPr lang="en-GB" sz="2800" dirty="0" err="1" smtClean="0">
+              <a:rPr lang="en-GB" sz="3200" dirty="0" err="1" smtClean="0">
                 <a:ln w="0">
                   <a:solidFill>
                     <a:schemeClr val="tx1">
@@ -3626,7 +3632,7 @@
               <a:t>Nicolini</a:t>
             </a:r>
             <a:r>
-              <a:rPr lang="en-GB" sz="2800" dirty="0" smtClean="0">
+              <a:rPr lang="en-GB" sz="3200" dirty="0" smtClean="0">
                 <a:ln w="0">
                   <a:solidFill>
                     <a:schemeClr val="tx1">
@@ -5835,7 +5841,7 @@
         </p:nvSpPr>
         <p:spPr>
           <a:xfrm>
-            <a:off x="7998903" y="5312893"/>
+            <a:off x="9144000" y="4707610"/>
             <a:ext cx="3079907" cy="1338725"/>
           </a:xfrm>
           <a:prstGeom prst="rect">
@@ -6480,7 +6486,7 @@
         </p:nvSpPr>
         <p:spPr>
           <a:xfrm>
-            <a:off x="950259" y="2121620"/>
+            <a:off x="950259" y="2738032"/>
             <a:ext cx="10291482" cy="4435389"/>
           </a:xfrm>
           <a:prstGeom prst="rect">
@@ -6874,7 +6880,7 @@
         </p:nvSpPr>
         <p:spPr>
           <a:xfrm>
-            <a:off x="1524000" y="89012"/>
+            <a:off x="1524000" y="324577"/>
             <a:ext cx="9144000" cy="1991762"/>
           </a:xfrm>
           <a:prstGeom prst="rect">
@@ -6930,7 +6936,7 @@
                 <a:effectLst>
                   <a:reflection blurRad="101600" stA="28000" endPos="35500" dist="12700" dir="5400000" sy="-90000" algn="bl" rotWithShape="0"/>
                 </a:effectLst>
-                <a:latin typeface="+mn-lt"/>
+                <a:latin typeface="Century Gothic" panose="020B0502020202020204" pitchFamily="34" charset="0"/>
               </a:rPr>
               <a:t>REUIREMENTS</a:t>
             </a:r>
@@ -6938,7 +6944,7 @@
           <a:p>
             <a:pPr algn="ctr"/>
             <a:r>
-              <a:rPr lang="en-GB" sz="7200" b="1" dirty="0">
+              <a:rPr lang="en-GB" sz="5400" b="1" dirty="0">
                 <a:ln w="19050">
                   <a:solidFill>
                     <a:schemeClr val="tx1"/>
@@ -6961,9 +6967,37 @@
                 <a:effectLst>
                   <a:reflection blurRad="101600" stA="28000" endPos="35500" dist="12700" dir="5400000" sy="-90000" algn="bl" rotWithShape="0"/>
                 </a:effectLst>
-                <a:latin typeface="+mn-lt"/>
+                <a:latin typeface="Century Gothic" panose="020B0502020202020204" pitchFamily="34" charset="0"/>
               </a:rPr>
               <a:t>r</a:t>
+            </a:r>
+            <a:r>
+              <a:rPr lang="en-GB" sz="5400" b="1" dirty="0" smtClean="0">
+                <a:ln w="19050">
+                  <a:solidFill>
+                    <a:schemeClr val="tx1"/>
+                  </a:solidFill>
+                </a:ln>
+                <a:gradFill>
+                  <a:gsLst>
+                    <a:gs pos="0">
+                      <a:srgbClr val="A51502"/>
+                    </a:gs>
+                    <a:gs pos="75000">
+                      <a:srgbClr val="FF0000"/>
+                    </a:gs>
+                    <a:gs pos="100000">
+                      <a:srgbClr val="DE918F"/>
+                    </a:gs>
+                  </a:gsLst>
+                  <a:lin ang="5400000"/>
+                </a:gradFill>
+                <a:effectLst>
+                  <a:reflection blurRad="101600" stA="28000" endPos="35500" dist="12700" dir="5400000" sy="-90000" algn="bl" rotWithShape="0"/>
+                </a:effectLst>
+                <a:latin typeface="Century Gothic" panose="020B0502020202020204" pitchFamily="34" charset="0"/>
+              </a:rPr>
+              <a:t>elated to </a:t>
             </a:r>
             <a:r>
               <a:rPr lang="en-GB" sz="7200" b="1" dirty="0" smtClean="0">
@@ -6989,35 +7023,10 @@
                 <a:effectLst>
                   <a:reflection blurRad="101600" stA="28000" endPos="35500" dist="12700" dir="5400000" sy="-90000" algn="bl" rotWithShape="0"/>
                 </a:effectLst>
-                <a:latin typeface="+mn-lt"/>
+                <a:latin typeface="Century Gothic" panose="020B0502020202020204" pitchFamily="34" charset="0"/>
               </a:rPr>
-              <a:t>elated to G2</a:t>
+              <a:t>G2</a:t>
             </a:r>
-            <a:endParaRPr lang="en-GB" sz="7200" b="1" dirty="0" smtClean="0">
-              <a:ln w="19050">
-                <a:solidFill>
-                  <a:schemeClr val="tx1"/>
-                </a:solidFill>
-              </a:ln>
-              <a:gradFill>
-                <a:gsLst>
-                  <a:gs pos="0">
-                    <a:srgbClr val="A51502"/>
-                  </a:gs>
-                  <a:gs pos="75000">
-                    <a:srgbClr val="FF0000"/>
-                  </a:gs>
-                  <a:gs pos="100000">
-                    <a:srgbClr val="DE918F"/>
-                  </a:gs>
-                </a:gsLst>
-                <a:lin ang="5400000"/>
-              </a:gradFill>
-              <a:effectLst>
-                <a:reflection blurRad="101600" stA="28000" endPos="35500" dist="12700" dir="5400000" sy="-90000" algn="bl" rotWithShape="0"/>
-              </a:effectLst>
-              <a:latin typeface="+mn-lt"/>
-            </a:endParaRPr>
           </a:p>
         </p:txBody>
       </p:sp>
@@ -7441,8 +7450,8 @@
         </p:blipFill>
         <p:spPr>
           <a:xfrm>
-            <a:off x="1697421" y="965638"/>
-            <a:ext cx="8797158" cy="5498224"/>
+            <a:off x="1519230" y="867164"/>
+            <a:ext cx="9148770" cy="5892362"/>
           </a:xfrm>
           <a:prstGeom prst="rect">
             <a:avLst/>
@@ -7459,7 +7468,7 @@
         </p:nvSpPr>
         <p:spPr>
           <a:xfrm>
-            <a:off x="1524000" y="-484723"/>
+            <a:off x="1914196" y="-496995"/>
             <a:ext cx="9144000" cy="1991762"/>
           </a:xfrm>
           <a:prstGeom prst="rect">
@@ -7515,35 +7524,10 @@
                 <a:effectLst>
                   <a:reflection blurRad="101600" stA="28000" endPos="35500" dist="12700" dir="5400000" sy="-90000" algn="bl" rotWithShape="0"/>
                 </a:effectLst>
-                <a:latin typeface="+mn-lt"/>
+                <a:latin typeface="Century Gothic" panose="020B0502020202020204" pitchFamily="34" charset="0"/>
               </a:rPr>
               <a:t>USE CASES</a:t>
             </a:r>
-            <a:endParaRPr lang="en-GB" sz="7200" b="1" dirty="0" smtClean="0">
-              <a:ln w="19050">
-                <a:solidFill>
-                  <a:schemeClr val="tx1"/>
-                </a:solidFill>
-              </a:ln>
-              <a:gradFill>
-                <a:gsLst>
-                  <a:gs pos="0">
-                    <a:srgbClr val="A51502"/>
-                  </a:gs>
-                  <a:gs pos="75000">
-                    <a:srgbClr val="FF0000"/>
-                  </a:gs>
-                  <a:gs pos="100000">
-                    <a:srgbClr val="DE918F"/>
-                  </a:gs>
-                </a:gsLst>
-                <a:lin ang="5400000"/>
-              </a:gradFill>
-              <a:effectLst>
-                <a:reflection blurRad="101600" stA="28000" endPos="35500" dist="12700" dir="5400000" sy="-90000" algn="bl" rotWithShape="0"/>
-              </a:effectLst>
-              <a:latin typeface="+mn-lt"/>
-            </a:endParaRPr>
           </a:p>
         </p:txBody>
       </p:sp>
@@ -7799,8 +7783,8 @@
         </p:nvSpPr>
         <p:spPr>
           <a:xfrm>
-            <a:off x="1524000" y="-484723"/>
-            <a:ext cx="9144000" cy="1991762"/>
+            <a:off x="2980151" y="-388396"/>
+            <a:ext cx="6578990" cy="1991762"/>
           </a:xfrm>
           <a:prstGeom prst="rect">
             <a:avLst/>
@@ -7855,9 +7839,9 @@
                 <a:effectLst>
                   <a:reflection blurRad="101600" stA="28000" endPos="35500" dist="12700" dir="5400000" sy="-90000" algn="bl" rotWithShape="0"/>
                 </a:effectLst>
-                <a:latin typeface="+mn-lt"/>
+                <a:latin typeface="Century Gothic" panose="020B0502020202020204" pitchFamily="34" charset="0"/>
               </a:rPr>
-              <a:t>A </a:t>
+              <a:t>USE </a:t>
             </a:r>
             <a:r>
               <a:rPr lang="en-GB" sz="7200" b="1" dirty="0" smtClean="0">
@@ -7883,35 +7867,10 @@
                 <a:effectLst>
                   <a:reflection blurRad="101600" stA="28000" endPos="35500" dist="12700" dir="5400000" sy="-90000" algn="bl" rotWithShape="0"/>
                 </a:effectLst>
-                <a:latin typeface="+mn-lt"/>
+                <a:latin typeface="Century Gothic" panose="020B0502020202020204" pitchFamily="34" charset="0"/>
               </a:rPr>
-              <a:t>USE CASE</a:t>
+              <a:t>CASE</a:t>
             </a:r>
-            <a:endParaRPr lang="en-GB" sz="7200" b="1" dirty="0" smtClean="0">
-              <a:ln w="19050">
-                <a:solidFill>
-                  <a:schemeClr val="tx1"/>
-                </a:solidFill>
-              </a:ln>
-              <a:gradFill>
-                <a:gsLst>
-                  <a:gs pos="0">
-                    <a:srgbClr val="A51502"/>
-                  </a:gs>
-                  <a:gs pos="75000">
-                    <a:srgbClr val="FF0000"/>
-                  </a:gs>
-                  <a:gs pos="100000">
-                    <a:srgbClr val="DE918F"/>
-                  </a:gs>
-                </a:gsLst>
-                <a:lin ang="5400000"/>
-              </a:gradFill>
-              <a:effectLst>
-                <a:reflection blurRad="101600" stA="28000" endPos="35500" dist="12700" dir="5400000" sy="-90000" algn="bl" rotWithShape="0"/>
-              </a:effectLst>
-              <a:latin typeface="+mn-lt"/>
-            </a:endParaRPr>
           </a:p>
         </p:txBody>
       </p:sp>
@@ -7947,7 +7906,7 @@
           </a:ln>
           <a:extLst>
             <a:ext uri="{53640926-AAD7-44d8-BBD7-CCE9431645EC}">
-              <a14:shadowObscured xmlns="" xmlns:wpc="http://schemas.microsoft.com/office/word/2010/wordprocessingCanvas" xmlns:mo="http://schemas.microsoft.com/office/mac/office/2008/main" xmlns:mc="http://schemas.openxmlformats.org/markup-compatibility/2006" xmlns:mv="urn:schemas-microsoft-com:mac:vml" xmlns:o="urn:schemas-microsoft-com:office:office" xmlns:m="http://schemas.openxmlformats.org/officeDocument/2006/math" xmlns:v="urn:schemas-microsoft-com:vml" xmlns:wp14="http://schemas.microsoft.com/office/word/2010/wordprocessingDrawing" xmlns:wp="http://schemas.openxmlformats.org/drawingml/2006/wordprocessingDrawing" xmlns:w10="urn:schemas-microsoft-com:office:word" xmlns:w="http://schemas.openxmlformats.org/wordprocessingml/2006/main" xmlns:w14="http://schemas.microsoft.com/office/word/2010/wordml" xmlns:wpg="http://schemas.microsoft.com/office/word/2010/wordprocessingGroup" xmlns:wpi="http://schemas.microsoft.com/office/word/2010/wordprocessingInk" xmlns:wne="http://schemas.microsoft.com/office/word/2006/wordml" xmlns:wps="http://schemas.microsoft.com/office/word/2010/wordprocessingShape" xmlns:pic="http://schemas.openxmlformats.org/drawingml/2006/picture" xmlns:a14="http://schemas.microsoft.com/office/drawing/2010/main" xmlns:lc="http://schemas.openxmlformats.org/drawingml/2006/lockedCanvas"/>
+              <a14:shadowObscured xmlns:lc="http://schemas.openxmlformats.org/drawingml/2006/lockedCanvas" xmlns:a14="http://schemas.microsoft.com/office/drawing/2010/main" xmlns:pic="http://schemas.openxmlformats.org/drawingml/2006/picture" xmlns:wps="http://schemas.microsoft.com/office/word/2010/wordprocessingShape" xmlns:wne="http://schemas.microsoft.com/office/word/2006/wordml" xmlns:wpi="http://schemas.microsoft.com/office/word/2010/wordprocessingInk" xmlns:wpg="http://schemas.microsoft.com/office/word/2010/wordprocessingGroup" xmlns:w14="http://schemas.microsoft.com/office/word/2010/wordml" xmlns:w="http://schemas.openxmlformats.org/wordprocessingml/2006/main" xmlns:w10="urn:schemas-microsoft-com:office:word" xmlns:wp="http://schemas.openxmlformats.org/drawingml/2006/wordprocessingDrawing" xmlns:wp14="http://schemas.microsoft.com/office/word/2010/wordprocessingDrawing" xmlns:v="urn:schemas-microsoft-com:vml" xmlns:m="http://schemas.openxmlformats.org/officeDocument/2006/math" xmlns:o="urn:schemas-microsoft-com:office:office" xmlns:mv="urn:schemas-microsoft-com:mac:vml" xmlns:mc="http://schemas.openxmlformats.org/markup-compatibility/2006" xmlns:mo="http://schemas.microsoft.com/office/mac/office/2008/main" xmlns:wpc="http://schemas.microsoft.com/office/word/2010/wordprocessingCanvas" xmlns=""/>
             </a:ext>
           </a:extLst>
         </p:spPr>
@@ -7984,7 +7943,7 @@
           </a:ln>
           <a:extLst>
             <a:ext uri="{53640926-AAD7-44d8-BBD7-CCE9431645EC}">
-              <a14:shadowObscured xmlns="" xmlns:wpc="http://schemas.microsoft.com/office/word/2010/wordprocessingCanvas" xmlns:mo="http://schemas.microsoft.com/office/mac/office/2008/main" xmlns:mc="http://schemas.openxmlformats.org/markup-compatibility/2006" xmlns:mv="urn:schemas-microsoft-com:mac:vml" xmlns:o="urn:schemas-microsoft-com:office:office" xmlns:m="http://schemas.openxmlformats.org/officeDocument/2006/math" xmlns:v="urn:schemas-microsoft-com:vml" xmlns:wp14="http://schemas.microsoft.com/office/word/2010/wordprocessingDrawing" xmlns:wp="http://schemas.openxmlformats.org/drawingml/2006/wordprocessingDrawing" xmlns:w10="urn:schemas-microsoft-com:office:word" xmlns:w="http://schemas.openxmlformats.org/wordprocessingml/2006/main" xmlns:w14="http://schemas.microsoft.com/office/word/2010/wordml" xmlns:wpg="http://schemas.microsoft.com/office/word/2010/wordprocessingGroup" xmlns:wpi="http://schemas.microsoft.com/office/word/2010/wordprocessingInk" xmlns:wne="http://schemas.microsoft.com/office/word/2006/wordml" xmlns:wps="http://schemas.microsoft.com/office/word/2010/wordprocessingShape" xmlns:pic="http://schemas.openxmlformats.org/drawingml/2006/picture" xmlns:a14="http://schemas.microsoft.com/office/drawing/2010/main" xmlns:lc="http://schemas.openxmlformats.org/drawingml/2006/lockedCanvas"/>
+              <a14:shadowObscured xmlns:lc="http://schemas.openxmlformats.org/drawingml/2006/lockedCanvas" xmlns:a14="http://schemas.microsoft.com/office/drawing/2010/main" xmlns:pic="http://schemas.openxmlformats.org/drawingml/2006/picture" xmlns:wps="http://schemas.microsoft.com/office/word/2010/wordprocessingShape" xmlns:wne="http://schemas.microsoft.com/office/word/2006/wordml" xmlns:wpi="http://schemas.microsoft.com/office/word/2010/wordprocessingInk" xmlns:wpg="http://schemas.microsoft.com/office/word/2010/wordprocessingGroup" xmlns:w14="http://schemas.microsoft.com/office/word/2010/wordml" xmlns:w="http://schemas.openxmlformats.org/wordprocessingml/2006/main" xmlns:w10="urn:schemas-microsoft-com:office:word" xmlns:wp="http://schemas.openxmlformats.org/drawingml/2006/wordprocessingDrawing" xmlns:wp14="http://schemas.microsoft.com/office/word/2010/wordprocessingDrawing" xmlns:v="urn:schemas-microsoft-com:vml" xmlns:m="http://schemas.openxmlformats.org/officeDocument/2006/math" xmlns:o="urn:schemas-microsoft-com:office:office" xmlns:mv="urn:schemas-microsoft-com:mac:vml" xmlns:mc="http://schemas.openxmlformats.org/markup-compatibility/2006" xmlns:mo="http://schemas.microsoft.com/office/mac/office/2008/main" xmlns:wpc="http://schemas.microsoft.com/office/word/2010/wordprocessingCanvas" xmlns=""/>
             </a:ext>
           </a:extLst>
         </p:spPr>
@@ -8457,31 +8416,6 @@
               </a:rPr>
               <a:t>ALLOY STATE SPACE</a:t>
             </a:r>
-            <a:endParaRPr lang="en-GB" sz="7200" b="1" dirty="0" smtClean="0">
-              <a:ln w="19050">
-                <a:solidFill>
-                  <a:schemeClr val="tx1"/>
-                </a:solidFill>
-              </a:ln>
-              <a:gradFill>
-                <a:gsLst>
-                  <a:gs pos="0">
-                    <a:srgbClr val="A51502"/>
-                  </a:gs>
-                  <a:gs pos="75000">
-                    <a:srgbClr val="FF0000"/>
-                  </a:gs>
-                  <a:gs pos="100000">
-                    <a:srgbClr val="DE918F"/>
-                  </a:gs>
-                </a:gsLst>
-                <a:lin ang="5400000"/>
-              </a:gradFill>
-              <a:effectLst>
-                <a:reflection blurRad="101600" stA="28000" endPos="35500" dist="12700" dir="5400000" sy="-90000" algn="bl" rotWithShape="0"/>
-              </a:effectLst>
-              <a:latin typeface="+mn-lt"/>
-            </a:endParaRPr>
           </a:p>
         </p:txBody>
       </p:sp>
@@ -8505,8 +8439,8 @@
         </p:blipFill>
         <p:spPr>
           <a:xfrm>
-            <a:off x="486303" y="994604"/>
-            <a:ext cx="11219395" cy="5595382"/>
+            <a:off x="450167" y="867994"/>
+            <a:ext cx="11354006" cy="5870431"/>
           </a:xfrm>
           <a:prstGeom prst="rect">
             <a:avLst/>
@@ -8711,6 +8645,907 @@
 </p:sld>
 </file>
 
+<file path=ppt/slides/slide15.xml><?xml version="1.0" encoding="utf-8"?>
+<p:sld xmlns:a="http://schemas.openxmlformats.org/drawingml/2006/main" xmlns:r="http://schemas.openxmlformats.org/officeDocument/2006/relationships" xmlns:p="http://schemas.openxmlformats.org/presentationml/2006/main">
+  <p:cSld>
+    <p:spTree>
+      <p:nvGrpSpPr>
+        <p:cNvPr id="1" name=""/>
+        <p:cNvGrpSpPr/>
+        <p:nvPr/>
+      </p:nvGrpSpPr>
+      <p:grpSpPr>
+        <a:xfrm>
+          <a:off x="0" y="0"/>
+          <a:ext cx="0" cy="0"/>
+          <a:chOff x="0" y="0"/>
+          <a:chExt cx="0" cy="0"/>
+        </a:xfrm>
+      </p:grpSpPr>
+      <p:sp>
+        <p:nvSpPr>
+          <p:cNvPr id="2" name="Titolo 1"/>
+          <p:cNvSpPr>
+            <a:spLocks noGrp="1"/>
+          </p:cNvSpPr>
+          <p:nvPr>
+            <p:ph type="title"/>
+          </p:nvPr>
+        </p:nvSpPr>
+        <p:spPr>
+          <a:xfrm>
+            <a:off x="838200" y="2166629"/>
+            <a:ext cx="10515600" cy="1968643"/>
+          </a:xfrm>
+        </p:spPr>
+        <p:txBody>
+          <a:bodyPr>
+            <a:noAutofit/>
+          </a:bodyPr>
+          <a:lstStyle/>
+          <a:p>
+            <a:pPr algn="ctr"/>
+            <a:r>
+              <a:rPr lang="it-IT" sz="7200" b="1" dirty="0" err="1">
+                <a:ln w="19050">
+                  <a:solidFill>
+                    <a:schemeClr val="tx1"/>
+                  </a:solidFill>
+                </a:ln>
+                <a:solidFill>
+                  <a:schemeClr val="accent5">
+                    <a:lumMod val="50000"/>
+                  </a:schemeClr>
+                </a:solidFill>
+                <a:effectLst>
+                  <a:reflection blurRad="101600" stA="28000" endPos="35500" dist="12700" dir="5400000" sy="-90000" algn="bl" rotWithShape="0"/>
+                </a:effectLst>
+                <a:latin typeface="Century Gothic" panose="020B0502020202020204" pitchFamily="34" charset="0"/>
+              </a:rPr>
+              <a:t>Assignment</a:t>
+            </a:r>
+            <a:r>
+              <a:rPr lang="it-IT" sz="7200" b="1" dirty="0">
+                <a:ln w="19050">
+                  <a:solidFill>
+                    <a:schemeClr val="tx1"/>
+                  </a:solidFill>
+                </a:ln>
+                <a:solidFill>
+                  <a:schemeClr val="accent5">
+                    <a:lumMod val="50000"/>
+                  </a:schemeClr>
+                </a:solidFill>
+                <a:effectLst>
+                  <a:reflection blurRad="101600" stA="28000" endPos="35500" dist="12700" dir="5400000" sy="-90000" algn="bl" rotWithShape="0"/>
+                </a:effectLst>
+                <a:latin typeface="Century Gothic" panose="020B0502020202020204" pitchFamily="34" charset="0"/>
+              </a:rPr>
+              <a:t> 2:</a:t>
+            </a:r>
+            <a:br>
+              <a:rPr lang="it-IT" sz="7200" b="1" dirty="0">
+                <a:ln w="19050">
+                  <a:solidFill>
+                    <a:schemeClr val="tx1"/>
+                  </a:solidFill>
+                </a:ln>
+                <a:solidFill>
+                  <a:schemeClr val="accent5">
+                    <a:lumMod val="50000"/>
+                  </a:schemeClr>
+                </a:solidFill>
+                <a:effectLst>
+                  <a:reflection blurRad="101600" stA="28000" endPos="35500" dist="12700" dir="5400000" sy="-90000" algn="bl" rotWithShape="0"/>
+                </a:effectLst>
+                <a:latin typeface="Century Gothic" panose="020B0502020202020204" pitchFamily="34" charset="0"/>
+              </a:rPr>
+            </a:br>
+            <a:r>
+              <a:rPr lang="it-IT" sz="7200" b="1" dirty="0">
+                <a:ln w="19050">
+                  <a:solidFill>
+                    <a:schemeClr val="tx1"/>
+                  </a:solidFill>
+                </a:ln>
+                <a:solidFill>
+                  <a:schemeClr val="accent5">
+                    <a:lumMod val="50000"/>
+                  </a:schemeClr>
+                </a:solidFill>
+                <a:effectLst>
+                  <a:reflection blurRad="101600" stA="28000" endPos="35500" dist="12700" dir="5400000" sy="-90000" algn="bl" rotWithShape="0"/>
+                </a:effectLst>
+                <a:latin typeface="Century Gothic" panose="020B0502020202020204" pitchFamily="34" charset="0"/>
+              </a:rPr>
+              <a:t>Design </a:t>
+            </a:r>
+            <a:r>
+              <a:rPr lang="it-IT" sz="7200" b="1" dirty="0" err="1">
+                <a:ln w="19050">
+                  <a:solidFill>
+                    <a:schemeClr val="tx1"/>
+                  </a:solidFill>
+                </a:ln>
+                <a:solidFill>
+                  <a:schemeClr val="accent5">
+                    <a:lumMod val="50000"/>
+                  </a:schemeClr>
+                </a:solidFill>
+                <a:effectLst>
+                  <a:reflection blurRad="101600" stA="28000" endPos="35500" dist="12700" dir="5400000" sy="-90000" algn="bl" rotWithShape="0"/>
+                </a:effectLst>
+                <a:latin typeface="Century Gothic" panose="020B0502020202020204" pitchFamily="34" charset="0"/>
+              </a:rPr>
+              <a:t>Document</a:t>
+            </a:r>
+            <a:endParaRPr lang="it-IT" sz="7200" b="1" dirty="0">
+              <a:ln w="19050">
+                <a:solidFill>
+                  <a:schemeClr val="tx1"/>
+                </a:solidFill>
+              </a:ln>
+              <a:solidFill>
+                <a:schemeClr val="accent5">
+                  <a:lumMod val="50000"/>
+                </a:schemeClr>
+              </a:solidFill>
+              <a:effectLst>
+                <a:reflection blurRad="101600" stA="28000" endPos="35500" dist="12700" dir="5400000" sy="-90000" algn="bl" rotWithShape="0"/>
+              </a:effectLst>
+              <a:latin typeface="Century Gothic" panose="020B0502020202020204" pitchFamily="34" charset="0"/>
+            </a:endParaRPr>
+          </a:p>
+        </p:txBody>
+      </p:sp>
+    </p:spTree>
+    <p:extLst>
+      <p:ext uri="{BB962C8B-B14F-4D97-AF65-F5344CB8AC3E}">
+        <p14:creationId xmlns:p14="http://schemas.microsoft.com/office/powerpoint/2010/main" val="1973531977"/>
+      </p:ext>
+    </p:extLst>
+  </p:cSld>
+  <p:clrMapOvr>
+    <a:masterClrMapping/>
+  </p:clrMapOvr>
+  <p:timing>
+    <p:tnLst>
+      <p:par>
+        <p:cTn id="1" dur="indefinite" restart="never" nodeType="tmRoot"/>
+      </p:par>
+    </p:tnLst>
+  </p:timing>
+</p:sld>
+</file>
+
+<file path=ppt/slides/slide16.xml><?xml version="1.0" encoding="utf-8"?>
+<p:sld xmlns:a="http://schemas.openxmlformats.org/drawingml/2006/main" xmlns:r="http://schemas.openxmlformats.org/officeDocument/2006/relationships" xmlns:p="http://schemas.openxmlformats.org/presentationml/2006/main">
+  <p:cSld>
+    <p:spTree>
+      <p:nvGrpSpPr>
+        <p:cNvPr id="1" name=""/>
+        <p:cNvGrpSpPr/>
+        <p:nvPr/>
+      </p:nvGrpSpPr>
+      <p:grpSpPr>
+        <a:xfrm>
+          <a:off x="0" y="0"/>
+          <a:ext cx="0" cy="0"/>
+          <a:chOff x="0" y="0"/>
+          <a:chExt cx="0" cy="0"/>
+        </a:xfrm>
+      </p:grpSpPr>
+      <p:sp>
+        <p:nvSpPr>
+          <p:cNvPr id="2" name="Titolo 1"/>
+          <p:cNvSpPr>
+            <a:spLocks noGrp="1"/>
+          </p:cNvSpPr>
+          <p:nvPr>
+            <p:ph type="title"/>
+          </p:nvPr>
+        </p:nvSpPr>
+        <p:spPr/>
+        <p:txBody>
+          <a:bodyPr>
+            <a:normAutofit/>
+          </a:bodyPr>
+          <a:lstStyle/>
+          <a:p>
+            <a:r>
+              <a:rPr lang="it-IT" sz="6000" b="1" dirty="0" smtClean="0">
+                <a:solidFill>
+                  <a:schemeClr val="accent5">
+                    <a:lumMod val="50000"/>
+                  </a:schemeClr>
+                </a:solidFill>
+              </a:rPr>
+              <a:t>2.1</a:t>
+            </a:r>
+            <a:r>
+              <a:rPr lang="it-IT" sz="7200" b="1" dirty="0" smtClean="0">
+                <a:solidFill>
+                  <a:schemeClr val="accent5">
+                    <a:lumMod val="50000"/>
+                  </a:schemeClr>
+                </a:solidFill>
+              </a:rPr>
+              <a:t> </a:t>
+            </a:r>
+            <a:r>
+              <a:rPr lang="en-GB" sz="8000" b="1" dirty="0">
+                <a:solidFill>
+                  <a:schemeClr val="accent5">
+                    <a:lumMod val="50000"/>
+                  </a:schemeClr>
+                </a:solidFill>
+              </a:rPr>
+              <a:t>A</a:t>
+            </a:r>
+            <a:r>
+              <a:rPr lang="en-GB" sz="6000" b="1" dirty="0">
+                <a:solidFill>
+                  <a:schemeClr val="accent5">
+                    <a:lumMod val="50000"/>
+                  </a:schemeClr>
+                </a:solidFill>
+              </a:rPr>
+              <a:t>rchitectural </a:t>
+            </a:r>
+            <a:r>
+              <a:rPr lang="en-GB" sz="8000" b="1" dirty="0" smtClean="0">
+                <a:solidFill>
+                  <a:schemeClr val="accent5">
+                    <a:lumMod val="50000"/>
+                  </a:schemeClr>
+                </a:solidFill>
+              </a:rPr>
+              <a:t>D</a:t>
+            </a:r>
+            <a:r>
+              <a:rPr lang="en-GB" sz="6000" b="1" dirty="0" smtClean="0">
+                <a:solidFill>
+                  <a:schemeClr val="accent5">
+                    <a:lumMod val="50000"/>
+                  </a:schemeClr>
+                </a:solidFill>
+              </a:rPr>
+              <a:t>esign</a:t>
+            </a:r>
+            <a:endParaRPr lang="it-IT" sz="6000" b="1" dirty="0">
+              <a:solidFill>
+                <a:schemeClr val="accent5">
+                  <a:lumMod val="50000"/>
+                </a:schemeClr>
+              </a:solidFill>
+            </a:endParaRPr>
+          </a:p>
+        </p:txBody>
+      </p:sp>
+      <p:sp>
+        <p:nvSpPr>
+          <p:cNvPr id="3" name="Segnaposto contenuto 2"/>
+          <p:cNvSpPr>
+            <a:spLocks noGrp="1"/>
+          </p:cNvSpPr>
+          <p:nvPr>
+            <p:ph idx="1"/>
+          </p:nvPr>
+        </p:nvSpPr>
+        <p:spPr>
+          <a:xfrm>
+            <a:off x="838200" y="2380053"/>
+            <a:ext cx="10515600" cy="4351338"/>
+          </a:xfrm>
+        </p:spPr>
+        <p:txBody>
+          <a:bodyPr/>
+          <a:lstStyle/>
+          <a:p>
+            <a:pPr algn="just"/>
+            <a:r>
+              <a:rPr lang="en-GB" dirty="0" smtClean="0">
+                <a:solidFill>
+                  <a:schemeClr val="accent5">
+                    <a:lumMod val="75000"/>
+                  </a:schemeClr>
+                </a:solidFill>
+              </a:rPr>
+              <a:t>We </a:t>
+            </a:r>
+            <a:r>
+              <a:rPr lang="en-GB" dirty="0">
+                <a:solidFill>
+                  <a:schemeClr val="accent5">
+                    <a:lumMod val="75000"/>
+                  </a:schemeClr>
+                </a:solidFill>
+              </a:rPr>
+              <a:t>will provide an objected oriented design, which is based on entities and on their interaction, consistent with the past object oriented analysis of the RASD.</a:t>
+            </a:r>
+            <a:endParaRPr lang="it-IT" dirty="0">
+              <a:solidFill>
+                <a:schemeClr val="accent5">
+                  <a:lumMod val="75000"/>
+                </a:schemeClr>
+              </a:solidFill>
+            </a:endParaRPr>
+          </a:p>
+          <a:p>
+            <a:pPr marL="0" indent="0" algn="just">
+              <a:buNone/>
+            </a:pPr>
+            <a:endParaRPr lang="it-IT" dirty="0" smtClean="0">
+              <a:solidFill>
+                <a:schemeClr val="accent5">
+                  <a:lumMod val="75000"/>
+                </a:schemeClr>
+              </a:solidFill>
+            </a:endParaRPr>
+          </a:p>
+          <a:p>
+            <a:pPr algn="just"/>
+            <a:r>
+              <a:rPr lang="en-GB" dirty="0">
+                <a:solidFill>
+                  <a:schemeClr val="accent5">
+                    <a:lumMod val="75000"/>
+                  </a:schemeClr>
+                </a:solidFill>
+              </a:rPr>
+              <a:t>We choose the 3-Tier style because of the need to separate the Client from the Server and to store and protect sensible data in a DBMS and for the high system performances that we want to reach.</a:t>
+            </a:r>
+            <a:endParaRPr lang="it-IT" dirty="0">
+              <a:solidFill>
+                <a:schemeClr val="accent5">
+                  <a:lumMod val="75000"/>
+                </a:schemeClr>
+              </a:solidFill>
+            </a:endParaRPr>
+          </a:p>
+          <a:p>
+            <a:pPr marL="0" indent="0">
+              <a:buNone/>
+            </a:pPr>
+            <a:endParaRPr lang="it-IT" dirty="0"/>
+          </a:p>
+        </p:txBody>
+      </p:sp>
+    </p:spTree>
+    <p:extLst>
+      <p:ext uri="{BB962C8B-B14F-4D97-AF65-F5344CB8AC3E}">
+        <p14:creationId xmlns:p14="http://schemas.microsoft.com/office/powerpoint/2010/main" val="1677430312"/>
+      </p:ext>
+    </p:extLst>
+  </p:cSld>
+  <p:clrMapOvr>
+    <a:masterClrMapping/>
+  </p:clrMapOvr>
+  <p:timing>
+    <p:tnLst>
+      <p:par>
+        <p:cTn id="1" dur="indefinite" restart="never" nodeType="tmRoot"/>
+      </p:par>
+    </p:tnLst>
+  </p:timing>
+</p:sld>
+</file>
+
+<file path=ppt/slides/slide17.xml><?xml version="1.0" encoding="utf-8"?>
+<p:sld xmlns:a="http://schemas.openxmlformats.org/drawingml/2006/main" xmlns:r="http://schemas.openxmlformats.org/officeDocument/2006/relationships" xmlns:p="http://schemas.openxmlformats.org/presentationml/2006/main">
+  <p:cSld>
+    <p:spTree>
+      <p:nvGrpSpPr>
+        <p:cNvPr id="1" name=""/>
+        <p:cNvGrpSpPr/>
+        <p:nvPr/>
+      </p:nvGrpSpPr>
+      <p:grpSpPr>
+        <a:xfrm>
+          <a:off x="0" y="0"/>
+          <a:ext cx="0" cy="0"/>
+          <a:chOff x="0" y="0"/>
+          <a:chExt cx="0" cy="0"/>
+        </a:xfrm>
+      </p:grpSpPr>
+      <p:sp>
+        <p:nvSpPr>
+          <p:cNvPr id="2" name="Titolo 1"/>
+          <p:cNvSpPr>
+            <a:spLocks noGrp="1"/>
+          </p:cNvSpPr>
+          <p:nvPr>
+            <p:ph type="title"/>
+          </p:nvPr>
+        </p:nvSpPr>
+        <p:spPr>
+          <a:xfrm>
+            <a:off x="838200" y="-71610"/>
+            <a:ext cx="10515600" cy="1325563"/>
+          </a:xfrm>
+        </p:spPr>
+        <p:txBody>
+          <a:bodyPr>
+            <a:normAutofit/>
+          </a:bodyPr>
+          <a:lstStyle/>
+          <a:p>
+            <a:pPr algn="ctr"/>
+            <a:r>
+              <a:rPr lang="it-IT" sz="7200" b="1" dirty="0">
+                <a:ln w="19050">
+                  <a:solidFill>
+                    <a:schemeClr val="tx1"/>
+                  </a:solidFill>
+                </a:ln>
+                <a:solidFill>
+                  <a:schemeClr val="accent5">
+                    <a:lumMod val="50000"/>
+                  </a:schemeClr>
+                </a:solidFill>
+                <a:effectLst>
+                  <a:reflection blurRad="101600" stA="28000" endPos="35500" dist="12700" dir="5400000" sy="-90000" algn="bl" rotWithShape="0"/>
+                </a:effectLst>
+                <a:latin typeface="Century Gothic" panose="020B0502020202020204" pitchFamily="34" charset="0"/>
+              </a:rPr>
+              <a:t>C</a:t>
+            </a:r>
+            <a:r>
+              <a:rPr lang="it-IT" sz="5400" b="1" dirty="0">
+                <a:ln w="19050">
+                  <a:solidFill>
+                    <a:schemeClr val="tx1"/>
+                  </a:solidFill>
+                </a:ln>
+                <a:solidFill>
+                  <a:schemeClr val="accent5">
+                    <a:lumMod val="50000"/>
+                  </a:schemeClr>
+                </a:solidFill>
+                <a:effectLst>
+                  <a:reflection blurRad="101600" stA="28000" endPos="35500" dist="12700" dir="5400000" sy="-90000" algn="bl" rotWithShape="0"/>
+                </a:effectLst>
+                <a:latin typeface="Century Gothic" panose="020B0502020202020204" pitchFamily="34" charset="0"/>
+              </a:rPr>
+              <a:t>OMPONENT</a:t>
+            </a:r>
+            <a:endParaRPr lang="it-IT" sz="6600" b="1" dirty="0">
+              <a:ln w="19050">
+                <a:solidFill>
+                  <a:schemeClr val="tx1"/>
+                </a:solidFill>
+              </a:ln>
+              <a:solidFill>
+                <a:schemeClr val="accent5">
+                  <a:lumMod val="50000"/>
+                </a:schemeClr>
+              </a:solidFill>
+              <a:effectLst>
+                <a:reflection blurRad="101600" stA="28000" endPos="35500" dist="12700" dir="5400000" sy="-90000" algn="bl" rotWithShape="0"/>
+              </a:effectLst>
+              <a:latin typeface="Century Gothic" panose="020B0502020202020204" pitchFamily="34" charset="0"/>
+            </a:endParaRPr>
+          </a:p>
+        </p:txBody>
+      </p:sp>
+      <p:pic>
+        <p:nvPicPr>
+          <p:cNvPr id="4" name="Segnaposto contenuto 3"/>
+          <p:cNvPicPr>
+            <a:picLocks noGrp="1"/>
+          </p:cNvPicPr>
+          <p:nvPr>
+            <p:ph idx="1"/>
+          </p:nvPr>
+        </p:nvPicPr>
+        <p:blipFill>
+          <a:blip r:embed="rId2">
+            <a:extLst>
+              <a:ext uri="{28A0092B-C50C-407E-A947-70E740481C1C}">
+                <a14:useLocalDpi xmlns:a14="http://schemas.microsoft.com/office/drawing/2010/main" val="0"/>
+              </a:ext>
+            </a:extLst>
+          </a:blip>
+          <a:stretch>
+            <a:fillRect/>
+          </a:stretch>
+        </p:blipFill>
+        <p:spPr>
+          <a:xfrm>
+            <a:off x="0" y="1184250"/>
+            <a:ext cx="12192000" cy="5315023"/>
+          </a:xfrm>
+          <a:prstGeom prst="rect">
+            <a:avLst/>
+          </a:prstGeom>
+        </p:spPr>
+      </p:pic>
+    </p:spTree>
+    <p:extLst>
+      <p:ext uri="{BB962C8B-B14F-4D97-AF65-F5344CB8AC3E}">
+        <p14:creationId xmlns:p14="http://schemas.microsoft.com/office/powerpoint/2010/main" val="2866836873"/>
+      </p:ext>
+    </p:extLst>
+  </p:cSld>
+  <p:clrMapOvr>
+    <a:masterClrMapping/>
+  </p:clrMapOvr>
+  <p:timing>
+    <p:tnLst>
+      <p:par>
+        <p:cTn id="1" dur="indefinite" restart="never" nodeType="tmRoot"/>
+      </p:par>
+    </p:tnLst>
+  </p:timing>
+</p:sld>
+</file>
+
+<file path=ppt/slides/slide18.xml><?xml version="1.0" encoding="utf-8"?>
+<p:sld xmlns:a="http://schemas.openxmlformats.org/drawingml/2006/main" xmlns:r="http://schemas.openxmlformats.org/officeDocument/2006/relationships" xmlns:p="http://schemas.openxmlformats.org/presentationml/2006/main">
+  <p:cSld>
+    <p:spTree>
+      <p:nvGrpSpPr>
+        <p:cNvPr id="1" name=""/>
+        <p:cNvGrpSpPr/>
+        <p:nvPr/>
+      </p:nvGrpSpPr>
+      <p:grpSpPr>
+        <a:xfrm>
+          <a:off x="0" y="0"/>
+          <a:ext cx="0" cy="0"/>
+          <a:chOff x="0" y="0"/>
+          <a:chExt cx="0" cy="0"/>
+        </a:xfrm>
+      </p:grpSpPr>
+      <p:sp>
+        <p:nvSpPr>
+          <p:cNvPr id="4" name="Titolo 1"/>
+          <p:cNvSpPr>
+            <a:spLocks noGrp="1"/>
+          </p:cNvSpPr>
+          <p:nvPr>
+            <p:ph type="title"/>
+          </p:nvPr>
+        </p:nvSpPr>
+        <p:spPr>
+          <a:xfrm>
+            <a:off x="861646" y="10867"/>
+            <a:ext cx="10515600" cy="1114548"/>
+          </a:xfrm>
+        </p:spPr>
+        <p:txBody>
+          <a:bodyPr>
+            <a:normAutofit/>
+          </a:bodyPr>
+          <a:lstStyle/>
+          <a:p>
+            <a:pPr algn="ctr"/>
+            <a:r>
+              <a:rPr lang="it-IT" sz="7200" b="1" dirty="0" smtClean="0">
+                <a:ln w="19050">
+                  <a:solidFill>
+                    <a:schemeClr val="tx1"/>
+                  </a:solidFill>
+                </a:ln>
+                <a:solidFill>
+                  <a:schemeClr val="accent5">
+                    <a:lumMod val="50000"/>
+                  </a:schemeClr>
+                </a:solidFill>
+                <a:effectLst>
+                  <a:reflection blurRad="101600" stA="28000" endPos="35500" dist="12700" dir="5400000" sy="-90000" algn="bl" rotWithShape="0"/>
+                </a:effectLst>
+                <a:latin typeface="Century Gothic" panose="020B0502020202020204" pitchFamily="34" charset="0"/>
+              </a:rPr>
+              <a:t>D</a:t>
+            </a:r>
+            <a:r>
+              <a:rPr lang="it-IT" sz="5400" b="1" dirty="0" smtClean="0">
+                <a:ln w="19050">
+                  <a:solidFill>
+                    <a:schemeClr val="tx1"/>
+                  </a:solidFill>
+                </a:ln>
+                <a:solidFill>
+                  <a:schemeClr val="accent5">
+                    <a:lumMod val="50000"/>
+                  </a:schemeClr>
+                </a:solidFill>
+                <a:effectLst>
+                  <a:reflection blurRad="101600" stA="28000" endPos="35500" dist="12700" dir="5400000" sy="-90000" algn="bl" rotWithShape="0"/>
+                </a:effectLst>
+                <a:latin typeface="Century Gothic" panose="020B0502020202020204" pitchFamily="34" charset="0"/>
+              </a:rPr>
+              <a:t>EPLOYMENT</a:t>
+            </a:r>
+            <a:endParaRPr lang="it-IT" sz="6600" b="1" dirty="0">
+              <a:ln w="19050">
+                <a:solidFill>
+                  <a:schemeClr val="tx1"/>
+                </a:solidFill>
+              </a:ln>
+              <a:solidFill>
+                <a:schemeClr val="accent5">
+                  <a:lumMod val="50000"/>
+                </a:schemeClr>
+              </a:solidFill>
+              <a:effectLst>
+                <a:reflection blurRad="101600" stA="28000" endPos="35500" dist="12700" dir="5400000" sy="-90000" algn="bl" rotWithShape="0"/>
+              </a:effectLst>
+              <a:latin typeface="Century Gothic" panose="020B0502020202020204" pitchFamily="34" charset="0"/>
+            </a:endParaRPr>
+          </a:p>
+        </p:txBody>
+      </p:sp>
+      <p:pic>
+        <p:nvPicPr>
+          <p:cNvPr id="5" name="Segnaposto contenuto 4"/>
+          <p:cNvPicPr>
+            <a:picLocks noGrp="1"/>
+          </p:cNvPicPr>
+          <p:nvPr>
+            <p:ph idx="1"/>
+          </p:nvPr>
+        </p:nvPicPr>
+        <p:blipFill>
+          <a:blip r:embed="rId2">
+            <a:extLst>
+              <a:ext uri="{28A0092B-C50C-407E-A947-70E740481C1C}">
+                <a14:useLocalDpi xmlns:a14="http://schemas.microsoft.com/office/drawing/2010/main" val="0"/>
+              </a:ext>
+            </a:extLst>
+          </a:blip>
+          <a:stretch>
+            <a:fillRect/>
+          </a:stretch>
+        </p:blipFill>
+        <p:spPr>
+          <a:xfrm>
+            <a:off x="323557" y="998806"/>
+            <a:ext cx="11591778" cy="5711483"/>
+          </a:xfrm>
+          <a:prstGeom prst="rect">
+            <a:avLst/>
+          </a:prstGeom>
+        </p:spPr>
+      </p:pic>
+    </p:spTree>
+    <p:extLst>
+      <p:ext uri="{BB962C8B-B14F-4D97-AF65-F5344CB8AC3E}">
+        <p14:creationId xmlns:p14="http://schemas.microsoft.com/office/powerpoint/2010/main" val="3390200238"/>
+      </p:ext>
+    </p:extLst>
+  </p:cSld>
+  <p:clrMapOvr>
+    <a:masterClrMapping/>
+  </p:clrMapOvr>
+  <p:timing>
+    <p:tnLst>
+      <p:par>
+        <p:cTn id="1" dur="indefinite" restart="never" nodeType="tmRoot"/>
+      </p:par>
+    </p:tnLst>
+  </p:timing>
+</p:sld>
+</file>
+
+<file path=ppt/slides/slide19.xml><?xml version="1.0" encoding="utf-8"?>
+<p:sld xmlns:a="http://schemas.openxmlformats.org/drawingml/2006/main" xmlns:r="http://schemas.openxmlformats.org/officeDocument/2006/relationships" xmlns:p="http://schemas.openxmlformats.org/presentationml/2006/main">
+  <p:cSld>
+    <p:spTree>
+      <p:nvGrpSpPr>
+        <p:cNvPr id="1" name=""/>
+        <p:cNvGrpSpPr/>
+        <p:nvPr/>
+      </p:nvGrpSpPr>
+      <p:grpSpPr>
+        <a:xfrm>
+          <a:off x="0" y="0"/>
+          <a:ext cx="0" cy="0"/>
+          <a:chOff x="0" y="0"/>
+          <a:chExt cx="0" cy="0"/>
+        </a:xfrm>
+      </p:grpSpPr>
+      <p:sp>
+        <p:nvSpPr>
+          <p:cNvPr id="2" name="Titolo 1"/>
+          <p:cNvSpPr>
+            <a:spLocks noGrp="1"/>
+          </p:cNvSpPr>
+          <p:nvPr>
+            <p:ph type="title"/>
+          </p:nvPr>
+        </p:nvSpPr>
+        <p:spPr>
+          <a:xfrm>
+            <a:off x="838199" y="42203"/>
+            <a:ext cx="10515600" cy="886265"/>
+          </a:xfrm>
+        </p:spPr>
+        <p:txBody>
+          <a:bodyPr>
+            <a:normAutofit fontScale="90000"/>
+          </a:bodyPr>
+          <a:lstStyle/>
+          <a:p>
+            <a:pPr algn="ctr"/>
+            <a:r>
+              <a:rPr lang="en-GB" sz="4900" b="1" dirty="0" smtClean="0">
+                <a:solidFill>
+                  <a:schemeClr val="accent5">
+                    <a:lumMod val="50000"/>
+                  </a:schemeClr>
+                </a:solidFill>
+                <a:effectLst>
+                  <a:reflection blurRad="127000" stA="26000" endPos="37000" dist="50800" dir="5400000" sy="-100000" algn="bl" rotWithShape="0"/>
+                </a:effectLst>
+              </a:rPr>
+              <a:t>1) </a:t>
+            </a:r>
+            <a:r>
+              <a:rPr lang="en-GB" sz="6000" b="1" dirty="0" smtClean="0">
+                <a:solidFill>
+                  <a:schemeClr val="accent5">
+                    <a:lumMod val="50000"/>
+                  </a:schemeClr>
+                </a:solidFill>
+                <a:effectLst>
+                  <a:reflection blurRad="127000" stA="26000" endPos="37000" dist="50800" dir="5400000" sy="-100000" algn="bl" rotWithShape="0"/>
+                </a:effectLst>
+              </a:rPr>
+              <a:t>A</a:t>
+            </a:r>
+            <a:r>
+              <a:rPr lang="en-GB" b="1" dirty="0" smtClean="0">
+                <a:solidFill>
+                  <a:schemeClr val="accent5">
+                    <a:lumMod val="50000"/>
+                  </a:schemeClr>
+                </a:solidFill>
+                <a:effectLst>
+                  <a:reflection blurRad="127000" stA="26000" endPos="37000" dist="50800" dir="5400000" sy="-100000" algn="bl" rotWithShape="0"/>
+                </a:effectLst>
+              </a:rPr>
+              <a:t>dd </a:t>
+            </a:r>
+            <a:r>
+              <a:rPr lang="en-GB" sz="6000" b="1" dirty="0" smtClean="0">
+                <a:solidFill>
+                  <a:schemeClr val="accent5">
+                    <a:lumMod val="50000"/>
+                  </a:schemeClr>
+                </a:solidFill>
+                <a:effectLst>
+                  <a:reflection blurRad="127000" stA="26000" endPos="37000" dist="50800" dir="5400000" sy="-100000" algn="bl" rotWithShape="0"/>
+                </a:effectLst>
+              </a:rPr>
+              <a:t>R</a:t>
+            </a:r>
+            <a:r>
+              <a:rPr lang="en-GB" b="1" dirty="0" smtClean="0">
+                <a:solidFill>
+                  <a:schemeClr val="accent5">
+                    <a:lumMod val="50000"/>
+                  </a:schemeClr>
+                </a:solidFill>
+                <a:effectLst>
+                  <a:reflection blurRad="127000" stA="26000" endPos="37000" dist="50800" dir="5400000" sy="-100000" algn="bl" rotWithShape="0"/>
+                </a:effectLst>
+              </a:rPr>
+              <a:t>equest </a:t>
+            </a:r>
+            <a:r>
+              <a:rPr lang="en-GB" sz="6000" b="1" dirty="0" smtClean="0">
+                <a:solidFill>
+                  <a:schemeClr val="accent5">
+                    <a:lumMod val="50000"/>
+                  </a:schemeClr>
+                </a:solidFill>
+                <a:effectLst>
+                  <a:reflection blurRad="127000" stA="26000" endPos="37000" dist="50800" dir="5400000" sy="-100000" algn="bl" rotWithShape="0"/>
+                </a:effectLst>
+              </a:rPr>
+              <a:t>S</a:t>
+            </a:r>
+            <a:r>
+              <a:rPr lang="en-GB" b="1" dirty="0" smtClean="0">
+                <a:solidFill>
+                  <a:schemeClr val="accent5">
+                    <a:lumMod val="50000"/>
+                  </a:schemeClr>
+                </a:solidFill>
+                <a:effectLst>
+                  <a:reflection blurRad="127000" stA="26000" endPos="37000" dist="50800" dir="5400000" sy="-100000" algn="bl" rotWithShape="0"/>
+                </a:effectLst>
+              </a:rPr>
+              <a:t>equence </a:t>
+            </a:r>
+            <a:r>
+              <a:rPr lang="en-GB" sz="6000" b="1" dirty="0" smtClean="0">
+                <a:solidFill>
+                  <a:schemeClr val="accent5">
+                    <a:lumMod val="50000"/>
+                  </a:schemeClr>
+                </a:solidFill>
+                <a:effectLst>
+                  <a:reflection blurRad="127000" stA="26000" endPos="37000" dist="50800" dir="5400000" sy="-100000" algn="bl" rotWithShape="0"/>
+                </a:effectLst>
+              </a:rPr>
+              <a:t>D</a:t>
+            </a:r>
+            <a:r>
+              <a:rPr lang="en-GB" b="1" dirty="0" smtClean="0">
+                <a:solidFill>
+                  <a:schemeClr val="accent5">
+                    <a:lumMod val="50000"/>
+                  </a:schemeClr>
+                </a:solidFill>
+                <a:effectLst>
+                  <a:reflection blurRad="127000" stA="26000" endPos="37000" dist="50800" dir="5400000" sy="-100000" algn="bl" rotWithShape="0"/>
+                </a:effectLst>
+              </a:rPr>
+              <a:t>iagram</a:t>
+            </a:r>
+            <a:endParaRPr lang="it-IT" dirty="0">
+              <a:effectLst>
+                <a:reflection blurRad="127000" stA="26000" endPos="37000" dist="50800" dir="5400000" sy="-100000" algn="bl" rotWithShape="0"/>
+              </a:effectLst>
+            </a:endParaRPr>
+          </a:p>
+        </p:txBody>
+      </p:sp>
+      <p:pic>
+        <p:nvPicPr>
+          <p:cNvPr id="4" name="Segnaposto contenuto 3"/>
+          <p:cNvPicPr>
+            <a:picLocks noGrp="1"/>
+          </p:cNvPicPr>
+          <p:nvPr>
+            <p:ph idx="1"/>
+          </p:nvPr>
+        </p:nvPicPr>
+        <p:blipFill>
+          <a:blip r:embed="rId2">
+            <a:extLst>
+              <a:ext uri="{28A0092B-C50C-407E-A947-70E740481C1C}">
+                <a14:useLocalDpi xmlns:a14="http://schemas.microsoft.com/office/drawing/2010/main" val="0"/>
+              </a:ext>
+            </a:extLst>
+          </a:blip>
+          <a:stretch>
+            <a:fillRect/>
+          </a:stretch>
+        </p:blipFill>
+        <p:spPr>
+          <a:xfrm>
+            <a:off x="1868658" y="928468"/>
+            <a:ext cx="8454683" cy="5971735"/>
+          </a:xfrm>
+          <a:prstGeom prst="rect">
+            <a:avLst/>
+          </a:prstGeom>
+        </p:spPr>
+      </p:pic>
+    </p:spTree>
+    <p:extLst>
+      <p:ext uri="{BB962C8B-B14F-4D97-AF65-F5344CB8AC3E}">
+        <p14:creationId xmlns:p14="http://schemas.microsoft.com/office/powerpoint/2010/main" val="475207202"/>
+      </p:ext>
+    </p:extLst>
+  </p:cSld>
+  <p:clrMapOvr>
+    <a:masterClrMapping/>
+  </p:clrMapOvr>
+  <p:timing>
+    <p:tnLst>
+      <p:par>
+        <p:cTn id="1" dur="indefinite" restart="never" nodeType="tmRoot"/>
+      </p:par>
+    </p:tnLst>
+  </p:timing>
+</p:sld>
+</file>
+
 <file path=ppt/slides/slide2.xml><?xml version="1.0" encoding="utf-8"?>
 <p:sld xmlns:a="http://schemas.openxmlformats.org/drawingml/2006/main" xmlns:r="http://schemas.openxmlformats.org/officeDocument/2006/relationships" xmlns:p="http://schemas.openxmlformats.org/presentationml/2006/main">
   <p:cSld>
@@ -8765,8 +9600,8 @@
         </p:nvSpPr>
         <p:spPr>
           <a:xfrm>
-            <a:off x="1540329" y="1061357"/>
-            <a:ext cx="9144000" cy="1991762"/>
+            <a:off x="1524000" y="1699609"/>
+            <a:ext cx="9144000" cy="2186810"/>
           </a:xfrm>
           <a:prstGeom prst="rect">
             <a:avLst/>
@@ -8774,7 +9609,7 @@
         </p:spPr>
         <p:txBody>
           <a:bodyPr vert="horz" lIns="91440" tIns="45720" rIns="91440" bIns="45720" rtlCol="0" anchor="ctr">
-            <a:normAutofit lnSpcReduction="10000"/>
+            <a:normAutofit/>
           </a:bodyPr>
           <a:lstStyle>
             <a:lvl1pPr algn="l" defTabSz="914400" rtl="0" eaLnBrk="1" latinLnBrk="0" hangingPunct="1">
@@ -8821,7 +9656,7 @@
                 <a:effectLst>
                   <a:reflection blurRad="101600" stA="28000" endPos="35500" dist="12700" dir="5400000" sy="-90000" algn="bl" rotWithShape="0"/>
                 </a:effectLst>
-                <a:latin typeface="+mn-lt"/>
+                <a:latin typeface="Century Gothic" panose="020B0502020202020204" pitchFamily="34" charset="0"/>
               </a:rPr>
               <a:t>Assignment 1:</a:t>
             </a:r>
@@ -8849,7 +9684,7 @@
                 <a:effectLst>
                   <a:reflection blurRad="101600" stA="28000" endPos="35500" dist="12700" dir="5400000" sy="-90000" algn="bl" rotWithShape="0"/>
                 </a:effectLst>
-                <a:latin typeface="+mn-lt"/>
+                <a:latin typeface="Century Gothic" panose="020B0502020202020204" pitchFamily="34" charset="0"/>
               </a:rPr>
             </a:br>
             <a:r>
@@ -8876,7 +9711,7 @@
                 <a:effectLst>
                   <a:reflection blurRad="101600" stA="28000" endPos="35500" dist="12700" dir="5400000" sy="-90000" algn="bl" rotWithShape="0"/>
                 </a:effectLst>
-                <a:latin typeface="+mn-lt"/>
+                <a:latin typeface="Century Gothic" panose="020B0502020202020204" pitchFamily="34" charset="0"/>
               </a:rPr>
               <a:t>RASD</a:t>
             </a:r>
@@ -8893,7 +9728,7 @@
         </p:nvSpPr>
         <p:spPr>
           <a:xfrm>
-            <a:off x="1246415" y="3145194"/>
+            <a:off x="1246415" y="3920781"/>
             <a:ext cx="9699171" cy="1165549"/>
           </a:xfrm>
           <a:prstGeom prst="rect">
@@ -9092,49 +9927,8 @@
                   </a:outerShdw>
                 </a:effectLst>
               </a:rPr>
-              <a:t>Requirement Analysis </a:t>
+              <a:t>Requirement Analysis and Specification Document</a:t>
             </a:r>
-            <a:r>
-              <a:rPr lang="en-GB" sz="3200" smtClean="0">
-                <a:ln w="0">
-                  <a:solidFill>
-                    <a:schemeClr val="tx1">
-                      <a:alpha val="20000"/>
-                    </a:schemeClr>
-                  </a:solidFill>
-                </a:ln>
-                <a:solidFill>
-                  <a:srgbClr val="FF0000"/>
-                </a:solidFill>
-                <a:effectLst>
-                  <a:outerShdw blurRad="38100" dist="25400" dir="5400000" algn="ctr" rotWithShape="0">
-                    <a:srgbClr val="6E747A">
-                      <a:alpha val="43000"/>
-                    </a:srgbClr>
-                  </a:outerShdw>
-                </a:effectLst>
-              </a:rPr>
-              <a:t>and Specification Document</a:t>
-            </a:r>
-            <a:endParaRPr lang="en-GB" sz="3200" dirty="0" smtClean="0">
-              <a:ln w="0">
-                <a:solidFill>
-                  <a:schemeClr val="tx1">
-                    <a:alpha val="20000"/>
-                  </a:schemeClr>
-                </a:solidFill>
-              </a:ln>
-              <a:solidFill>
-                <a:srgbClr val="FF0000"/>
-              </a:solidFill>
-              <a:effectLst>
-                <a:outerShdw blurRad="38100" dist="25400" dir="5400000" algn="ctr" rotWithShape="0">
-                  <a:srgbClr val="6E747A">
-                    <a:alpha val="43000"/>
-                  </a:srgbClr>
-                </a:outerShdw>
-              </a:effectLst>
-            </a:endParaRPr>
           </a:p>
           <a:p>
             <a:pPr algn="ctr"/>
@@ -9315,6 +10109,236 @@
 </p:sld>
 </file>
 
+<file path=ppt/slides/slide20.xml><?xml version="1.0" encoding="utf-8"?>
+<p:sld xmlns:a="http://schemas.openxmlformats.org/drawingml/2006/main" xmlns:r="http://schemas.openxmlformats.org/officeDocument/2006/relationships" xmlns:p="http://schemas.openxmlformats.org/presentationml/2006/main">
+  <p:cSld>
+    <p:spTree>
+      <p:nvGrpSpPr>
+        <p:cNvPr id="1" name=""/>
+        <p:cNvGrpSpPr/>
+        <p:nvPr/>
+      </p:nvGrpSpPr>
+      <p:grpSpPr>
+        <a:xfrm>
+          <a:off x="0" y="0"/>
+          <a:ext cx="0" cy="0"/>
+          <a:chOff x="0" y="0"/>
+          <a:chExt cx="0" cy="0"/>
+        </a:xfrm>
+      </p:grpSpPr>
+      <p:sp>
+        <p:nvSpPr>
+          <p:cNvPr id="2" name="Titolo 1"/>
+          <p:cNvSpPr>
+            <a:spLocks noGrp="1"/>
+          </p:cNvSpPr>
+          <p:nvPr>
+            <p:ph type="title"/>
+          </p:nvPr>
+        </p:nvSpPr>
+        <p:spPr>
+          <a:xfrm>
+            <a:off x="838199" y="0"/>
+            <a:ext cx="10515600" cy="689317"/>
+          </a:xfrm>
+        </p:spPr>
+        <p:txBody>
+          <a:bodyPr>
+            <a:normAutofit fontScale="90000"/>
+          </a:bodyPr>
+          <a:lstStyle/>
+          <a:p>
+            <a:pPr algn="ctr"/>
+            <a:r>
+              <a:rPr lang="en-GB" sz="4900" b="1" dirty="0">
+                <a:solidFill>
+                  <a:schemeClr val="accent5">
+                    <a:lumMod val="50000"/>
+                  </a:schemeClr>
+                </a:solidFill>
+                <a:effectLst>
+                  <a:reflection blurRad="127000" stA="26000" endPos="37000" dist="50800" dir="5400000" sy="-100000" algn="bl" rotWithShape="0"/>
+                </a:effectLst>
+              </a:rPr>
+              <a:t>2</a:t>
+            </a:r>
+            <a:r>
+              <a:rPr lang="en-GB" sz="4900" b="1" dirty="0" smtClean="0">
+                <a:solidFill>
+                  <a:schemeClr val="accent5">
+                    <a:lumMod val="50000"/>
+                  </a:schemeClr>
+                </a:solidFill>
+                <a:effectLst>
+                  <a:reflection blurRad="127000" stA="26000" endPos="37000" dist="50800" dir="5400000" sy="-100000" algn="bl" rotWithShape="0"/>
+                </a:effectLst>
+              </a:rPr>
+              <a:t>) </a:t>
+            </a:r>
+            <a:r>
+              <a:rPr lang="en-GB" sz="6000" b="1" dirty="0">
+                <a:solidFill>
+                  <a:schemeClr val="accent5">
+                    <a:lumMod val="50000"/>
+                  </a:schemeClr>
+                </a:solidFill>
+                <a:effectLst>
+                  <a:reflection blurRad="127000" stA="26000" endPos="37000" dist="50800" dir="5400000" sy="-100000" algn="bl" rotWithShape="0"/>
+                </a:effectLst>
+              </a:rPr>
+              <a:t>R</a:t>
+            </a:r>
+            <a:r>
+              <a:rPr lang="en-GB" b="1" dirty="0">
+                <a:solidFill>
+                  <a:schemeClr val="accent5">
+                    <a:lumMod val="50000"/>
+                  </a:schemeClr>
+                </a:solidFill>
+                <a:effectLst>
+                  <a:reflection blurRad="127000" stA="26000" endPos="37000" dist="50800" dir="5400000" sy="-100000" algn="bl" rotWithShape="0"/>
+                </a:effectLst>
+              </a:rPr>
+              <a:t>equest </a:t>
+            </a:r>
+            <a:r>
+              <a:rPr lang="en-GB" sz="6000" b="1" dirty="0" smtClean="0">
+                <a:solidFill>
+                  <a:schemeClr val="accent5">
+                    <a:lumMod val="50000"/>
+                  </a:schemeClr>
+                </a:solidFill>
+                <a:effectLst>
+                  <a:reflection blurRad="127000" stA="26000" endPos="37000" dist="50800" dir="5400000" sy="-100000" algn="bl" rotWithShape="0"/>
+                </a:effectLst>
+              </a:rPr>
+              <a:t>A</a:t>
+            </a:r>
+            <a:r>
+              <a:rPr lang="en-GB" b="1" dirty="0" smtClean="0">
+                <a:solidFill>
+                  <a:schemeClr val="accent5">
+                    <a:lumMod val="50000"/>
+                  </a:schemeClr>
+                </a:solidFill>
+                <a:effectLst>
+                  <a:reflection blurRad="127000" stA="26000" endPos="37000" dist="50800" dir="5400000" sy="-100000" algn="bl" rotWithShape="0"/>
+                </a:effectLst>
+              </a:rPr>
+              <a:t>ssociation </a:t>
+            </a:r>
+            <a:r>
+              <a:rPr lang="en-GB" sz="6000" b="1" dirty="0" smtClean="0">
+                <a:solidFill>
+                  <a:schemeClr val="accent5">
+                    <a:lumMod val="50000"/>
+                  </a:schemeClr>
+                </a:solidFill>
+                <a:effectLst>
+                  <a:reflection blurRad="127000" stA="26000" endPos="37000" dist="50800" dir="5400000" sy="-100000" algn="bl" rotWithShape="0"/>
+                </a:effectLst>
+              </a:rPr>
+              <a:t>S</a:t>
+            </a:r>
+            <a:r>
+              <a:rPr lang="en-GB" b="1" dirty="0" smtClean="0">
+                <a:solidFill>
+                  <a:schemeClr val="accent5">
+                    <a:lumMod val="50000"/>
+                  </a:schemeClr>
+                </a:solidFill>
+                <a:effectLst>
+                  <a:reflection blurRad="127000" stA="26000" endPos="37000" dist="50800" dir="5400000" sy="-100000" algn="bl" rotWithShape="0"/>
+                </a:effectLst>
+              </a:rPr>
+              <a:t>equence </a:t>
+            </a:r>
+            <a:r>
+              <a:rPr lang="en-GB" sz="6000" b="1" dirty="0" smtClean="0">
+                <a:solidFill>
+                  <a:schemeClr val="accent5">
+                    <a:lumMod val="50000"/>
+                  </a:schemeClr>
+                </a:solidFill>
+                <a:effectLst>
+                  <a:reflection blurRad="127000" stA="26000" endPos="37000" dist="50800" dir="5400000" sy="-100000" algn="bl" rotWithShape="0"/>
+                </a:effectLst>
+              </a:rPr>
+              <a:t>D</a:t>
+            </a:r>
+            <a:r>
+              <a:rPr lang="en-GB" b="1" dirty="0" smtClean="0">
+                <a:solidFill>
+                  <a:schemeClr val="accent5">
+                    <a:lumMod val="50000"/>
+                  </a:schemeClr>
+                </a:solidFill>
+                <a:effectLst>
+                  <a:reflection blurRad="127000" stA="26000" endPos="37000" dist="50800" dir="5400000" sy="-100000" algn="bl" rotWithShape="0"/>
+                </a:effectLst>
+              </a:rPr>
+              <a:t>iagram</a:t>
+            </a:r>
+            <a:endParaRPr lang="it-IT" dirty="0">
+              <a:effectLst>
+                <a:reflection blurRad="127000" stA="26000" endPos="37000" dist="50800" dir="5400000" sy="-100000" algn="bl" rotWithShape="0"/>
+              </a:effectLst>
+            </a:endParaRPr>
+          </a:p>
+        </p:txBody>
+      </p:sp>
+      <p:pic>
+        <p:nvPicPr>
+          <p:cNvPr id="5" name="Segnaposto contenuto 4"/>
+          <p:cNvPicPr>
+            <a:picLocks noGrp="1"/>
+          </p:cNvPicPr>
+          <p:nvPr>
+            <p:ph idx="1"/>
+          </p:nvPr>
+        </p:nvPicPr>
+        <p:blipFill>
+          <a:blip r:embed="rId2">
+            <a:extLst>
+              <a:ext uri="{28A0092B-C50C-407E-A947-70E740481C1C}">
+                <a14:useLocalDpi xmlns:a14="http://schemas.microsoft.com/office/drawing/2010/main" val="0"/>
+              </a:ext>
+            </a:extLst>
+          </a:blip>
+          <a:stretch>
+            <a:fillRect/>
+          </a:stretch>
+        </p:blipFill>
+        <p:spPr>
+          <a:xfrm>
+            <a:off x="1312984" y="689317"/>
+            <a:ext cx="9566030" cy="6168683"/>
+          </a:xfrm>
+          <a:prstGeom prst="rect">
+            <a:avLst/>
+          </a:prstGeom>
+        </p:spPr>
+      </p:pic>
+    </p:spTree>
+    <p:extLst>
+      <p:ext uri="{BB962C8B-B14F-4D97-AF65-F5344CB8AC3E}">
+        <p14:creationId xmlns:p14="http://schemas.microsoft.com/office/powerpoint/2010/main" val="4025604028"/>
+      </p:ext>
+    </p:extLst>
+  </p:cSld>
+  <p:clrMapOvr>
+    <a:masterClrMapping/>
+  </p:clrMapOvr>
+  <p:timing>
+    <p:tnLst>
+      <p:par>
+        <p:cTn id="1" dur="indefinite" restart="never" nodeType="tmRoot"/>
+      </p:par>
+    </p:tnLst>
+  </p:timing>
+</p:sld>
+</file>
+
 <file path=ppt/slides/slide3.xml><?xml version="1.0" encoding="utf-8"?>
 <p:sld xmlns:a="http://schemas.openxmlformats.org/drawingml/2006/main" xmlns:r="http://schemas.openxmlformats.org/officeDocument/2006/relationships" xmlns:p="http://schemas.openxmlformats.org/presentationml/2006/main">
   <p:cSld>
@@ -9369,7 +10393,7 @@
         </p:nvSpPr>
         <p:spPr>
           <a:xfrm>
-            <a:off x="1468822" y="-429072"/>
+            <a:off x="1618592" y="-399936"/>
             <a:ext cx="9144000" cy="1991762"/>
           </a:xfrm>
           <a:prstGeom prst="rect">
@@ -9425,7 +10449,7 @@
                 <a:effectLst>
                   <a:reflection blurRad="101600" stA="28000" endPos="35500" dist="12700" dir="5400000" sy="-90000" algn="bl" rotWithShape="0"/>
                 </a:effectLst>
-                <a:latin typeface="+mn-lt"/>
+                <a:latin typeface="Century Gothic" panose="020B0502020202020204" pitchFamily="34" charset="0"/>
               </a:rPr>
               <a:t>WHAT IS?</a:t>
             </a:r>
@@ -9742,7 +10766,9 @@
                   </a:solidFill>
                 </a:ln>
                 <a:solidFill>
-                  <a:srgbClr val="FF0000"/>
+                  <a:schemeClr val="accent6">
+                    <a:lumMod val="75000"/>
+                  </a:schemeClr>
                 </a:solidFill>
                 <a:effectLst>
                   <a:outerShdw blurRad="38100" dist="25400" dir="5400000" algn="ctr" rotWithShape="0">
@@ -9772,7 +10798,9 @@
                   </a:solidFill>
                 </a:ln>
                 <a:solidFill>
-                  <a:srgbClr val="FF0000"/>
+                  <a:schemeClr val="accent6">
+                    <a:lumMod val="75000"/>
+                  </a:schemeClr>
                 </a:solidFill>
                 <a:effectLst>
                   <a:outerShdw blurRad="38100" dist="25400" dir="5400000" algn="ctr" rotWithShape="0">
@@ -10006,7 +11034,7 @@
               <a:buNone/>
             </a:pPr>
             <a:r>
-              <a:rPr lang="en-GB" sz="3200" dirty="0" smtClean="0">
+              <a:rPr lang="en-GB" sz="3200" dirty="0">
                 <a:ln w="0">
                   <a:solidFill>
                     <a:schemeClr val="tx1">
@@ -10015,7 +11043,9 @@
                   </a:solidFill>
                 </a:ln>
                 <a:solidFill>
-                  <a:srgbClr val="FF0000"/>
+                  <a:schemeClr val="accent6">
+                    <a:lumMod val="75000"/>
+                  </a:schemeClr>
                 </a:solidFill>
                 <a:effectLst>
                   <a:outerShdw blurRad="38100" dist="25400" dir="5400000" algn="ctr" rotWithShape="0">
@@ -10067,7 +11097,7 @@
         <p:spPr>
           <a:xfrm>
             <a:off x="4650639" y="5863004"/>
-            <a:ext cx="3079907" cy="514162"/>
+            <a:ext cx="3079907" cy="994996"/>
           </a:xfrm>
           <a:prstGeom prst="rect">
             <a:avLst/>
@@ -10075,7 +11105,7 @@
         </p:spPr>
         <p:txBody>
           <a:bodyPr vert="horz" lIns="91440" tIns="45720" rIns="91440" bIns="45720" rtlCol="0">
-            <a:normAutofit lnSpcReduction="10000"/>
+            <a:normAutofit fontScale="70000" lnSpcReduction="20000"/>
           </a:bodyPr>
           <a:lstStyle>
             <a:lvl1pPr marL="228600" indent="-228600" algn="l" defTabSz="914400" rtl="0" eaLnBrk="1" latinLnBrk="0" hangingPunct="1">
@@ -10243,10 +11273,13 @@
           </a:lstStyle>
           <a:p>
             <a:pPr marL="0" indent="0" algn="ctr">
+              <a:lnSpc>
+                <a:spcPct val="110000"/>
+              </a:lnSpc>
               <a:buNone/>
             </a:pPr>
             <a:r>
-              <a:rPr lang="en-GB" sz="3200" dirty="0" smtClean="0">
+              <a:rPr lang="en-GB" sz="4600" dirty="0">
                 <a:ln w="0">
                   <a:solidFill>
                     <a:schemeClr val="tx1">
@@ -10255,7 +11288,9 @@
                   </a:solidFill>
                 </a:ln>
                 <a:solidFill>
-                  <a:srgbClr val="FF0000"/>
+                  <a:schemeClr val="accent6">
+                    <a:lumMod val="75000"/>
+                  </a:schemeClr>
                 </a:solidFill>
                 <a:effectLst>
                   <a:outerShdw blurRad="38100" dist="25400" dir="5400000" algn="ctr" rotWithShape="0">
@@ -10267,6 +11302,27 @@
               </a:rPr>
               <a:t>UNAMBIGUOUS</a:t>
             </a:r>
+            <a:endParaRPr lang="en-GB" sz="3200" dirty="0">
+              <a:ln w="0">
+                <a:solidFill>
+                  <a:schemeClr val="tx1">
+                    <a:alpha val="20000"/>
+                  </a:schemeClr>
+                </a:solidFill>
+              </a:ln>
+              <a:solidFill>
+                <a:schemeClr val="accent6">
+                  <a:lumMod val="75000"/>
+                </a:schemeClr>
+              </a:solidFill>
+              <a:effectLst>
+                <a:outerShdw blurRad="38100" dist="25400" dir="5400000" algn="ctr" rotWithShape="0">
+                  <a:srgbClr val="6E747A">
+                    <a:alpha val="43000"/>
+                  </a:srgbClr>
+                </a:outerShdw>
+              </a:effectLst>
+            </a:endParaRPr>
           </a:p>
           <a:p>
             <a:pPr algn="ctr"/>
@@ -10302,7 +11358,7 @@
         </p:nvSpPr>
         <p:spPr>
           <a:xfrm>
-            <a:off x="1468822" y="2936394"/>
+            <a:off x="1618592" y="3103282"/>
             <a:ext cx="9144000" cy="1991762"/>
           </a:xfrm>
           <a:prstGeom prst="rect">
@@ -10967,7 +12023,7 @@
         <p:spPr>
           <a:xfrm>
             <a:off x="3342290" y="2869324"/>
-            <a:ext cx="5770179" cy="2128345"/>
+            <a:ext cx="5770179" cy="2254469"/>
           </a:xfrm>
           <a:prstGeom prst="ellipse">
             <a:avLst/>
@@ -11043,7 +12099,7 @@
         </p:nvSpPr>
         <p:spPr>
           <a:xfrm>
-            <a:off x="1468822" y="-429072"/>
+            <a:off x="1655379" y="-440972"/>
             <a:ext cx="9144000" cy="1991762"/>
           </a:xfrm>
           <a:prstGeom prst="rect">
@@ -11076,7 +12132,7 @@
           <a:p>
             <a:pPr algn="ctr"/>
             <a:r>
-              <a:rPr lang="en-GB" sz="7200" b="1" dirty="0" smtClean="0">
+              <a:rPr lang="en-GB" sz="6000" b="1" dirty="0" smtClean="0">
                 <a:ln w="19050">
                   <a:solidFill>
                     <a:schemeClr val="tx1"/>
@@ -11099,12 +12155,12 @@
                 <a:effectLst>
                   <a:reflection blurRad="101600" stA="28000" endPos="35500" dist="12700" dir="5400000" sy="-90000" algn="bl" rotWithShape="0"/>
                 </a:effectLst>
-                <a:latin typeface="+mn-lt"/>
+                <a:latin typeface="Century Gothic" panose="020B0502020202020204" pitchFamily="34" charset="0"/>
               </a:rPr>
               <a:t>SO</a:t>
             </a:r>
             <a:r>
-              <a:rPr lang="is-IS" sz="7200" b="1" dirty="0" smtClean="0">
+              <a:rPr lang="is-IS" sz="6000" b="1" dirty="0" smtClean="0">
                 <a:ln w="19050">
                   <a:solidFill>
                     <a:schemeClr val="tx1"/>
@@ -11127,11 +12183,11 @@
                 <a:effectLst>
                   <a:reflection blurRad="101600" stA="28000" endPos="35500" dist="12700" dir="5400000" sy="-90000" algn="bl" rotWithShape="0"/>
                 </a:effectLst>
-                <a:latin typeface="+mn-lt"/>
+                <a:latin typeface="Century Gothic" panose="020B0502020202020204" pitchFamily="34" charset="0"/>
               </a:rPr>
               <a:t>…</a:t>
             </a:r>
-            <a:endParaRPr lang="en-GB" sz="7200" b="1" dirty="0" smtClean="0">
+            <a:endParaRPr lang="en-GB" sz="6000" b="1" dirty="0" smtClean="0">
               <a:ln w="19050">
                 <a:solidFill>
                   <a:schemeClr val="tx1"/>
@@ -11154,7 +12210,7 @@
               <a:effectLst>
                 <a:reflection blurRad="101600" stA="28000" endPos="35500" dist="12700" dir="5400000" sy="-90000" algn="bl" rotWithShape="0"/>
               </a:effectLst>
-              <a:latin typeface="+mn-lt"/>
+              <a:latin typeface="Century Gothic" panose="020B0502020202020204" pitchFamily="34" charset="0"/>
             </a:endParaRPr>
           </a:p>
         </p:txBody>
@@ -11472,7 +12528,9 @@
                   </a:solidFill>
                 </a:ln>
                 <a:solidFill>
-                  <a:srgbClr val="FF0000"/>
+                  <a:schemeClr val="accent6">
+                    <a:lumMod val="75000"/>
+                  </a:schemeClr>
                 </a:solidFill>
                 <a:effectLst>
                   <a:outerShdw blurRad="38100" dist="25400" dir="5400000" algn="ctr" rotWithShape="0">
@@ -11502,7 +12560,9 @@
                   </a:solidFill>
                 </a:ln>
                 <a:solidFill>
-                  <a:srgbClr val="FF0000"/>
+                  <a:schemeClr val="accent6">
+                    <a:lumMod val="75000"/>
+                  </a:schemeClr>
                 </a:solidFill>
                 <a:effectLst>
                   <a:outerShdw blurRad="38100" dist="25400" dir="5400000" algn="ctr" rotWithShape="0">
@@ -11745,7 +12805,9 @@
                   </a:solidFill>
                 </a:ln>
                 <a:solidFill>
-                  <a:srgbClr val="FF0000"/>
+                  <a:schemeClr val="accent6">
+                    <a:lumMod val="75000"/>
+                  </a:schemeClr>
                 </a:solidFill>
                 <a:effectLst>
                   <a:outerShdw blurRad="38100" dist="25400" dir="5400000" algn="ctr" rotWithShape="0">
@@ -11985,7 +13047,9 @@
                   </a:solidFill>
                 </a:ln>
                 <a:solidFill>
-                  <a:srgbClr val="FF0000"/>
+                  <a:schemeClr val="accent6">
+                    <a:lumMod val="75000"/>
+                  </a:schemeClr>
                 </a:solidFill>
                 <a:effectLst>
                   <a:outerShdw blurRad="38100" dist="25400" dir="5400000" algn="ctr" rotWithShape="0">
@@ -12033,7 +13097,7 @@
         <p:spPr>
           <a:xfrm>
             <a:off x="3662668" y="3239351"/>
-            <a:ext cx="6059588" cy="1821183"/>
+            <a:ext cx="6059588" cy="1957325"/>
           </a:xfrm>
           <a:prstGeom prst="rect">
             <a:avLst/>
@@ -12260,8 +13324,49 @@
                   </a:outerShdw>
                 </a:effectLst>
               </a:rPr>
-              <a:t>Few words</a:t>
+              <a:t>Few </a:t>
             </a:r>
+            <a:r>
+              <a:rPr lang="en-GB" sz="2800" dirty="0" smtClean="0">
+                <a:ln w="0">
+                  <a:solidFill>
+                    <a:schemeClr val="tx1">
+                      <a:alpha val="20000"/>
+                    </a:schemeClr>
+                  </a:solidFill>
+                </a:ln>
+                <a:solidFill>
+                  <a:srgbClr val="C00000"/>
+                </a:solidFill>
+                <a:effectLst>
+                  <a:outerShdw blurRad="38100" dist="25400" dir="5400000" algn="ctr" rotWithShape="0">
+                    <a:srgbClr val="6E747A">
+                      <a:alpha val="43000"/>
+                    </a:srgbClr>
+                  </a:outerShdw>
+                </a:effectLst>
+              </a:rPr>
+              <a:t>words and simply</a:t>
+            </a:r>
+            <a:endParaRPr lang="en-GB" sz="2800" dirty="0" smtClean="0">
+              <a:ln w="0">
+                <a:solidFill>
+                  <a:schemeClr val="tx1">
+                    <a:alpha val="20000"/>
+                  </a:schemeClr>
+                </a:solidFill>
+              </a:ln>
+              <a:solidFill>
+                <a:srgbClr val="C00000"/>
+              </a:solidFill>
+              <a:effectLst>
+                <a:outerShdw blurRad="38100" dist="25400" dir="5400000" algn="ctr" rotWithShape="0">
+                  <a:srgbClr val="6E747A">
+                    <a:alpha val="43000"/>
+                  </a:srgbClr>
+                </a:outerShdw>
+              </a:effectLst>
+            </a:endParaRPr>
           </a:p>
           <a:p>
             <a:pPr marL="765175" indent="-488950" algn="l">
@@ -13069,7 +14174,7 @@
                 </a:effectLst>
                 <a:latin typeface="+mn-lt"/>
               </a:rPr>
-              <a:t>LEADING IDEA</a:t>
+              <a:t>The Leading Idea</a:t>
             </a:r>
             <a:endParaRPr lang="en-GB" sz="7200" b="1" dirty="0" smtClean="0">
               <a:ln w="19050">
@@ -13301,7 +14406,9 @@
                   </a:solidFill>
                 </a:ln>
                 <a:solidFill>
-                  <a:srgbClr val="FF0000"/>
+                  <a:schemeClr val="accent5">
+                    <a:lumMod val="50000"/>
+                  </a:schemeClr>
                 </a:solidFill>
                 <a:effectLst>
                   <a:outerShdw blurRad="38100" dist="25400" dir="5400000" algn="ctr" rotWithShape="0">
@@ -13323,7 +14430,9 @@
                   </a:solidFill>
                 </a:ln>
                 <a:solidFill>
-                  <a:srgbClr val="FF0000"/>
+                  <a:schemeClr val="accent5">
+                    <a:lumMod val="50000"/>
+                  </a:schemeClr>
                 </a:solidFill>
                 <a:effectLst>
                   <a:outerShdw blurRad="38100" dist="25400" dir="5400000" algn="ctr" rotWithShape="0">
@@ -13333,51 +14442,7 @@
                   </a:outerShdw>
                 </a:effectLst>
               </a:rPr>
-              <a:t>e assumed not to have </a:t>
-            </a:r>
-            <a:r>
-              <a:rPr lang="en-GB" sz="3200" dirty="0" smtClean="0">
-                <a:ln w="0">
-                  <a:solidFill>
-                    <a:schemeClr val="tx1">
-                      <a:alpha val="20000"/>
-                    </a:schemeClr>
-                  </a:solidFill>
-                </a:ln>
-                <a:solidFill>
-                  <a:srgbClr val="FF0000"/>
-                </a:solidFill>
-                <a:effectLst>
-                  <a:outerShdw blurRad="38100" dist="25400" dir="5400000" algn="ctr" rotWithShape="0">
-                    <a:srgbClr val="6E747A">
-                      <a:alpha val="43000"/>
-                    </a:srgbClr>
-                  </a:outerShdw>
-                </a:effectLst>
-              </a:rPr>
-              <a:t>any </a:t>
-            </a:r>
-            <a:r>
-              <a:rPr lang="en-GB" sz="3200" dirty="0" smtClean="0">
-                <a:ln w="0">
-                  <a:solidFill>
-                    <a:schemeClr val="tx1">
-                      <a:alpha val="20000"/>
-                    </a:schemeClr>
-                  </a:solidFill>
-                </a:ln>
-                <a:solidFill>
-                  <a:srgbClr val="FF0000"/>
-                </a:solidFill>
-                <a:effectLst>
-                  <a:outerShdw blurRad="38100" dist="25400" dir="5400000" algn="ctr" rotWithShape="0">
-                    <a:srgbClr val="6E747A">
-                      <a:alpha val="43000"/>
-                    </a:srgbClr>
-                  </a:outerShdw>
-                </a:effectLst>
-              </a:rPr>
-              <a:t>pre-existent computerized information system</a:t>
+              <a:t>e assumed not to have any pre-existent computerized information system</a:t>
             </a:r>
           </a:p>
           <a:p>
@@ -14327,6 +15392,25 @@
               </a:rPr>
               <a:t>G1</a:t>
             </a:r>
+            <a:endParaRPr lang="en-GB" sz="3200" dirty="0" smtClean="0">
+              <a:ln w="0">
+                <a:solidFill>
+                  <a:schemeClr val="tx1">
+                    <a:alpha val="20000"/>
+                  </a:schemeClr>
+                </a:solidFill>
+              </a:ln>
+              <a:solidFill>
+                <a:srgbClr val="FF0000"/>
+              </a:solidFill>
+              <a:effectLst>
+                <a:outerShdw blurRad="38100" dist="25400" dir="5400000" algn="ctr" rotWithShape="0">
+                  <a:srgbClr val="6E747A">
+                    <a:alpha val="43000"/>
+                  </a:srgbClr>
+                </a:outerShdw>
+              </a:effectLst>
+            </a:endParaRPr>
           </a:p>
           <a:p>
             <a:pPr algn="ctr">
@@ -14439,7 +15523,7 @@
         </p:nvSpPr>
         <p:spPr>
           <a:xfrm>
-            <a:off x="750436" y="1181557"/>
+            <a:off x="672585" y="237177"/>
             <a:ext cx="3522019" cy="1114667"/>
           </a:xfrm>
           <a:prstGeom prst="rect">
@@ -14448,7 +15532,7 @@
         </p:spPr>
         <p:txBody>
           <a:bodyPr vert="horz" lIns="91440" tIns="45720" rIns="91440" bIns="45720" rtlCol="0">
-            <a:normAutofit/>
+            <a:normAutofit fontScale="92500"/>
           </a:bodyPr>
           <a:lstStyle>
             <a:lvl1pPr marL="0" indent="0" algn="ctr" defTabSz="914400" rtl="0" eaLnBrk="1" latinLnBrk="0" hangingPunct="1">
@@ -14624,7 +15708,7 @@
               </a:spcBef>
             </a:pPr>
             <a:r>
-              <a:rPr lang="en-GB" sz="2000" dirty="0" smtClean="0">
+              <a:rPr lang="en-GB" dirty="0" smtClean="0">
                 <a:ln w="0">
                   <a:solidFill>
                     <a:schemeClr val="tx1">
@@ -14646,7 +15730,7 @@
               <a:t>Allow </a:t>
             </a:r>
             <a:r>
-              <a:rPr lang="en-GB" sz="2000" dirty="0">
+              <a:rPr lang="en-GB" dirty="0">
                 <a:ln w="0">
                   <a:solidFill>
                     <a:schemeClr val="tx1">
@@ -14668,7 +15752,7 @@
               <a:t>taxi drivers to have a personal </a:t>
             </a:r>
             <a:r>
-              <a:rPr lang="en-GB" sz="2000" dirty="0" smtClean="0">
+              <a:rPr lang="en-GB" dirty="0" smtClean="0">
                 <a:ln w="0">
                   <a:solidFill>
                     <a:schemeClr val="tx1">
@@ -14690,6 +15774,28 @@
               <a:t>reserved </a:t>
             </a:r>
             <a:r>
+              <a:rPr lang="en-GB" dirty="0">
+                <a:ln w="0">
+                  <a:solidFill>
+                    <a:schemeClr val="tx1">
+                      <a:alpha val="20000"/>
+                    </a:schemeClr>
+                  </a:solidFill>
+                </a:ln>
+                <a:solidFill>
+                  <a:srgbClr val="C00000"/>
+                </a:solidFill>
+                <a:effectLst>
+                  <a:outerShdw blurRad="38100" dist="25400" dir="5400000" algn="ctr" rotWithShape="0">
+                    <a:srgbClr val="6E747A">
+                      <a:alpha val="43000"/>
+                    </a:srgbClr>
+                  </a:outerShdw>
+                </a:effectLst>
+              </a:rPr>
+              <a:t>area that helps them managing rides</a:t>
+            </a:r>
+            <a:r>
               <a:rPr lang="en-GB" sz="2000" dirty="0">
                 <a:ln w="0">
                   <a:solidFill>
@@ -14709,7 +15815,7 @@
                   </a:outerShdw>
                 </a:effectLst>
               </a:rPr>
-              <a:t>area that helps them managing rides.</a:t>
+              <a:t>.</a:t>
             </a:r>
             <a:r>
               <a:rPr lang="it-IT" sz="2000" dirty="0">
@@ -19203,7 +20309,7 @@
         </p:nvSpPr>
         <p:spPr>
           <a:xfrm>
-            <a:off x="4558865" y="690839"/>
+            <a:off x="4682121" y="46972"/>
             <a:ext cx="3522019" cy="1114667"/>
           </a:xfrm>
           <a:prstGeom prst="rect">
@@ -20192,8 +21298,8 @@
         </p:nvCxnSpPr>
         <p:spPr>
           <a:xfrm flipV="1">
-            <a:off x="6847494" y="2029915"/>
-            <a:ext cx="2296506" cy="1365968"/>
+            <a:off x="6847494" y="2147419"/>
+            <a:ext cx="2123803" cy="1248464"/>
           </a:xfrm>
           <a:prstGeom prst="straightConnector1">
             <a:avLst/>
@@ -20220,249 +21326,6 @@
           </a:fontRef>
         </p:style>
       </p:cxnSp>
-      <p:sp>
-        <p:nvSpPr>
-          <p:cNvPr id="17" name="Sottotitolo 2"/>
-          <p:cNvSpPr txBox="1">
-            <a:spLocks/>
-          </p:cNvSpPr>
-          <p:nvPr/>
-        </p:nvSpPr>
-        <p:spPr>
-          <a:xfrm>
-            <a:off x="8352722" y="1316139"/>
-            <a:ext cx="3079907" cy="1171438"/>
-          </a:xfrm>
-          <a:prstGeom prst="rect">
-            <a:avLst/>
-          </a:prstGeom>
-        </p:spPr>
-        <p:txBody>
-          <a:bodyPr vert="horz" lIns="91440" tIns="45720" rIns="91440" bIns="45720" rtlCol="0">
-            <a:normAutofit/>
-          </a:bodyPr>
-          <a:lstStyle>
-            <a:lvl1pPr marL="228600" indent="-228600" algn="l" defTabSz="914400" rtl="0" eaLnBrk="1" latinLnBrk="0" hangingPunct="1">
-              <a:lnSpc>
-                <a:spcPct val="90000"/>
-              </a:lnSpc>
-              <a:spcBef>
-                <a:spcPts val="1000"/>
-              </a:spcBef>
-              <a:buFont typeface="Arial"/>
-              <a:buChar char="•"/>
-              <a:defRPr sz="2800" kern="1200">
-                <a:solidFill>
-                  <a:schemeClr val="tx1"/>
-                </a:solidFill>
-                <a:latin typeface="+mn-lt"/>
-                <a:ea typeface="+mn-ea"/>
-                <a:cs typeface="+mn-cs"/>
-              </a:defRPr>
-            </a:lvl1pPr>
-            <a:lvl2pPr marL="685800" indent="-228600" algn="l" defTabSz="914400" rtl="0" eaLnBrk="1" latinLnBrk="0" hangingPunct="1">
-              <a:lnSpc>
-                <a:spcPct val="90000"/>
-              </a:lnSpc>
-              <a:spcBef>
-                <a:spcPts val="500"/>
-              </a:spcBef>
-              <a:buFont typeface="Arial"/>
-              <a:buChar char="•"/>
-              <a:defRPr sz="2400" kern="1200">
-                <a:solidFill>
-                  <a:schemeClr val="tx1"/>
-                </a:solidFill>
-                <a:latin typeface="+mn-lt"/>
-                <a:ea typeface="+mn-ea"/>
-                <a:cs typeface="+mn-cs"/>
-              </a:defRPr>
-            </a:lvl2pPr>
-            <a:lvl3pPr marL="1143000" indent="-228600" algn="l" defTabSz="914400" rtl="0" eaLnBrk="1" latinLnBrk="0" hangingPunct="1">
-              <a:lnSpc>
-                <a:spcPct val="90000"/>
-              </a:lnSpc>
-              <a:spcBef>
-                <a:spcPts val="500"/>
-              </a:spcBef>
-              <a:buFont typeface="Arial"/>
-              <a:buChar char="•"/>
-              <a:defRPr sz="2000" kern="1200">
-                <a:solidFill>
-                  <a:schemeClr val="tx1"/>
-                </a:solidFill>
-                <a:latin typeface="+mn-lt"/>
-                <a:ea typeface="+mn-ea"/>
-                <a:cs typeface="+mn-cs"/>
-              </a:defRPr>
-            </a:lvl3pPr>
-            <a:lvl4pPr marL="1600200" indent="-228600" algn="l" defTabSz="914400" rtl="0" eaLnBrk="1" latinLnBrk="0" hangingPunct="1">
-              <a:lnSpc>
-                <a:spcPct val="90000"/>
-              </a:lnSpc>
-              <a:spcBef>
-                <a:spcPts val="500"/>
-              </a:spcBef>
-              <a:buFont typeface="Arial"/>
-              <a:buChar char="•"/>
-              <a:defRPr sz="1800" kern="1200">
-                <a:solidFill>
-                  <a:schemeClr val="tx1"/>
-                </a:solidFill>
-                <a:latin typeface="+mn-lt"/>
-                <a:ea typeface="+mn-ea"/>
-                <a:cs typeface="+mn-cs"/>
-              </a:defRPr>
-            </a:lvl4pPr>
-            <a:lvl5pPr marL="2057400" indent="-228600" algn="l" defTabSz="914400" rtl="0" eaLnBrk="1" latinLnBrk="0" hangingPunct="1">
-              <a:lnSpc>
-                <a:spcPct val="90000"/>
-              </a:lnSpc>
-              <a:spcBef>
-                <a:spcPts val="500"/>
-              </a:spcBef>
-              <a:buFont typeface="Arial"/>
-              <a:buChar char="•"/>
-              <a:defRPr sz="1800" kern="1200">
-                <a:solidFill>
-                  <a:schemeClr val="tx1"/>
-                </a:solidFill>
-                <a:latin typeface="+mn-lt"/>
-                <a:ea typeface="+mn-ea"/>
-                <a:cs typeface="+mn-cs"/>
-              </a:defRPr>
-            </a:lvl5pPr>
-            <a:lvl6pPr marL="2514600" indent="-228600" algn="l" defTabSz="914400" rtl="0" eaLnBrk="1" latinLnBrk="0" hangingPunct="1">
-              <a:lnSpc>
-                <a:spcPct val="90000"/>
-              </a:lnSpc>
-              <a:spcBef>
-                <a:spcPts val="500"/>
-              </a:spcBef>
-              <a:buFont typeface="Arial"/>
-              <a:buChar char="•"/>
-              <a:defRPr sz="1800" kern="1200">
-                <a:solidFill>
-                  <a:schemeClr val="tx1"/>
-                </a:solidFill>
-                <a:latin typeface="+mn-lt"/>
-                <a:ea typeface="+mn-ea"/>
-                <a:cs typeface="+mn-cs"/>
-              </a:defRPr>
-            </a:lvl6pPr>
-            <a:lvl7pPr marL="2971800" indent="-228600" algn="l" defTabSz="914400" rtl="0" eaLnBrk="1" latinLnBrk="0" hangingPunct="1">
-              <a:lnSpc>
-                <a:spcPct val="90000"/>
-              </a:lnSpc>
-              <a:spcBef>
-                <a:spcPts val="500"/>
-              </a:spcBef>
-              <a:buFont typeface="Arial"/>
-              <a:buChar char="•"/>
-              <a:defRPr sz="1800" kern="1200">
-                <a:solidFill>
-                  <a:schemeClr val="tx1"/>
-                </a:solidFill>
-                <a:latin typeface="+mn-lt"/>
-                <a:ea typeface="+mn-ea"/>
-                <a:cs typeface="+mn-cs"/>
-              </a:defRPr>
-            </a:lvl7pPr>
-            <a:lvl8pPr marL="3429000" indent="-228600" algn="l" defTabSz="914400" rtl="0" eaLnBrk="1" latinLnBrk="0" hangingPunct="1">
-              <a:lnSpc>
-                <a:spcPct val="90000"/>
-              </a:lnSpc>
-              <a:spcBef>
-                <a:spcPts val="500"/>
-              </a:spcBef>
-              <a:buFont typeface="Arial"/>
-              <a:buChar char="•"/>
-              <a:defRPr sz="1800" kern="1200">
-                <a:solidFill>
-                  <a:schemeClr val="tx1"/>
-                </a:solidFill>
-                <a:latin typeface="+mn-lt"/>
-                <a:ea typeface="+mn-ea"/>
-                <a:cs typeface="+mn-cs"/>
-              </a:defRPr>
-            </a:lvl8pPr>
-            <a:lvl9pPr marL="3886200" indent="-228600" algn="l" defTabSz="914400" rtl="0" eaLnBrk="1" latinLnBrk="0" hangingPunct="1">
-              <a:lnSpc>
-                <a:spcPct val="90000"/>
-              </a:lnSpc>
-              <a:spcBef>
-                <a:spcPts val="500"/>
-              </a:spcBef>
-              <a:buFont typeface="Arial"/>
-              <a:buChar char="•"/>
-              <a:defRPr sz="1800" kern="1200">
-                <a:solidFill>
-                  <a:schemeClr val="tx1"/>
-                </a:solidFill>
-                <a:latin typeface="+mn-lt"/>
-                <a:ea typeface="+mn-ea"/>
-                <a:cs typeface="+mn-cs"/>
-              </a:defRPr>
-            </a:lvl9pPr>
-          </a:lstStyle>
-          <a:p>
-            <a:pPr marL="0" indent="0" algn="ctr">
-              <a:lnSpc>
-                <a:spcPct val="100000"/>
-              </a:lnSpc>
-              <a:buNone/>
-            </a:pPr>
-            <a:r>
-              <a:rPr lang="en-GB" sz="3200" dirty="0" smtClean="0">
-                <a:ln w="0">
-                  <a:solidFill>
-                    <a:schemeClr val="tx1">
-                      <a:alpha val="20000"/>
-                    </a:schemeClr>
-                  </a:solidFill>
-                </a:ln>
-                <a:solidFill>
-                  <a:srgbClr val="FF0000"/>
-                </a:solidFill>
-                <a:effectLst>
-                  <a:outerShdw blurRad="38100" dist="25400" dir="5400000" algn="ctr" rotWithShape="0">
-                    <a:srgbClr val="6E747A">
-                      <a:alpha val="43000"/>
-                    </a:srgbClr>
-                  </a:outerShdw>
-                </a:effectLst>
-              </a:rPr>
-              <a:t>G3</a:t>
-            </a:r>
-          </a:p>
-          <a:p>
-            <a:pPr algn="ctr">
-              <a:lnSpc>
-                <a:spcPct val="100000"/>
-              </a:lnSpc>
-            </a:pPr>
-            <a:endParaRPr lang="en-GB" sz="3200" dirty="0" smtClean="0">
-              <a:ln w="0">
-                <a:solidFill>
-                  <a:schemeClr val="tx1">
-                    <a:alpha val="20000"/>
-                  </a:schemeClr>
-                </a:solidFill>
-              </a:ln>
-              <a:solidFill>
-                <a:srgbClr val="FF0000"/>
-              </a:solidFill>
-              <a:effectLst>
-                <a:outerShdw blurRad="38100" dist="25400" dir="5400000" algn="ctr" rotWithShape="0">
-                  <a:srgbClr val="6E747A">
-                    <a:alpha val="43000"/>
-                  </a:srgbClr>
-                </a:outerShdw>
-              </a:effectLst>
-            </a:endParaRPr>
-          </a:p>
-        </p:txBody>
-      </p:sp>
       <p:sp>
         <p:nvSpPr>
           <p:cNvPr id="26" name="Ovale 25"/>
@@ -21429,7 +22292,7 @@
         </p:nvSpPr>
         <p:spPr>
           <a:xfrm>
-            <a:off x="7574465" y="392400"/>
+            <a:off x="7772589" y="-87092"/>
             <a:ext cx="4427482" cy="2319236"/>
           </a:xfrm>
           <a:prstGeom prst="rect">
@@ -21939,7 +22802,7 @@
                                 </p:cTn>
                               </p:par>
                               <p:par>
-                                <p:cTn id="7" presetID="10" presetClass="exit" presetSubtype="0" fill="hold" grpId="0" nodeType="withEffect">
+                                <p:cTn id="7" presetID="10" presetClass="exit" presetSubtype="0" fill="hold" nodeType="withEffect">
                                   <p:stCondLst>
                                     <p:cond delay="0"/>
                                   </p:stCondLst>
@@ -21948,48 +22811,13 @@
                                       <p:cBhvr>
                                         <p:cTn id="8" dur="500"/>
                                         <p:tgtEl>
-                                          <p:spTgt spid="17"/>
+                                          <p:spTgt spid="16"/>
                                         </p:tgtEl>
                                       </p:cBhvr>
                                     </p:animEffect>
                                     <p:set>
                                       <p:cBhvr>
                                         <p:cTn id="9" dur="1" fill="hold">
-                                          <p:stCondLst>
-                                            <p:cond delay="499"/>
-                                          </p:stCondLst>
-                                        </p:cTn>
-                                        <p:tgtEl>
-                                          <p:spTgt spid="17"/>
-                                        </p:tgtEl>
-                                        <p:attrNameLst>
-                                          <p:attrName>style.visibility</p:attrName>
-                                        </p:attrNameLst>
-                                      </p:cBhvr>
-                                      <p:to>
-                                        <p:strVal val="hidden"/>
-                                      </p:to>
-                                    </p:set>
-                                  </p:childTnLst>
-                                </p:cTn>
-                              </p:par>
-                              <p:par>
-                                <p:cTn id="10" presetID="10" presetClass="exit" presetSubtype="0" fill="hold" nodeType="withEffect">
-                                  <p:stCondLst>
-                                    <p:cond delay="0"/>
-                                  </p:stCondLst>
-                                  <p:childTnLst>
-                                    <p:animEffect transition="out" filter="fade">
-                                      <p:cBhvr>
-                                        <p:cTn id="11" dur="500"/>
-                                        <p:tgtEl>
-                                          <p:spTgt spid="16"/>
-                                        </p:tgtEl>
-                                      </p:cBhvr>
-                                    </p:animEffect>
-                                    <p:set>
-                                      <p:cBhvr>
-                                        <p:cTn id="12" dur="1" fill="hold">
                                           <p:stCondLst>
                                             <p:cond delay="499"/>
                                           </p:stCondLst>
@@ -22012,20 +22840,20 @@
                           </p:cTn>
                         </p:par>
                         <p:par>
-                          <p:cTn id="13" fill="hold">
+                          <p:cTn id="10" fill="hold">
                             <p:stCondLst>
                               <p:cond delay="1000"/>
                             </p:stCondLst>
                             <p:childTnLst>
                               <p:par>
-                                <p:cTn id="14" presetID="10" presetClass="entr" presetSubtype="0" fill="hold" grpId="0" nodeType="afterEffect">
+                                <p:cTn id="11" presetID="10" presetClass="entr" presetSubtype="0" fill="hold" grpId="0" nodeType="afterEffect">
                                   <p:stCondLst>
                                     <p:cond delay="0"/>
                                   </p:stCondLst>
                                   <p:childTnLst>
                                     <p:set>
                                       <p:cBhvr>
-                                        <p:cTn id="15" dur="1" fill="hold">
+                                        <p:cTn id="12" dur="1" fill="hold">
                                           <p:stCondLst>
                                             <p:cond delay="0"/>
                                           </p:stCondLst>
@@ -22043,7 +22871,7 @@
                                     </p:set>
                                     <p:animEffect transition="in" filter="fade">
                                       <p:cBhvr>
-                                        <p:cTn id="16" dur="500"/>
+                                        <p:cTn id="13" dur="500"/>
                                         <p:tgtEl>
                                           <p:spTgt spid="29"/>
                                         </p:tgtEl>
@@ -22081,7 +22909,6 @@
     </p:tnLst>
     <p:bldLst>
       <p:bldP spid="15" grpId="0" animBg="1"/>
-      <p:bldP spid="17" grpId="0"/>
       <p:bldP spid="29" grpId="0"/>
     </p:bldLst>
   </p:timing>
@@ -23825,7 +24652,7 @@
         </p:nvSpPr>
         <p:spPr>
           <a:xfrm>
-            <a:off x="1249340" y="5392652"/>
+            <a:off x="1081513" y="6113414"/>
             <a:ext cx="3522019" cy="1114667"/>
           </a:xfrm>
           <a:prstGeom prst="rect">
@@ -24010,7 +24837,7 @@
               </a:spcBef>
             </a:pPr>
             <a:r>
-              <a:rPr lang="en-GB" sz="2000" dirty="0" smtClean="0">
+              <a:rPr lang="en-GB" dirty="0" smtClean="0">
                 <a:ln w="0">
                   <a:solidFill>
                     <a:schemeClr val="tx1">

</xml_diff>

<commit_message>
presentation Design Document complete
</commit_message>
<xml_diff>
--- a/All/final presentation/Final presentation.pptx
+++ b/All/final presentation/Final presentation.pptx
@@ -25,6 +25,9 @@
     <p:sldId id="274" r:id="rId19"/>
     <p:sldId id="275" r:id="rId20"/>
     <p:sldId id="276" r:id="rId21"/>
+    <p:sldId id="277" r:id="rId22"/>
+    <p:sldId id="278" r:id="rId23"/>
+    <p:sldId id="279" r:id="rId24"/>
   </p:sldIdLst>
   <p:sldSz cx="12192000" cy="6858000"/>
   <p:notesSz cx="6858000" cy="9144000"/>
@@ -7841,35 +7844,7 @@
                 </a:effectLst>
                 <a:latin typeface="Century Gothic" panose="020B0502020202020204" pitchFamily="34" charset="0"/>
               </a:rPr>
-              <a:t>USE </a:t>
-            </a:r>
-            <a:r>
-              <a:rPr lang="en-GB" sz="7200" b="1" dirty="0" smtClean="0">
-                <a:ln w="19050">
-                  <a:solidFill>
-                    <a:schemeClr val="tx1"/>
-                  </a:solidFill>
-                </a:ln>
-                <a:gradFill>
-                  <a:gsLst>
-                    <a:gs pos="0">
-                      <a:srgbClr val="A51502"/>
-                    </a:gs>
-                    <a:gs pos="75000">
-                      <a:srgbClr val="FF0000"/>
-                    </a:gs>
-                    <a:gs pos="100000">
-                      <a:srgbClr val="DE918F"/>
-                    </a:gs>
-                  </a:gsLst>
-                  <a:lin ang="5400000"/>
-                </a:gradFill>
-                <a:effectLst>
-                  <a:reflection blurRad="101600" stA="28000" endPos="35500" dist="12700" dir="5400000" sy="-90000" algn="bl" rotWithShape="0"/>
-                </a:effectLst>
-                <a:latin typeface="Century Gothic" panose="020B0502020202020204" pitchFamily="34" charset="0"/>
-              </a:rPr>
-              <a:t>CASE</a:t>
+              <a:t>USE CASE</a:t>
             </a:r>
           </a:p>
         </p:txBody>
@@ -7906,7 +7881,7 @@
           </a:ln>
           <a:extLst>
             <a:ext uri="{53640926-AAD7-44d8-BBD7-CCE9431645EC}">
-              <a14:shadowObscured xmlns:lc="http://schemas.openxmlformats.org/drawingml/2006/lockedCanvas" xmlns:a14="http://schemas.microsoft.com/office/drawing/2010/main" xmlns:pic="http://schemas.openxmlformats.org/drawingml/2006/picture" xmlns:wps="http://schemas.microsoft.com/office/word/2010/wordprocessingShape" xmlns:wne="http://schemas.microsoft.com/office/word/2006/wordml" xmlns:wpi="http://schemas.microsoft.com/office/word/2010/wordprocessingInk" xmlns:wpg="http://schemas.microsoft.com/office/word/2010/wordprocessingGroup" xmlns:w14="http://schemas.microsoft.com/office/word/2010/wordml" xmlns:w="http://schemas.openxmlformats.org/wordprocessingml/2006/main" xmlns:w10="urn:schemas-microsoft-com:office:word" xmlns:wp="http://schemas.openxmlformats.org/drawingml/2006/wordprocessingDrawing" xmlns:wp14="http://schemas.microsoft.com/office/word/2010/wordprocessingDrawing" xmlns:v="urn:schemas-microsoft-com:vml" xmlns:m="http://schemas.openxmlformats.org/officeDocument/2006/math" xmlns:o="urn:schemas-microsoft-com:office:office" xmlns:mv="urn:schemas-microsoft-com:mac:vml" xmlns:mc="http://schemas.openxmlformats.org/markup-compatibility/2006" xmlns:mo="http://schemas.microsoft.com/office/mac/office/2008/main" xmlns:wpc="http://schemas.microsoft.com/office/word/2010/wordprocessingCanvas" xmlns=""/>
+              <a14:shadowObscured xmlns="" xmlns:wpc="http://schemas.microsoft.com/office/word/2010/wordprocessingCanvas" xmlns:mo="http://schemas.microsoft.com/office/mac/office/2008/main" xmlns:mc="http://schemas.openxmlformats.org/markup-compatibility/2006" xmlns:mv="urn:schemas-microsoft-com:mac:vml" xmlns:o="urn:schemas-microsoft-com:office:office" xmlns:m="http://schemas.openxmlformats.org/officeDocument/2006/math" xmlns:v="urn:schemas-microsoft-com:vml" xmlns:wp14="http://schemas.microsoft.com/office/word/2010/wordprocessingDrawing" xmlns:wp="http://schemas.openxmlformats.org/drawingml/2006/wordprocessingDrawing" xmlns:w10="urn:schemas-microsoft-com:office:word" xmlns:w="http://schemas.openxmlformats.org/wordprocessingml/2006/main" xmlns:w14="http://schemas.microsoft.com/office/word/2010/wordml" xmlns:wpg="http://schemas.microsoft.com/office/word/2010/wordprocessingGroup" xmlns:wpi="http://schemas.microsoft.com/office/word/2010/wordprocessingInk" xmlns:wne="http://schemas.microsoft.com/office/word/2006/wordml" xmlns:wps="http://schemas.microsoft.com/office/word/2010/wordprocessingShape" xmlns:pic="http://schemas.openxmlformats.org/drawingml/2006/picture" xmlns:a14="http://schemas.microsoft.com/office/drawing/2010/main" xmlns:lc="http://schemas.openxmlformats.org/drawingml/2006/lockedCanvas"/>
             </a:ext>
           </a:extLst>
         </p:spPr>
@@ -7943,7 +7918,7 @@
           </a:ln>
           <a:extLst>
             <a:ext uri="{53640926-AAD7-44d8-BBD7-CCE9431645EC}">
-              <a14:shadowObscured xmlns:lc="http://schemas.openxmlformats.org/drawingml/2006/lockedCanvas" xmlns:a14="http://schemas.microsoft.com/office/drawing/2010/main" xmlns:pic="http://schemas.openxmlformats.org/drawingml/2006/picture" xmlns:wps="http://schemas.microsoft.com/office/word/2010/wordprocessingShape" xmlns:wne="http://schemas.microsoft.com/office/word/2006/wordml" xmlns:wpi="http://schemas.microsoft.com/office/word/2010/wordprocessingInk" xmlns:wpg="http://schemas.microsoft.com/office/word/2010/wordprocessingGroup" xmlns:w14="http://schemas.microsoft.com/office/word/2010/wordml" xmlns:w="http://schemas.openxmlformats.org/wordprocessingml/2006/main" xmlns:w10="urn:schemas-microsoft-com:office:word" xmlns:wp="http://schemas.openxmlformats.org/drawingml/2006/wordprocessingDrawing" xmlns:wp14="http://schemas.microsoft.com/office/word/2010/wordprocessingDrawing" xmlns:v="urn:schemas-microsoft-com:vml" xmlns:m="http://schemas.openxmlformats.org/officeDocument/2006/math" xmlns:o="urn:schemas-microsoft-com:office:office" xmlns:mv="urn:schemas-microsoft-com:mac:vml" xmlns:mc="http://schemas.openxmlformats.org/markup-compatibility/2006" xmlns:mo="http://schemas.microsoft.com/office/mac/office/2008/main" xmlns:wpc="http://schemas.microsoft.com/office/word/2010/wordprocessingCanvas" xmlns=""/>
+              <a14:shadowObscured xmlns="" xmlns:wpc="http://schemas.microsoft.com/office/word/2010/wordprocessingCanvas" xmlns:mo="http://schemas.microsoft.com/office/mac/office/2008/main" xmlns:mc="http://schemas.openxmlformats.org/markup-compatibility/2006" xmlns:mv="urn:schemas-microsoft-com:mac:vml" xmlns:o="urn:schemas-microsoft-com:office:office" xmlns:m="http://schemas.openxmlformats.org/officeDocument/2006/math" xmlns:v="urn:schemas-microsoft-com:vml" xmlns:wp14="http://schemas.microsoft.com/office/word/2010/wordprocessingDrawing" xmlns:wp="http://schemas.openxmlformats.org/drawingml/2006/wordprocessingDrawing" xmlns:w10="urn:schemas-microsoft-com:office:word" xmlns:w="http://schemas.openxmlformats.org/wordprocessingml/2006/main" xmlns:w14="http://schemas.microsoft.com/office/word/2010/wordml" xmlns:wpg="http://schemas.microsoft.com/office/word/2010/wordprocessingGroup" xmlns:wpi="http://schemas.microsoft.com/office/word/2010/wordprocessingInk" xmlns:wne="http://schemas.microsoft.com/office/word/2006/wordml" xmlns:wps="http://schemas.microsoft.com/office/word/2010/wordprocessingShape" xmlns:pic="http://schemas.openxmlformats.org/drawingml/2006/picture" xmlns:a14="http://schemas.microsoft.com/office/drawing/2010/main" xmlns:lc="http://schemas.openxmlformats.org/drawingml/2006/lockedCanvas"/>
             </a:ext>
           </a:extLst>
         </p:spPr>
@@ -10323,6 +10298,1388 @@
     <p:extLst>
       <p:ext uri="{BB962C8B-B14F-4D97-AF65-F5344CB8AC3E}">
         <p14:creationId xmlns:p14="http://schemas.microsoft.com/office/powerpoint/2010/main" val="4025604028"/>
+      </p:ext>
+    </p:extLst>
+  </p:cSld>
+  <p:clrMapOvr>
+    <a:masterClrMapping/>
+  </p:clrMapOvr>
+  <p:timing>
+    <p:tnLst>
+      <p:par>
+        <p:cTn id="1" dur="indefinite" restart="never" nodeType="tmRoot"/>
+      </p:par>
+    </p:tnLst>
+  </p:timing>
+</p:sld>
+</file>
+
+<file path=ppt/slides/slide21.xml><?xml version="1.0" encoding="utf-8"?>
+<p:sld xmlns:a="http://schemas.openxmlformats.org/drawingml/2006/main" xmlns:r="http://schemas.openxmlformats.org/officeDocument/2006/relationships" xmlns:p="http://schemas.openxmlformats.org/presentationml/2006/main">
+  <p:cSld>
+    <p:spTree>
+      <p:nvGrpSpPr>
+        <p:cNvPr id="1" name=""/>
+        <p:cNvGrpSpPr/>
+        <p:nvPr/>
+      </p:nvGrpSpPr>
+      <p:grpSpPr>
+        <a:xfrm>
+          <a:off x="0" y="0"/>
+          <a:ext cx="0" cy="0"/>
+          <a:chOff x="0" y="0"/>
+          <a:chExt cx="0" cy="0"/>
+        </a:xfrm>
+      </p:grpSpPr>
+      <p:sp>
+        <p:nvSpPr>
+          <p:cNvPr id="2" name="Titolo 1"/>
+          <p:cNvSpPr>
+            <a:spLocks noGrp="1"/>
+          </p:cNvSpPr>
+          <p:nvPr>
+            <p:ph type="title"/>
+          </p:nvPr>
+        </p:nvSpPr>
+        <p:spPr>
+          <a:xfrm>
+            <a:off x="838200" y="27296"/>
+            <a:ext cx="10515600" cy="1148142"/>
+          </a:xfrm>
+        </p:spPr>
+        <p:txBody>
+          <a:bodyPr>
+            <a:normAutofit/>
+          </a:bodyPr>
+          <a:lstStyle/>
+          <a:p>
+            <a:r>
+              <a:rPr lang="it-IT" sz="6000" b="1" dirty="0">
+                <a:solidFill>
+                  <a:schemeClr val="accent5">
+                    <a:lumMod val="50000"/>
+                  </a:schemeClr>
+                </a:solidFill>
+                <a:effectLst>
+                  <a:reflection blurRad="127000" stA="26000" endPos="37000" dist="50800" dir="5400000" sy="-100000" algn="bl" rotWithShape="0"/>
+                </a:effectLst>
+                <a:latin typeface="Century Gothic" panose="020B0502020202020204" pitchFamily="34" charset="0"/>
+              </a:rPr>
+              <a:t>C</a:t>
+            </a:r>
+            <a:r>
+              <a:rPr lang="it-IT" sz="4800" b="1" dirty="0">
+                <a:solidFill>
+                  <a:schemeClr val="accent5">
+                    <a:lumMod val="50000"/>
+                  </a:schemeClr>
+                </a:solidFill>
+                <a:effectLst>
+                  <a:reflection blurRad="127000" stA="26000" endPos="37000" dist="50800" dir="5400000" sy="-100000" algn="bl" rotWithShape="0"/>
+                </a:effectLst>
+                <a:latin typeface="Century Gothic" panose="020B0502020202020204" pitchFamily="34" charset="0"/>
+              </a:rPr>
+              <a:t>omponent </a:t>
+            </a:r>
+            <a:r>
+              <a:rPr lang="it-IT" sz="6000" b="1" dirty="0" err="1">
+                <a:solidFill>
+                  <a:schemeClr val="accent5">
+                    <a:lumMod val="50000"/>
+                  </a:schemeClr>
+                </a:solidFill>
+                <a:effectLst>
+                  <a:reflection blurRad="127000" stA="26000" endPos="37000" dist="50800" dir="5400000" sy="-100000" algn="bl" rotWithShape="0"/>
+                </a:effectLst>
+                <a:latin typeface="Century Gothic" panose="020B0502020202020204" pitchFamily="34" charset="0"/>
+              </a:rPr>
+              <a:t>I</a:t>
+            </a:r>
+            <a:r>
+              <a:rPr lang="it-IT" sz="4800" b="1" dirty="0" err="1">
+                <a:solidFill>
+                  <a:schemeClr val="accent5">
+                    <a:lumMod val="50000"/>
+                  </a:schemeClr>
+                </a:solidFill>
+                <a:effectLst>
+                  <a:reflection blurRad="127000" stA="26000" endPos="37000" dist="50800" dir="5400000" sy="-100000" algn="bl" rotWithShape="0"/>
+                </a:effectLst>
+                <a:latin typeface="Century Gothic" panose="020B0502020202020204" pitchFamily="34" charset="0"/>
+              </a:rPr>
+              <a:t>nterfaces</a:t>
+            </a:r>
+            <a:endParaRPr lang="it-IT" sz="4800" b="1" dirty="0">
+              <a:solidFill>
+                <a:schemeClr val="accent5">
+                  <a:lumMod val="50000"/>
+                </a:schemeClr>
+              </a:solidFill>
+              <a:effectLst>
+                <a:reflection blurRad="127000" stA="26000" endPos="37000" dist="50800" dir="5400000" sy="-100000" algn="bl" rotWithShape="0"/>
+              </a:effectLst>
+              <a:latin typeface="Century Gothic" panose="020B0502020202020204" pitchFamily="34" charset="0"/>
+            </a:endParaRPr>
+          </a:p>
+        </p:txBody>
+      </p:sp>
+      <p:sp>
+        <p:nvSpPr>
+          <p:cNvPr id="3" name="Segnaposto contenuto 2"/>
+          <p:cNvSpPr>
+            <a:spLocks noGrp="1"/>
+          </p:cNvSpPr>
+          <p:nvPr>
+            <p:ph idx="1"/>
+          </p:nvPr>
+        </p:nvSpPr>
+        <p:spPr>
+          <a:xfrm>
+            <a:off x="838200" y="1175438"/>
+            <a:ext cx="11185478" cy="5682561"/>
+          </a:xfrm>
+        </p:spPr>
+        <p:txBody>
+          <a:bodyPr>
+            <a:normAutofit/>
+          </a:bodyPr>
+          <a:lstStyle/>
+          <a:p>
+            <a:r>
+              <a:rPr lang="en-GB" b="1" dirty="0" err="1" smtClean="0"/>
+              <a:t>RequestsQueueManagerInterface</a:t>
+            </a:r>
+            <a:endParaRPr lang="en-GB" b="1" dirty="0" smtClean="0"/>
+          </a:p>
+          <a:p>
+            <a:pPr lvl="1"/>
+            <a:r>
+              <a:rPr lang="en-GB" dirty="0"/>
+              <a:t>void </a:t>
+            </a:r>
+            <a:r>
+              <a:rPr lang="en-GB" dirty="0" err="1"/>
+              <a:t>enqueueRequest</a:t>
+            </a:r>
+            <a:r>
+              <a:rPr lang="en-GB" dirty="0"/>
+              <a:t>(Request </a:t>
+            </a:r>
+            <a:r>
+              <a:rPr lang="en-GB" dirty="0" err="1"/>
+              <a:t>req</a:t>
+            </a:r>
+            <a:r>
+              <a:rPr lang="en-GB" dirty="0"/>
+              <a:t>)</a:t>
+            </a:r>
+            <a:endParaRPr lang="it-IT" dirty="0"/>
+          </a:p>
+          <a:p>
+            <a:pPr lvl="1"/>
+            <a:r>
+              <a:rPr lang="en-GB" dirty="0"/>
+              <a:t>void </a:t>
+            </a:r>
+            <a:r>
+              <a:rPr lang="en-GB" dirty="0" err="1"/>
+              <a:t>dequeueRequest</a:t>
+            </a:r>
+            <a:r>
+              <a:rPr lang="en-GB" dirty="0"/>
+              <a:t>()</a:t>
+            </a:r>
+            <a:endParaRPr lang="it-IT" dirty="0"/>
+          </a:p>
+          <a:p>
+            <a:pPr lvl="1"/>
+            <a:endParaRPr lang="en-GB" b="1" dirty="0" smtClean="0"/>
+          </a:p>
+          <a:p>
+            <a:r>
+              <a:rPr lang="en-GB" b="1" dirty="0" err="1" smtClean="0"/>
+              <a:t>TaxiQueueManagerInterface</a:t>
+            </a:r>
+            <a:endParaRPr lang="en-GB" b="1" dirty="0" smtClean="0"/>
+          </a:p>
+          <a:p>
+            <a:pPr lvl="1"/>
+            <a:r>
+              <a:rPr lang="en-GB" dirty="0"/>
+              <a:t>void </a:t>
+            </a:r>
+            <a:r>
+              <a:rPr lang="en-GB" dirty="0" err="1"/>
+              <a:t>enqueueTaxi</a:t>
+            </a:r>
+            <a:r>
+              <a:rPr lang="en-GB" dirty="0"/>
+              <a:t>(</a:t>
+            </a:r>
+            <a:r>
+              <a:rPr lang="en-GB" dirty="0" err="1"/>
+              <a:t>TaxiDriver</a:t>
+            </a:r>
+            <a:r>
+              <a:rPr lang="en-GB" dirty="0"/>
+              <a:t> t)</a:t>
+            </a:r>
+            <a:endParaRPr lang="it-IT" dirty="0"/>
+          </a:p>
+          <a:p>
+            <a:pPr lvl="1"/>
+            <a:r>
+              <a:rPr lang="en-GB" dirty="0"/>
+              <a:t>void </a:t>
+            </a:r>
+            <a:r>
+              <a:rPr lang="en-GB" dirty="0" err="1"/>
+              <a:t>insertTaxiAsFirstItem</a:t>
+            </a:r>
+            <a:r>
+              <a:rPr lang="en-GB" dirty="0"/>
+              <a:t>(</a:t>
+            </a:r>
+            <a:r>
+              <a:rPr lang="en-GB" dirty="0" err="1"/>
+              <a:t>TaxiDriver</a:t>
+            </a:r>
+            <a:r>
+              <a:rPr lang="en-GB" dirty="0"/>
+              <a:t> t)</a:t>
+            </a:r>
+            <a:endParaRPr lang="it-IT" dirty="0"/>
+          </a:p>
+          <a:p>
+            <a:pPr lvl="1"/>
+            <a:r>
+              <a:rPr lang="en-GB" dirty="0"/>
+              <a:t>void </a:t>
+            </a:r>
+            <a:r>
+              <a:rPr lang="en-GB" dirty="0" err="1"/>
+              <a:t>dequeueTaxi</a:t>
+            </a:r>
+            <a:r>
+              <a:rPr lang="en-GB" dirty="0" smtClean="0"/>
+              <a:t>()</a:t>
+            </a:r>
+          </a:p>
+          <a:p>
+            <a:pPr lvl="1"/>
+            <a:endParaRPr lang="en-GB" b="1" dirty="0" smtClean="0"/>
+          </a:p>
+          <a:p>
+            <a:r>
+              <a:rPr lang="en-GB" b="1" dirty="0" err="1" smtClean="0"/>
+              <a:t>UserAccountingInterface</a:t>
+            </a:r>
+            <a:endParaRPr lang="en-GB" b="1" dirty="0" smtClean="0"/>
+          </a:p>
+          <a:p>
+            <a:pPr lvl="1"/>
+            <a:r>
+              <a:rPr lang="en-GB" dirty="0"/>
+              <a:t>void </a:t>
+            </a:r>
+            <a:r>
+              <a:rPr lang="en-GB" dirty="0" err="1"/>
+              <a:t>lookForAccount</a:t>
+            </a:r>
+            <a:r>
+              <a:rPr lang="en-GB" dirty="0"/>
+              <a:t>(String username)</a:t>
+            </a:r>
+            <a:endParaRPr lang="it-IT" dirty="0"/>
+          </a:p>
+          <a:p>
+            <a:pPr lvl="1"/>
+            <a:r>
+              <a:rPr lang="en-GB" dirty="0"/>
+              <a:t>void </a:t>
+            </a:r>
+            <a:r>
+              <a:rPr lang="en-GB" dirty="0" err="1"/>
+              <a:t>addAccount</a:t>
+            </a:r>
+            <a:r>
+              <a:rPr lang="en-GB" dirty="0"/>
+              <a:t>(String username, String password, String </a:t>
+            </a:r>
+            <a:r>
+              <a:rPr lang="en-GB" dirty="0" err="1"/>
+              <a:t>firstName</a:t>
+            </a:r>
+            <a:r>
+              <a:rPr lang="en-GB" dirty="0"/>
+              <a:t>, String </a:t>
+            </a:r>
+            <a:r>
+              <a:rPr lang="en-GB" dirty="0" err="1" smtClean="0"/>
+              <a:t>lastName</a:t>
+            </a:r>
+            <a:r>
+              <a:rPr lang="en-GB" dirty="0"/>
+              <a:t>, String </a:t>
+            </a:r>
+            <a:r>
+              <a:rPr lang="en-GB" dirty="0" smtClean="0"/>
+              <a:t>email)</a:t>
+            </a:r>
+          </a:p>
+        </p:txBody>
+      </p:sp>
+      <p:sp>
+        <p:nvSpPr>
+          <p:cNvPr id="4" name="Segnaposto contenuto 2"/>
+          <p:cNvSpPr txBox="1">
+            <a:spLocks/>
+          </p:cNvSpPr>
+          <p:nvPr/>
+        </p:nvSpPr>
+        <p:spPr>
+          <a:xfrm>
+            <a:off x="838200" y="1175437"/>
+            <a:ext cx="11185478" cy="5682561"/>
+          </a:xfrm>
+          <a:prstGeom prst="rect">
+            <a:avLst/>
+          </a:prstGeom>
+        </p:spPr>
+        <p:txBody>
+          <a:bodyPr vert="horz" lIns="91440" tIns="45720" rIns="91440" bIns="45720" rtlCol="0">
+            <a:normAutofit/>
+          </a:bodyPr>
+          <a:lstStyle>
+            <a:lvl1pPr marL="228600" indent="-228600" algn="l" defTabSz="914400" rtl="0" eaLnBrk="1" latinLnBrk="0" hangingPunct="1">
+              <a:lnSpc>
+                <a:spcPct val="90000"/>
+              </a:lnSpc>
+              <a:spcBef>
+                <a:spcPts val="1000"/>
+              </a:spcBef>
+              <a:buFont typeface="Arial"/>
+              <a:buChar char="•"/>
+              <a:defRPr sz="2800" kern="1200">
+                <a:solidFill>
+                  <a:schemeClr val="tx1"/>
+                </a:solidFill>
+                <a:latin typeface="+mn-lt"/>
+                <a:ea typeface="+mn-ea"/>
+                <a:cs typeface="+mn-cs"/>
+              </a:defRPr>
+            </a:lvl1pPr>
+            <a:lvl2pPr marL="685800" indent="-228600" algn="l" defTabSz="914400" rtl="0" eaLnBrk="1" latinLnBrk="0" hangingPunct="1">
+              <a:lnSpc>
+                <a:spcPct val="90000"/>
+              </a:lnSpc>
+              <a:spcBef>
+                <a:spcPts val="500"/>
+              </a:spcBef>
+              <a:buFont typeface="Arial"/>
+              <a:buChar char="•"/>
+              <a:defRPr sz="2400" kern="1200">
+                <a:solidFill>
+                  <a:schemeClr val="tx1"/>
+                </a:solidFill>
+                <a:latin typeface="+mn-lt"/>
+                <a:ea typeface="+mn-ea"/>
+                <a:cs typeface="+mn-cs"/>
+              </a:defRPr>
+            </a:lvl2pPr>
+            <a:lvl3pPr marL="1143000" indent="-228600" algn="l" defTabSz="914400" rtl="0" eaLnBrk="1" latinLnBrk="0" hangingPunct="1">
+              <a:lnSpc>
+                <a:spcPct val="90000"/>
+              </a:lnSpc>
+              <a:spcBef>
+                <a:spcPts val="500"/>
+              </a:spcBef>
+              <a:buFont typeface="Arial"/>
+              <a:buChar char="•"/>
+              <a:defRPr sz="2000" kern="1200">
+                <a:solidFill>
+                  <a:schemeClr val="tx1"/>
+                </a:solidFill>
+                <a:latin typeface="+mn-lt"/>
+                <a:ea typeface="+mn-ea"/>
+                <a:cs typeface="+mn-cs"/>
+              </a:defRPr>
+            </a:lvl3pPr>
+            <a:lvl4pPr marL="1600200" indent="-228600" algn="l" defTabSz="914400" rtl="0" eaLnBrk="1" latinLnBrk="0" hangingPunct="1">
+              <a:lnSpc>
+                <a:spcPct val="90000"/>
+              </a:lnSpc>
+              <a:spcBef>
+                <a:spcPts val="500"/>
+              </a:spcBef>
+              <a:buFont typeface="Arial"/>
+              <a:buChar char="•"/>
+              <a:defRPr sz="1800" kern="1200">
+                <a:solidFill>
+                  <a:schemeClr val="tx1"/>
+                </a:solidFill>
+                <a:latin typeface="+mn-lt"/>
+                <a:ea typeface="+mn-ea"/>
+                <a:cs typeface="+mn-cs"/>
+              </a:defRPr>
+            </a:lvl4pPr>
+            <a:lvl5pPr marL="2057400" indent="-228600" algn="l" defTabSz="914400" rtl="0" eaLnBrk="1" latinLnBrk="0" hangingPunct="1">
+              <a:lnSpc>
+                <a:spcPct val="90000"/>
+              </a:lnSpc>
+              <a:spcBef>
+                <a:spcPts val="500"/>
+              </a:spcBef>
+              <a:buFont typeface="Arial"/>
+              <a:buChar char="•"/>
+              <a:defRPr sz="1800" kern="1200">
+                <a:solidFill>
+                  <a:schemeClr val="tx1"/>
+                </a:solidFill>
+                <a:latin typeface="+mn-lt"/>
+                <a:ea typeface="+mn-ea"/>
+                <a:cs typeface="+mn-cs"/>
+              </a:defRPr>
+            </a:lvl5pPr>
+            <a:lvl6pPr marL="2514600" indent="-228600" algn="l" defTabSz="914400" rtl="0" eaLnBrk="1" latinLnBrk="0" hangingPunct="1">
+              <a:lnSpc>
+                <a:spcPct val="90000"/>
+              </a:lnSpc>
+              <a:spcBef>
+                <a:spcPts val="500"/>
+              </a:spcBef>
+              <a:buFont typeface="Arial"/>
+              <a:buChar char="•"/>
+              <a:defRPr sz="1800" kern="1200">
+                <a:solidFill>
+                  <a:schemeClr val="tx1"/>
+                </a:solidFill>
+                <a:latin typeface="+mn-lt"/>
+                <a:ea typeface="+mn-ea"/>
+                <a:cs typeface="+mn-cs"/>
+              </a:defRPr>
+            </a:lvl6pPr>
+            <a:lvl7pPr marL="2971800" indent="-228600" algn="l" defTabSz="914400" rtl="0" eaLnBrk="1" latinLnBrk="0" hangingPunct="1">
+              <a:lnSpc>
+                <a:spcPct val="90000"/>
+              </a:lnSpc>
+              <a:spcBef>
+                <a:spcPts val="500"/>
+              </a:spcBef>
+              <a:buFont typeface="Arial"/>
+              <a:buChar char="•"/>
+              <a:defRPr sz="1800" kern="1200">
+                <a:solidFill>
+                  <a:schemeClr val="tx1"/>
+                </a:solidFill>
+                <a:latin typeface="+mn-lt"/>
+                <a:ea typeface="+mn-ea"/>
+                <a:cs typeface="+mn-cs"/>
+              </a:defRPr>
+            </a:lvl7pPr>
+            <a:lvl8pPr marL="3429000" indent="-228600" algn="l" defTabSz="914400" rtl="0" eaLnBrk="1" latinLnBrk="0" hangingPunct="1">
+              <a:lnSpc>
+                <a:spcPct val="90000"/>
+              </a:lnSpc>
+              <a:spcBef>
+                <a:spcPts val="500"/>
+              </a:spcBef>
+              <a:buFont typeface="Arial"/>
+              <a:buChar char="•"/>
+              <a:defRPr sz="1800" kern="1200">
+                <a:solidFill>
+                  <a:schemeClr val="tx1"/>
+                </a:solidFill>
+                <a:latin typeface="+mn-lt"/>
+                <a:ea typeface="+mn-ea"/>
+                <a:cs typeface="+mn-cs"/>
+              </a:defRPr>
+            </a:lvl8pPr>
+            <a:lvl9pPr marL="3886200" indent="-228600" algn="l" defTabSz="914400" rtl="0" eaLnBrk="1" latinLnBrk="0" hangingPunct="1">
+              <a:lnSpc>
+                <a:spcPct val="90000"/>
+              </a:lnSpc>
+              <a:spcBef>
+                <a:spcPts val="500"/>
+              </a:spcBef>
+              <a:buFont typeface="Arial"/>
+              <a:buChar char="•"/>
+              <a:defRPr sz="1800" kern="1200">
+                <a:solidFill>
+                  <a:schemeClr val="tx1"/>
+                </a:solidFill>
+                <a:latin typeface="+mn-lt"/>
+                <a:ea typeface="+mn-ea"/>
+                <a:cs typeface="+mn-cs"/>
+              </a:defRPr>
+            </a:lvl9pPr>
+          </a:lstStyle>
+          <a:p>
+            <a:r>
+              <a:rPr lang="en-GB" b="1" dirty="0" err="1" smtClean="0">
+                <a:solidFill>
+                  <a:schemeClr val="accent5">
+                    <a:lumMod val="75000"/>
+                  </a:schemeClr>
+                </a:solidFill>
+              </a:rPr>
+              <a:t>RequestsQueueManagerInterface</a:t>
+            </a:r>
+            <a:endParaRPr lang="en-GB" b="1" dirty="0" smtClean="0">
+              <a:solidFill>
+                <a:schemeClr val="accent5">
+                  <a:lumMod val="75000"/>
+                </a:schemeClr>
+              </a:solidFill>
+            </a:endParaRPr>
+          </a:p>
+          <a:p>
+            <a:pPr lvl="1"/>
+            <a:r>
+              <a:rPr lang="en-GB" dirty="0" smtClean="0"/>
+              <a:t>void </a:t>
+            </a:r>
+            <a:r>
+              <a:rPr lang="en-GB" dirty="0" err="1" smtClean="0"/>
+              <a:t>enqueueRequest</a:t>
+            </a:r>
+            <a:r>
+              <a:rPr lang="en-GB" dirty="0" smtClean="0"/>
+              <a:t>(Request </a:t>
+            </a:r>
+            <a:r>
+              <a:rPr lang="en-GB" dirty="0" err="1" smtClean="0"/>
+              <a:t>req</a:t>
+            </a:r>
+            <a:r>
+              <a:rPr lang="en-GB" dirty="0" smtClean="0"/>
+              <a:t>)</a:t>
+            </a:r>
+            <a:endParaRPr lang="it-IT" dirty="0" smtClean="0"/>
+          </a:p>
+          <a:p>
+            <a:pPr lvl="1"/>
+            <a:r>
+              <a:rPr lang="en-GB" dirty="0" smtClean="0"/>
+              <a:t>void </a:t>
+            </a:r>
+            <a:r>
+              <a:rPr lang="en-GB" dirty="0" err="1" smtClean="0"/>
+              <a:t>dequeueRequest</a:t>
+            </a:r>
+            <a:r>
+              <a:rPr lang="en-GB" dirty="0" smtClean="0"/>
+              <a:t>()</a:t>
+            </a:r>
+            <a:endParaRPr lang="it-IT" dirty="0" smtClean="0"/>
+          </a:p>
+          <a:p>
+            <a:pPr lvl="1"/>
+            <a:endParaRPr lang="en-GB" b="1" dirty="0" smtClean="0"/>
+          </a:p>
+          <a:p>
+            <a:r>
+              <a:rPr lang="en-GB" b="1" dirty="0" err="1" smtClean="0">
+                <a:solidFill>
+                  <a:schemeClr val="accent5">
+                    <a:lumMod val="75000"/>
+                  </a:schemeClr>
+                </a:solidFill>
+              </a:rPr>
+              <a:t>TaxiQueueManagerInterface</a:t>
+            </a:r>
+            <a:endParaRPr lang="en-GB" b="1" dirty="0" smtClean="0">
+              <a:solidFill>
+                <a:schemeClr val="accent5">
+                  <a:lumMod val="75000"/>
+                </a:schemeClr>
+              </a:solidFill>
+            </a:endParaRPr>
+          </a:p>
+          <a:p>
+            <a:pPr lvl="1"/>
+            <a:r>
+              <a:rPr lang="en-GB" dirty="0" smtClean="0"/>
+              <a:t>void </a:t>
+            </a:r>
+            <a:r>
+              <a:rPr lang="en-GB" dirty="0" err="1" smtClean="0"/>
+              <a:t>enqueueTaxi</a:t>
+            </a:r>
+            <a:r>
+              <a:rPr lang="en-GB" dirty="0" smtClean="0"/>
+              <a:t>(</a:t>
+            </a:r>
+            <a:r>
+              <a:rPr lang="en-GB" dirty="0" err="1" smtClean="0"/>
+              <a:t>TaxiDriver</a:t>
+            </a:r>
+            <a:r>
+              <a:rPr lang="en-GB" dirty="0" smtClean="0"/>
+              <a:t> t)</a:t>
+            </a:r>
+            <a:endParaRPr lang="it-IT" dirty="0" smtClean="0"/>
+          </a:p>
+          <a:p>
+            <a:pPr lvl="1"/>
+            <a:r>
+              <a:rPr lang="en-GB" dirty="0" smtClean="0"/>
+              <a:t>void </a:t>
+            </a:r>
+            <a:r>
+              <a:rPr lang="en-GB" dirty="0" err="1" smtClean="0"/>
+              <a:t>insertTaxiAsFirstItem</a:t>
+            </a:r>
+            <a:r>
+              <a:rPr lang="en-GB" dirty="0" smtClean="0"/>
+              <a:t>(</a:t>
+            </a:r>
+            <a:r>
+              <a:rPr lang="en-GB" dirty="0" err="1" smtClean="0"/>
+              <a:t>TaxiDriver</a:t>
+            </a:r>
+            <a:r>
+              <a:rPr lang="en-GB" dirty="0" smtClean="0"/>
+              <a:t> t)</a:t>
+            </a:r>
+            <a:endParaRPr lang="it-IT" dirty="0" smtClean="0"/>
+          </a:p>
+          <a:p>
+            <a:pPr lvl="1"/>
+            <a:r>
+              <a:rPr lang="en-GB" dirty="0" smtClean="0"/>
+              <a:t>void </a:t>
+            </a:r>
+            <a:r>
+              <a:rPr lang="en-GB" dirty="0" err="1" smtClean="0"/>
+              <a:t>dequeueTaxi</a:t>
+            </a:r>
+            <a:r>
+              <a:rPr lang="en-GB" dirty="0" smtClean="0"/>
+              <a:t>()</a:t>
+            </a:r>
+          </a:p>
+          <a:p>
+            <a:pPr lvl="1"/>
+            <a:endParaRPr lang="en-GB" b="1" dirty="0" smtClean="0"/>
+          </a:p>
+          <a:p>
+            <a:r>
+              <a:rPr lang="en-GB" b="1" dirty="0" err="1" smtClean="0">
+                <a:solidFill>
+                  <a:schemeClr val="accent5">
+                    <a:lumMod val="75000"/>
+                  </a:schemeClr>
+                </a:solidFill>
+              </a:rPr>
+              <a:t>UserAccountingInterface</a:t>
+            </a:r>
+            <a:endParaRPr lang="en-GB" b="1" dirty="0" smtClean="0">
+              <a:solidFill>
+                <a:schemeClr val="accent5">
+                  <a:lumMod val="75000"/>
+                </a:schemeClr>
+              </a:solidFill>
+            </a:endParaRPr>
+          </a:p>
+          <a:p>
+            <a:pPr lvl="1"/>
+            <a:r>
+              <a:rPr lang="en-GB" dirty="0" smtClean="0"/>
+              <a:t>void </a:t>
+            </a:r>
+            <a:r>
+              <a:rPr lang="en-GB" dirty="0" err="1" smtClean="0"/>
+              <a:t>lookForAccount</a:t>
+            </a:r>
+            <a:r>
+              <a:rPr lang="en-GB" dirty="0" smtClean="0"/>
+              <a:t>(String username)</a:t>
+            </a:r>
+            <a:endParaRPr lang="it-IT" dirty="0" smtClean="0"/>
+          </a:p>
+          <a:p>
+            <a:pPr lvl="1"/>
+            <a:r>
+              <a:rPr lang="en-GB" dirty="0" smtClean="0"/>
+              <a:t>void </a:t>
+            </a:r>
+            <a:r>
+              <a:rPr lang="en-GB" dirty="0" err="1" smtClean="0"/>
+              <a:t>addAccount</a:t>
+            </a:r>
+            <a:r>
+              <a:rPr lang="en-GB" dirty="0" smtClean="0"/>
+              <a:t>(String username, String password, String </a:t>
+            </a:r>
+            <a:r>
+              <a:rPr lang="en-GB" dirty="0" err="1" smtClean="0"/>
+              <a:t>firstName</a:t>
+            </a:r>
+            <a:r>
+              <a:rPr lang="en-GB" dirty="0" smtClean="0"/>
+              <a:t>, String </a:t>
+            </a:r>
+            <a:r>
+              <a:rPr lang="en-GB" dirty="0" err="1" smtClean="0"/>
+              <a:t>lastName</a:t>
+            </a:r>
+            <a:r>
+              <a:rPr lang="en-GB" dirty="0" smtClean="0"/>
+              <a:t>, String email)</a:t>
+            </a:r>
+            <a:endParaRPr lang="en-GB" dirty="0" smtClean="0"/>
+          </a:p>
+        </p:txBody>
+      </p:sp>
+    </p:spTree>
+    <p:extLst>
+      <p:ext uri="{BB962C8B-B14F-4D97-AF65-F5344CB8AC3E}">
+        <p14:creationId xmlns:p14="http://schemas.microsoft.com/office/powerpoint/2010/main" val="4014829411"/>
+      </p:ext>
+    </p:extLst>
+  </p:cSld>
+  <p:clrMapOvr>
+    <a:masterClrMapping/>
+  </p:clrMapOvr>
+  <mc:AlternateContent xmlns:mc="http://schemas.openxmlformats.org/markup-compatibility/2006">
+    <mc:Choice xmlns:p14="http://schemas.microsoft.com/office/powerpoint/2010/main" Requires="p14">
+      <p:transition p14:dur="0"/>
+    </mc:Choice>
+    <mc:Fallback>
+      <p:transition/>
+    </mc:Fallback>
+  </mc:AlternateContent>
+  <p:timing>
+    <p:tnLst>
+      <p:par>
+        <p:cTn id="1" dur="indefinite" restart="never" nodeType="tmRoot"/>
+      </p:par>
+    </p:tnLst>
+  </p:timing>
+</p:sld>
+</file>
+
+<file path=ppt/slides/slide22.xml><?xml version="1.0" encoding="utf-8"?>
+<p:sld xmlns:a="http://schemas.openxmlformats.org/drawingml/2006/main" xmlns:r="http://schemas.openxmlformats.org/officeDocument/2006/relationships" xmlns:p="http://schemas.openxmlformats.org/presentationml/2006/main">
+  <p:cSld>
+    <p:spTree>
+      <p:nvGrpSpPr>
+        <p:cNvPr id="1" name=""/>
+        <p:cNvGrpSpPr/>
+        <p:nvPr/>
+      </p:nvGrpSpPr>
+      <p:grpSpPr>
+        <a:xfrm>
+          <a:off x="0" y="0"/>
+          <a:ext cx="0" cy="0"/>
+          <a:chOff x="0" y="0"/>
+          <a:chExt cx="0" cy="0"/>
+        </a:xfrm>
+      </p:grpSpPr>
+      <p:sp>
+        <p:nvSpPr>
+          <p:cNvPr id="2" name="Titolo 1"/>
+          <p:cNvSpPr>
+            <a:spLocks noGrp="1"/>
+          </p:cNvSpPr>
+          <p:nvPr>
+            <p:ph type="title"/>
+          </p:nvPr>
+        </p:nvSpPr>
+        <p:spPr>
+          <a:xfrm>
+            <a:off x="838200" y="0"/>
+            <a:ext cx="10515600" cy="1148142"/>
+          </a:xfrm>
+        </p:spPr>
+        <p:txBody>
+          <a:bodyPr>
+            <a:normAutofit/>
+          </a:bodyPr>
+          <a:lstStyle/>
+          <a:p>
+            <a:r>
+              <a:rPr lang="it-IT" sz="6000" b="1" dirty="0">
+                <a:solidFill>
+                  <a:schemeClr val="accent5">
+                    <a:lumMod val="50000"/>
+                  </a:schemeClr>
+                </a:solidFill>
+                <a:effectLst>
+                  <a:reflection blurRad="127000" stA="26000" endPos="37000" dist="50800" dir="5400000" sy="-100000" algn="bl" rotWithShape="0"/>
+                </a:effectLst>
+                <a:latin typeface="Century Gothic" panose="020B0502020202020204" pitchFamily="34" charset="0"/>
+              </a:rPr>
+              <a:t>C</a:t>
+            </a:r>
+            <a:r>
+              <a:rPr lang="it-IT" sz="4800" b="1" dirty="0">
+                <a:solidFill>
+                  <a:schemeClr val="accent5">
+                    <a:lumMod val="50000"/>
+                  </a:schemeClr>
+                </a:solidFill>
+                <a:effectLst>
+                  <a:reflection blurRad="127000" stA="26000" endPos="37000" dist="50800" dir="5400000" sy="-100000" algn="bl" rotWithShape="0"/>
+                </a:effectLst>
+                <a:latin typeface="Century Gothic" panose="020B0502020202020204" pitchFamily="34" charset="0"/>
+              </a:rPr>
+              <a:t>omponent </a:t>
+            </a:r>
+            <a:r>
+              <a:rPr lang="it-IT" sz="6000" b="1" dirty="0" err="1">
+                <a:solidFill>
+                  <a:schemeClr val="accent5">
+                    <a:lumMod val="50000"/>
+                  </a:schemeClr>
+                </a:solidFill>
+                <a:effectLst>
+                  <a:reflection blurRad="127000" stA="26000" endPos="37000" dist="50800" dir="5400000" sy="-100000" algn="bl" rotWithShape="0"/>
+                </a:effectLst>
+                <a:latin typeface="Century Gothic" panose="020B0502020202020204" pitchFamily="34" charset="0"/>
+              </a:rPr>
+              <a:t>I</a:t>
+            </a:r>
+            <a:r>
+              <a:rPr lang="it-IT" sz="4800" b="1" dirty="0" err="1">
+                <a:solidFill>
+                  <a:schemeClr val="accent5">
+                    <a:lumMod val="50000"/>
+                  </a:schemeClr>
+                </a:solidFill>
+                <a:effectLst>
+                  <a:reflection blurRad="127000" stA="26000" endPos="37000" dist="50800" dir="5400000" sy="-100000" algn="bl" rotWithShape="0"/>
+                </a:effectLst>
+                <a:latin typeface="Century Gothic" panose="020B0502020202020204" pitchFamily="34" charset="0"/>
+              </a:rPr>
+              <a:t>nterfaces</a:t>
+            </a:r>
+            <a:endParaRPr lang="it-IT" sz="4800" b="1" dirty="0">
+              <a:solidFill>
+                <a:schemeClr val="accent5">
+                  <a:lumMod val="50000"/>
+                </a:schemeClr>
+              </a:solidFill>
+              <a:effectLst>
+                <a:reflection blurRad="127000" stA="26000" endPos="37000" dist="50800" dir="5400000" sy="-100000" algn="bl" rotWithShape="0"/>
+              </a:effectLst>
+              <a:latin typeface="Century Gothic" panose="020B0502020202020204" pitchFamily="34" charset="0"/>
+            </a:endParaRPr>
+          </a:p>
+        </p:txBody>
+      </p:sp>
+      <p:sp>
+        <p:nvSpPr>
+          <p:cNvPr id="3" name="Segnaposto contenuto 2"/>
+          <p:cNvSpPr>
+            <a:spLocks noGrp="1"/>
+          </p:cNvSpPr>
+          <p:nvPr>
+            <p:ph idx="1"/>
+          </p:nvPr>
+        </p:nvSpPr>
+        <p:spPr>
+          <a:xfrm>
+            <a:off x="838200" y="1175437"/>
+            <a:ext cx="11185478" cy="5861714"/>
+          </a:xfrm>
+        </p:spPr>
+        <p:txBody>
+          <a:bodyPr>
+            <a:normAutofit fontScale="92500" lnSpcReduction="10000"/>
+          </a:bodyPr>
+          <a:lstStyle/>
+          <a:p>
+            <a:r>
+              <a:rPr lang="en-GB" sz="3000" b="1" dirty="0" err="1" smtClean="0">
+                <a:solidFill>
+                  <a:schemeClr val="accent5">
+                    <a:lumMod val="75000"/>
+                  </a:schemeClr>
+                </a:solidFill>
+              </a:rPr>
+              <a:t>PastRequestsInterface</a:t>
+            </a:r>
+            <a:endParaRPr lang="en-GB" b="1" dirty="0" smtClean="0">
+              <a:solidFill>
+                <a:schemeClr val="accent5">
+                  <a:lumMod val="75000"/>
+                </a:schemeClr>
+              </a:solidFill>
+            </a:endParaRPr>
+          </a:p>
+          <a:p>
+            <a:pPr lvl="1"/>
+            <a:r>
+              <a:rPr lang="en-GB" sz="2600" dirty="0"/>
+              <a:t>void </a:t>
+            </a:r>
+            <a:r>
+              <a:rPr lang="en-GB" sz="2600" dirty="0" err="1"/>
+              <a:t>storeRequest</a:t>
+            </a:r>
+            <a:r>
+              <a:rPr lang="en-GB" sz="2600" dirty="0"/>
+              <a:t>(</a:t>
+            </a:r>
+            <a:r>
+              <a:rPr lang="en-GB" sz="2600" dirty="0" err="1"/>
+              <a:t>RegisteredRequest</a:t>
+            </a:r>
+            <a:r>
+              <a:rPr lang="en-GB" sz="2600" dirty="0"/>
+              <a:t> r)</a:t>
+            </a:r>
+            <a:endParaRPr lang="it-IT" sz="2600" dirty="0"/>
+          </a:p>
+          <a:p>
+            <a:pPr lvl="1"/>
+            <a:r>
+              <a:rPr lang="en-GB" sz="2600" dirty="0"/>
+              <a:t>void </a:t>
+            </a:r>
+            <a:r>
+              <a:rPr lang="en-GB" sz="2600" dirty="0" err="1"/>
+              <a:t>storeReservation</a:t>
+            </a:r>
+            <a:r>
+              <a:rPr lang="en-GB" sz="2600" dirty="0"/>
+              <a:t>(</a:t>
+            </a:r>
+            <a:r>
+              <a:rPr lang="en-GB" sz="2600" dirty="0" err="1"/>
+              <a:t>RegisteredReservation</a:t>
+            </a:r>
+            <a:r>
+              <a:rPr lang="en-GB" sz="2600" dirty="0"/>
+              <a:t>)</a:t>
+            </a:r>
+            <a:endParaRPr lang="it-IT" sz="2600" dirty="0"/>
+          </a:p>
+          <a:p>
+            <a:pPr lvl="1"/>
+            <a:r>
+              <a:rPr lang="en-GB" sz="2600" dirty="0"/>
+              <a:t>void </a:t>
+            </a:r>
+            <a:r>
+              <a:rPr lang="en-GB" sz="2600" dirty="0" err="1"/>
+              <a:t>lookForListOfRequests</a:t>
+            </a:r>
+            <a:r>
+              <a:rPr lang="en-GB" sz="2600" dirty="0"/>
+              <a:t>(String username</a:t>
+            </a:r>
+            <a:r>
+              <a:rPr lang="en-GB" sz="2600" dirty="0" smtClean="0"/>
+              <a:t>)</a:t>
+            </a:r>
+            <a:endParaRPr lang="en-GB" sz="2600" b="1" dirty="0" smtClean="0"/>
+          </a:p>
+          <a:p>
+            <a:pPr marL="0" indent="0">
+              <a:buNone/>
+            </a:pPr>
+            <a:r>
+              <a:rPr lang="en-GB" b="1" dirty="0"/>
+              <a:t/>
+            </a:r>
+            <a:br>
+              <a:rPr lang="en-GB" b="1" dirty="0"/>
+            </a:br>
+            <a:endParaRPr lang="en-GB" b="1" dirty="0"/>
+          </a:p>
+          <a:p>
+            <a:r>
+              <a:rPr lang="en-GB" sz="3000" b="1" dirty="0" err="1" smtClean="0">
+                <a:solidFill>
+                  <a:schemeClr val="accent5">
+                    <a:lumMod val="75000"/>
+                  </a:schemeClr>
+                </a:solidFill>
+              </a:rPr>
+              <a:t>ViewInterface</a:t>
+            </a:r>
+            <a:endParaRPr lang="en-GB" b="1" dirty="0">
+              <a:solidFill>
+                <a:schemeClr val="accent5">
+                  <a:lumMod val="75000"/>
+                </a:schemeClr>
+              </a:solidFill>
+            </a:endParaRPr>
+          </a:p>
+          <a:p>
+            <a:pPr lvl="1"/>
+            <a:r>
+              <a:rPr lang="en-GB" sz="2600" dirty="0" smtClean="0"/>
+              <a:t>void </a:t>
+            </a:r>
+            <a:r>
+              <a:rPr lang="en-GB" sz="2600" dirty="0" err="1"/>
+              <a:t>createHome</a:t>
+            </a:r>
+            <a:r>
+              <a:rPr lang="en-GB" sz="2600" dirty="0"/>
+              <a:t>()</a:t>
+            </a:r>
+            <a:endParaRPr lang="it-IT" sz="2600" dirty="0"/>
+          </a:p>
+          <a:p>
+            <a:pPr lvl="1"/>
+            <a:r>
+              <a:rPr lang="en-GB" sz="2600" dirty="0"/>
+              <a:t>void </a:t>
+            </a:r>
+            <a:r>
+              <a:rPr lang="en-GB" sz="2600" dirty="0" err="1"/>
+              <a:t>createPersonalAreaHome</a:t>
+            </a:r>
+            <a:r>
+              <a:rPr lang="en-GB" sz="2600" dirty="0"/>
+              <a:t>(Class </a:t>
+            </a:r>
+            <a:r>
+              <a:rPr lang="en-GB" sz="2600" dirty="0" err="1"/>
+              <a:t>typeOfUser</a:t>
+            </a:r>
+            <a:r>
+              <a:rPr lang="en-GB" sz="2600" dirty="0"/>
+              <a:t>)</a:t>
+            </a:r>
+            <a:endParaRPr lang="it-IT" sz="2600" dirty="0"/>
+          </a:p>
+          <a:p>
+            <a:pPr lvl="1"/>
+            <a:r>
+              <a:rPr lang="en-GB" sz="2600" dirty="0"/>
+              <a:t>void </a:t>
+            </a:r>
+            <a:r>
+              <a:rPr lang="en-GB" sz="2600" dirty="0" err="1"/>
+              <a:t>createNewRequestPage</a:t>
+            </a:r>
+            <a:r>
+              <a:rPr lang="en-GB" sz="2600" dirty="0"/>
+              <a:t>()</a:t>
+            </a:r>
+            <a:endParaRPr lang="it-IT" sz="2600" dirty="0"/>
+          </a:p>
+          <a:p>
+            <a:pPr lvl="1"/>
+            <a:r>
+              <a:rPr lang="en-GB" sz="2600" dirty="0"/>
+              <a:t>void </a:t>
+            </a:r>
+            <a:r>
+              <a:rPr lang="en-GB" sz="2600" dirty="0" err="1"/>
+              <a:t>createNewReservationPage</a:t>
+            </a:r>
+            <a:r>
+              <a:rPr lang="en-GB" sz="2600" dirty="0"/>
+              <a:t>()</a:t>
+            </a:r>
+            <a:endParaRPr lang="it-IT" sz="2600" dirty="0"/>
+          </a:p>
+          <a:p>
+            <a:pPr lvl="1"/>
+            <a:r>
+              <a:rPr lang="en-GB" sz="2600" dirty="0"/>
+              <a:t>void </a:t>
+            </a:r>
+            <a:r>
+              <a:rPr lang="en-GB" sz="2600" dirty="0" err="1"/>
+              <a:t>createWaitingPage</a:t>
+            </a:r>
+            <a:r>
+              <a:rPr lang="en-GB" sz="2600" dirty="0"/>
+              <a:t>()</a:t>
+            </a:r>
+            <a:endParaRPr lang="it-IT" sz="2600" dirty="0"/>
+          </a:p>
+          <a:p>
+            <a:pPr lvl="1"/>
+            <a:r>
+              <a:rPr lang="en-GB" sz="2600" dirty="0"/>
+              <a:t>void </a:t>
+            </a:r>
+            <a:r>
+              <a:rPr lang="en-GB" sz="2600" dirty="0" err="1"/>
+              <a:t>createEnqueuedRequestPage</a:t>
+            </a:r>
+            <a:r>
+              <a:rPr lang="en-GB" sz="2600" dirty="0"/>
+              <a:t>()</a:t>
+            </a:r>
+            <a:endParaRPr lang="it-IT" sz="2600" dirty="0"/>
+          </a:p>
+          <a:p>
+            <a:pPr lvl="1"/>
+            <a:r>
+              <a:rPr lang="en-GB" sz="2600" dirty="0"/>
+              <a:t>void </a:t>
+            </a:r>
+            <a:r>
+              <a:rPr lang="en-GB" sz="2600" dirty="0" err="1"/>
+              <a:t>askConfirmation</a:t>
+            </a:r>
+            <a:r>
+              <a:rPr lang="en-GB" sz="2600" dirty="0"/>
+              <a:t>(String </a:t>
+            </a:r>
+            <a:r>
+              <a:rPr lang="en-GB" sz="2600" dirty="0" err="1"/>
+              <a:t>taxiDriverUsername</a:t>
+            </a:r>
+            <a:r>
+              <a:rPr lang="en-GB" sz="2600" dirty="0"/>
+              <a:t>, Position </a:t>
+            </a:r>
+            <a:r>
+              <a:rPr lang="en-GB" sz="2600" dirty="0" err="1"/>
+              <a:t>pos</a:t>
+            </a:r>
+            <a:r>
+              <a:rPr lang="en-GB" sz="2600" dirty="0"/>
+              <a:t>)</a:t>
+            </a:r>
+            <a:endParaRPr lang="it-IT" sz="2600" dirty="0"/>
+          </a:p>
+          <a:p>
+            <a:pPr lvl="1"/>
+            <a:r>
+              <a:rPr lang="en-GB" sz="2600" dirty="0"/>
+              <a:t>void </a:t>
+            </a:r>
+            <a:r>
+              <a:rPr lang="en-GB" sz="2600" dirty="0" err="1"/>
+              <a:t>notifyTaxiId</a:t>
+            </a:r>
+            <a:r>
+              <a:rPr lang="en-GB" sz="2600" dirty="0"/>
+              <a:t>(String id</a:t>
+            </a:r>
+            <a:r>
+              <a:rPr lang="en-GB" sz="2600" dirty="0" smtClean="0"/>
+              <a:t>)</a:t>
+            </a:r>
+            <a:endParaRPr lang="it-IT" sz="2600" dirty="0"/>
+          </a:p>
+        </p:txBody>
+      </p:sp>
+    </p:spTree>
+    <p:extLst>
+      <p:ext uri="{BB962C8B-B14F-4D97-AF65-F5344CB8AC3E}">
+        <p14:creationId xmlns:p14="http://schemas.microsoft.com/office/powerpoint/2010/main" val="1839407806"/>
+      </p:ext>
+    </p:extLst>
+  </p:cSld>
+  <p:clrMapOvr>
+    <a:masterClrMapping/>
+  </p:clrMapOvr>
+  <mc:AlternateContent xmlns:mc="http://schemas.openxmlformats.org/markup-compatibility/2006">
+    <mc:Choice xmlns:p14="http://schemas.microsoft.com/office/powerpoint/2010/main" Requires="p14">
+      <p:transition p14:dur="100">
+        <p:cut/>
+      </p:transition>
+    </mc:Choice>
+    <mc:Fallback>
+      <p:transition>
+        <p:cut/>
+      </p:transition>
+    </mc:Fallback>
+  </mc:AlternateContent>
+  <p:timing>
+    <p:tnLst>
+      <p:par>
+        <p:cTn id="1" dur="indefinite" restart="never" nodeType="tmRoot"/>
+      </p:par>
+    </p:tnLst>
+  </p:timing>
+</p:sld>
+</file>
+
+<file path=ppt/slides/slide23.xml><?xml version="1.0" encoding="utf-8"?>
+<p:sld xmlns:a="http://schemas.openxmlformats.org/drawingml/2006/main" xmlns:r="http://schemas.openxmlformats.org/officeDocument/2006/relationships" xmlns:p="http://schemas.openxmlformats.org/presentationml/2006/main">
+  <p:cSld>
+    <p:spTree>
+      <p:nvGrpSpPr>
+        <p:cNvPr id="1" name=""/>
+        <p:cNvGrpSpPr/>
+        <p:nvPr/>
+      </p:nvGrpSpPr>
+      <p:grpSpPr>
+        <a:xfrm>
+          <a:off x="0" y="0"/>
+          <a:ext cx="0" cy="0"/>
+          <a:chOff x="0" y="0"/>
+          <a:chExt cx="0" cy="0"/>
+        </a:xfrm>
+      </p:grpSpPr>
+      <p:sp>
+        <p:nvSpPr>
+          <p:cNvPr id="2" name="Titolo 1"/>
+          <p:cNvSpPr>
+            <a:spLocks noGrp="1"/>
+          </p:cNvSpPr>
+          <p:nvPr>
+            <p:ph type="title"/>
+          </p:nvPr>
+        </p:nvSpPr>
+        <p:spPr/>
+        <p:txBody>
+          <a:bodyPr>
+            <a:normAutofit fontScale="90000"/>
+          </a:bodyPr>
+          <a:lstStyle/>
+          <a:p>
+            <a:r>
+              <a:rPr lang="en-GB" sz="4800" b="1" dirty="0">
+                <a:solidFill>
+                  <a:schemeClr val="accent5">
+                    <a:lumMod val="75000"/>
+                  </a:schemeClr>
+                </a:solidFill>
+                <a:latin typeface="Century Gothic" panose="020B0502020202020204" pitchFamily="34" charset="0"/>
+              </a:rPr>
+              <a:t>Selected architectural styles and </a:t>
+            </a:r>
+            <a:r>
+              <a:rPr lang="en-GB" sz="4800" b="1" dirty="0" smtClean="0">
+                <a:solidFill>
+                  <a:schemeClr val="accent5">
+                    <a:lumMod val="75000"/>
+                  </a:schemeClr>
+                </a:solidFill>
+                <a:latin typeface="Century Gothic" panose="020B0502020202020204" pitchFamily="34" charset="0"/>
+              </a:rPr>
+              <a:t>patterns </a:t>
+            </a:r>
+            <a:r>
+              <a:rPr lang="en-GB" sz="5300" b="1" dirty="0" smtClean="0">
+                <a:solidFill>
+                  <a:srgbClr val="FF0000"/>
+                </a:solidFill>
+                <a:latin typeface="Century Gothic" panose="020B0502020202020204" pitchFamily="34" charset="0"/>
+              </a:rPr>
+              <a:t>MI SA CHE  è RIPETIZIONE</a:t>
+            </a:r>
+            <a:endParaRPr lang="it-IT" sz="4800" dirty="0">
+              <a:solidFill>
+                <a:srgbClr val="FF0000"/>
+              </a:solidFill>
+              <a:latin typeface="Century Gothic" panose="020B0502020202020204" pitchFamily="34" charset="0"/>
+            </a:endParaRPr>
+          </a:p>
+        </p:txBody>
+      </p:sp>
+      <p:sp>
+        <p:nvSpPr>
+          <p:cNvPr id="3" name="Segnaposto contenuto 2"/>
+          <p:cNvSpPr>
+            <a:spLocks noGrp="1"/>
+          </p:cNvSpPr>
+          <p:nvPr>
+            <p:ph idx="1"/>
+          </p:nvPr>
+        </p:nvSpPr>
+        <p:spPr/>
+        <p:txBody>
+          <a:bodyPr>
+            <a:normAutofit/>
+          </a:bodyPr>
+          <a:lstStyle/>
+          <a:p>
+            <a:pPr marL="0" indent="0">
+              <a:buNone/>
+            </a:pPr>
+            <a:r>
+              <a:rPr lang="en-GB" dirty="0" smtClean="0"/>
+              <a:t>We </a:t>
+            </a:r>
+            <a:r>
+              <a:rPr lang="en-GB" dirty="0"/>
+              <a:t>selected the </a:t>
+            </a:r>
+            <a:r>
+              <a:rPr lang="en-GB" b="1" dirty="0"/>
+              <a:t>MVC</a:t>
+            </a:r>
+            <a:r>
+              <a:rPr lang="en-GB" dirty="0"/>
+              <a:t> architectural pattern. It implies he division of the whole application in three subsystems each one with a specific scope:</a:t>
+            </a:r>
+            <a:endParaRPr lang="it-IT" dirty="0"/>
+          </a:p>
+          <a:p>
+            <a:pPr lvl="0"/>
+            <a:r>
+              <a:rPr lang="en-GB" b="1" dirty="0"/>
+              <a:t>Model</a:t>
+            </a:r>
+            <a:r>
+              <a:rPr lang="en-GB" dirty="0"/>
+              <a:t>: it models the data used by the system and the state of the application. We split it into two parts, basing on the type of data:</a:t>
+            </a:r>
+            <a:endParaRPr lang="it-IT" dirty="0"/>
+          </a:p>
+          <a:p>
+            <a:pPr lvl="1"/>
+            <a:r>
+              <a:rPr lang="en-GB" b="1" dirty="0"/>
+              <a:t>Accounting: </a:t>
+            </a:r>
+            <a:r>
+              <a:rPr lang="en-GB" dirty="0"/>
+              <a:t>it stores data permanently and so it makes use of the database;</a:t>
+            </a:r>
+            <a:endParaRPr lang="it-IT" dirty="0"/>
+          </a:p>
+          <a:p>
+            <a:pPr lvl="1"/>
+            <a:r>
+              <a:rPr lang="en-GB" b="1" dirty="0"/>
+              <a:t>Requests Queue Manager: </a:t>
+            </a:r>
+            <a:r>
+              <a:rPr lang="en-GB" dirty="0"/>
+              <a:t>it stores data temporary.</a:t>
+            </a:r>
+            <a:endParaRPr lang="it-IT" dirty="0"/>
+          </a:p>
+          <a:p>
+            <a:pPr lvl="0"/>
+            <a:r>
+              <a:rPr lang="en-GB" b="1" dirty="0"/>
+              <a:t>Controller: </a:t>
+            </a:r>
+            <a:r>
+              <a:rPr lang="en-GB" dirty="0"/>
+              <a:t>it is the part of the application that contains the application logic.</a:t>
+            </a:r>
+            <a:endParaRPr lang="it-IT" dirty="0"/>
+          </a:p>
+          <a:p>
+            <a:pPr lvl="0"/>
+            <a:r>
+              <a:rPr lang="en-GB" b="1" dirty="0"/>
+              <a:t>View:</a:t>
+            </a:r>
+            <a:r>
+              <a:rPr lang="en-GB" dirty="0"/>
+              <a:t> it provides the functionalities that allows the users to interact with the application</a:t>
+            </a:r>
+            <a:endParaRPr lang="it-IT" dirty="0"/>
+          </a:p>
+          <a:p>
+            <a:endParaRPr lang="it-IT" dirty="0"/>
+          </a:p>
+        </p:txBody>
+      </p:sp>
+    </p:spTree>
+    <p:extLst>
+      <p:ext uri="{BB962C8B-B14F-4D97-AF65-F5344CB8AC3E}">
+        <p14:creationId xmlns:p14="http://schemas.microsoft.com/office/powerpoint/2010/main" val="1124439890"/>
       </p:ext>
     </p:extLst>
   </p:cSld>
@@ -13324,49 +14681,8 @@
                   </a:outerShdw>
                 </a:effectLst>
               </a:rPr>
-              <a:t>Few </a:t>
-            </a:r>
-            <a:r>
-              <a:rPr lang="en-GB" sz="2800" dirty="0" smtClean="0">
-                <a:ln w="0">
-                  <a:solidFill>
-                    <a:schemeClr val="tx1">
-                      <a:alpha val="20000"/>
-                    </a:schemeClr>
-                  </a:solidFill>
-                </a:ln>
-                <a:solidFill>
-                  <a:srgbClr val="C00000"/>
-                </a:solidFill>
-                <a:effectLst>
-                  <a:outerShdw blurRad="38100" dist="25400" dir="5400000" algn="ctr" rotWithShape="0">
-                    <a:srgbClr val="6E747A">
-                      <a:alpha val="43000"/>
-                    </a:srgbClr>
-                  </a:outerShdw>
-                </a:effectLst>
-              </a:rPr>
-              <a:t>words and simply</a:t>
-            </a:r>
-            <a:endParaRPr lang="en-GB" sz="2800" dirty="0" smtClean="0">
-              <a:ln w="0">
-                <a:solidFill>
-                  <a:schemeClr val="tx1">
-                    <a:alpha val="20000"/>
-                  </a:schemeClr>
-                </a:solidFill>
-              </a:ln>
-              <a:solidFill>
-                <a:srgbClr val="C00000"/>
-              </a:solidFill>
-              <a:effectLst>
-                <a:outerShdw blurRad="38100" dist="25400" dir="5400000" algn="ctr" rotWithShape="0">
-                  <a:srgbClr val="6E747A">
-                    <a:alpha val="43000"/>
-                  </a:srgbClr>
-                </a:outerShdw>
-              </a:effectLst>
-            </a:endParaRPr>
+              <a:t>Few words and simply</a:t>
+            </a:r>
           </a:p>
           <a:p>
             <a:pPr marL="765175" indent="-488950" algn="l">
@@ -14176,31 +15492,6 @@
               </a:rPr>
               <a:t>The Leading Idea</a:t>
             </a:r>
-            <a:endParaRPr lang="en-GB" sz="7200" b="1" dirty="0" smtClean="0">
-              <a:ln w="19050">
-                <a:solidFill>
-                  <a:schemeClr val="tx1"/>
-                </a:solidFill>
-              </a:ln>
-              <a:gradFill>
-                <a:gsLst>
-                  <a:gs pos="0">
-                    <a:srgbClr val="A51502"/>
-                  </a:gs>
-                  <a:gs pos="75000">
-                    <a:srgbClr val="FF0000"/>
-                  </a:gs>
-                  <a:gs pos="100000">
-                    <a:srgbClr val="DE918F"/>
-                  </a:gs>
-                </a:gsLst>
-                <a:lin ang="5400000"/>
-              </a:gradFill>
-              <a:effectLst>
-                <a:reflection blurRad="101600" stA="28000" endPos="35500" dist="12700" dir="5400000" sy="-90000" algn="bl" rotWithShape="0"/>
-              </a:effectLst>
-              <a:latin typeface="+mn-lt"/>
-            </a:endParaRPr>
           </a:p>
         </p:txBody>
       </p:sp>
@@ -15392,25 +16683,6 @@
               </a:rPr>
               <a:t>G1</a:t>
             </a:r>
-            <a:endParaRPr lang="en-GB" sz="3200" dirty="0" smtClean="0">
-              <a:ln w="0">
-                <a:solidFill>
-                  <a:schemeClr val="tx1">
-                    <a:alpha val="20000"/>
-                  </a:schemeClr>
-                </a:solidFill>
-              </a:ln>
-              <a:solidFill>
-                <a:srgbClr val="FF0000"/>
-              </a:solidFill>
-              <a:effectLst>
-                <a:outerShdw blurRad="38100" dist="25400" dir="5400000" algn="ctr" rotWithShape="0">
-                  <a:srgbClr val="6E747A">
-                    <a:alpha val="43000"/>
-                  </a:srgbClr>
-                </a:outerShdw>
-              </a:effectLst>
-            </a:endParaRPr>
           </a:p>
           <a:p>
             <a:pPr algn="ctr">

</xml_diff>

<commit_message>
error in presentation immages
</commit_message>
<xml_diff>
--- a/All/final presentation/Final presentation.pptx
+++ b/All/final presentation/Final presentation.pptx
@@ -30,10 +30,11 @@
     <p:sldId id="278" r:id="rId24"/>
     <p:sldId id="284" r:id="rId25"/>
     <p:sldId id="280" r:id="rId26"/>
-    <p:sldId id="285" r:id="rId27"/>
-    <p:sldId id="281" r:id="rId28"/>
-    <p:sldId id="283" r:id="rId29"/>
-    <p:sldId id="282" r:id="rId30"/>
+    <p:sldId id="286" r:id="rId27"/>
+    <p:sldId id="285" r:id="rId28"/>
+    <p:sldId id="281" r:id="rId29"/>
+    <p:sldId id="283" r:id="rId30"/>
+    <p:sldId id="282" r:id="rId31"/>
   </p:sldIdLst>
   <p:sldSz cx="12192000" cy="6858000"/>
   <p:notesSz cx="6858000" cy="9144000"/>
@@ -272,7 +273,7 @@
             <a:fld id="{5923F103-BC34-4FE4-A40E-EDDEECFDA5D0}" type="datetimeFigureOut">
               <a:rPr lang="en-US" smtClean="0"/>
               <a:pPr/>
-              <a:t>2/6/16</a:t>
+              <a:t>2/7/2016</a:t>
             </a:fld>
             <a:endParaRPr lang="en-US" dirty="0"/>
           </a:p>
@@ -320,7 +321,7 @@
             <a:fld id="{D57F1E4F-1CFF-5643-939E-217C01CDF565}" type="slidenum">
               <a:rPr lang="en-US" smtClean="0"/>
               <a:pPr/>
-              <a:t>‹n.›</a:t>
+              <a:t>‹N›</a:t>
             </a:fld>
             <a:endParaRPr lang="en-US" dirty="0"/>
           </a:p>
@@ -448,7 +449,7 @@
           <a:p>
             <a:fld id="{53086D93-FCAC-47E0-A2EE-787E62CA814C}" type="datetimeFigureOut">
               <a:rPr lang="en-US" smtClean="0"/>
-              <a:t>2/6/16</a:t>
+              <a:t>2/7/2016</a:t>
             </a:fld>
             <a:endParaRPr lang="en-US" dirty="0"/>
           </a:p>
@@ -496,7 +497,7 @@
             <a:fld id="{D57F1E4F-1CFF-5643-939E-217C01CDF565}" type="slidenum">
               <a:rPr lang="en-US" smtClean="0"/>
               <a:pPr/>
-              <a:t>‹n.›</a:t>
+              <a:t>‹N›</a:t>
             </a:fld>
             <a:endParaRPr lang="en-US" dirty="0"/>
           </a:p>
@@ -634,7 +635,7 @@
           <a:p>
             <a:fld id="{CDA879A6-0FD0-4734-A311-86BFCA472E6E}" type="datetimeFigureOut">
               <a:rPr lang="en-US" smtClean="0"/>
-              <a:t>2/6/16</a:t>
+              <a:t>2/7/2016</a:t>
             </a:fld>
             <a:endParaRPr lang="en-US" dirty="0"/>
           </a:p>
@@ -682,7 +683,7 @@
             <a:fld id="{D57F1E4F-1CFF-5643-939E-217C01CDF565}" type="slidenum">
               <a:rPr lang="en-US" smtClean="0"/>
               <a:pPr/>
-              <a:t>‹n.›</a:t>
+              <a:t>‹N›</a:t>
             </a:fld>
             <a:endParaRPr lang="en-US" dirty="0"/>
           </a:p>
@@ -810,7 +811,7 @@
           <a:p>
             <a:fld id="{19C9CA7B-DFD4-44B5-8C60-D14B8CD1FB59}" type="datetimeFigureOut">
               <a:rPr lang="en-US" smtClean="0"/>
-              <a:t>2/6/16</a:t>
+              <a:t>2/7/2016</a:t>
             </a:fld>
             <a:endParaRPr lang="en-US" dirty="0"/>
           </a:p>
@@ -858,7 +859,7 @@
             <a:fld id="{D57F1E4F-1CFF-5643-939E-217C01CDF565}" type="slidenum">
               <a:rPr lang="en-US" smtClean="0"/>
               <a:pPr/>
-              <a:t>‹n.›</a:t>
+              <a:t>‹N›</a:t>
             </a:fld>
             <a:endParaRPr lang="en-US" dirty="0"/>
           </a:p>
@@ -1062,7 +1063,7 @@
           <a:p>
             <a:fld id="{F34E6425-0181-43F2-84FC-787E803FD2F8}" type="datetimeFigureOut">
               <a:rPr lang="en-US" smtClean="0"/>
-              <a:t>2/6/16</a:t>
+              <a:t>2/7/2016</a:t>
             </a:fld>
             <a:endParaRPr lang="en-US" dirty="0"/>
           </a:p>
@@ -1110,7 +1111,7 @@
             <a:fld id="{D57F1E4F-1CFF-5643-939E-217C01CDF565}" type="slidenum">
               <a:rPr lang="en-US" smtClean="0"/>
               <a:pPr/>
-              <a:t>‹n.›</a:t>
+              <a:t>‹N›</a:t>
             </a:fld>
             <a:endParaRPr lang="en-US" dirty="0"/>
           </a:p>
@@ -1300,7 +1301,7 @@
           <a:p>
             <a:fld id="{3BDB8791-F1B0-41E7-B7FD-A781E65C4266}" type="datetimeFigureOut">
               <a:rPr lang="en-US" smtClean="0"/>
-              <a:t>2/6/16</a:t>
+              <a:t>2/7/2016</a:t>
             </a:fld>
             <a:endParaRPr lang="en-US" dirty="0"/>
           </a:p>
@@ -1348,7 +1349,7 @@
             <a:fld id="{D57F1E4F-1CFF-5643-939E-217C01CDF565}" type="slidenum">
               <a:rPr lang="en-US" smtClean="0"/>
               <a:pPr/>
-              <a:t>‹n.›</a:t>
+              <a:t>‹N›</a:t>
             </a:fld>
             <a:endParaRPr lang="en-US" dirty="0"/>
           </a:p>
@@ -1673,7 +1674,7 @@
           <a:p>
             <a:fld id="{5FDD63B2-E120-4ED8-B27B-C685F510A5FE}" type="datetimeFigureOut">
               <a:rPr lang="en-US" smtClean="0"/>
-              <a:t>2/6/16</a:t>
+              <a:t>2/7/2016</a:t>
             </a:fld>
             <a:endParaRPr lang="en-US" dirty="0"/>
           </a:p>
@@ -1721,7 +1722,7 @@
             <a:fld id="{D57F1E4F-1CFF-5643-939E-217C01CDF565}" type="slidenum">
               <a:rPr lang="en-US" smtClean="0"/>
               <a:pPr/>
-              <a:t>‹n.›</a:t>
+              <a:t>‹N›</a:t>
             </a:fld>
             <a:endParaRPr lang="en-US" dirty="0"/>
           </a:p>
@@ -1797,7 +1798,7 @@
           <a:p>
             <a:fld id="{7AA18ACC-A947-437B-A130-35BD54FDF1E9}" type="datetimeFigureOut">
               <a:rPr lang="en-US" smtClean="0"/>
-              <a:t>2/6/16</a:t>
+              <a:t>2/7/2016</a:t>
             </a:fld>
             <a:endParaRPr lang="en-US" dirty="0"/>
           </a:p>
@@ -1845,7 +1846,7 @@
             <a:fld id="{D57F1E4F-1CFF-5643-939E-217C01CDF565}" type="slidenum">
               <a:rPr lang="en-US" smtClean="0"/>
               <a:pPr/>
-              <a:t>‹n.›</a:t>
+              <a:t>‹N›</a:t>
             </a:fld>
             <a:endParaRPr lang="en-US" dirty="0"/>
           </a:p>
@@ -1898,7 +1899,7 @@
           <a:p>
             <a:fld id="{7C8D7E02-BCB8-4D50-A234-369438C08659}" type="datetimeFigureOut">
               <a:rPr lang="en-US" smtClean="0"/>
-              <a:t>2/6/16</a:t>
+              <a:t>2/7/2016</a:t>
             </a:fld>
             <a:endParaRPr lang="en-US" dirty="0"/>
           </a:p>
@@ -1946,7 +1947,7 @@
             <a:fld id="{D57F1E4F-1CFF-5643-939E-217C01CDF565}" type="slidenum">
               <a:rPr lang="en-US" smtClean="0"/>
               <a:pPr/>
-              <a:t>‹n.›</a:t>
+              <a:t>‹N›</a:t>
             </a:fld>
             <a:endParaRPr lang="en-US" dirty="0"/>
           </a:p>
@@ -2181,7 +2182,7 @@
           <a:p>
             <a:fld id="{76E86A4C-8E40-4F87-A4F0-01A0687C5742}" type="datetimeFigureOut">
               <a:rPr lang="en-US" smtClean="0"/>
-              <a:t>2/6/16</a:t>
+              <a:t>2/7/2016</a:t>
             </a:fld>
             <a:endParaRPr lang="en-US" dirty="0"/>
           </a:p>
@@ -2229,7 +2230,7 @@
             <a:fld id="{D57F1E4F-1CFF-5643-939E-217C01CDF565}" type="slidenum">
               <a:rPr lang="en-US" smtClean="0"/>
               <a:pPr/>
-              <a:t>‹n.›</a:t>
+              <a:t>‹N›</a:t>
             </a:fld>
             <a:endParaRPr lang="en-US" dirty="0"/>
           </a:p>
@@ -2440,7 +2441,7 @@
           <a:p>
             <a:fld id="{35E72C73-2D91-4E12-BA25-F0AA0C03599B}" type="datetimeFigureOut">
               <a:rPr lang="en-US" smtClean="0"/>
-              <a:t>2/6/16</a:t>
+              <a:t>2/7/2016</a:t>
             </a:fld>
             <a:endParaRPr lang="en-US" dirty="0"/>
           </a:p>
@@ -2488,7 +2489,7 @@
             <a:fld id="{D57F1E4F-1CFF-5643-939E-217C01CDF565}" type="slidenum">
               <a:rPr lang="en-US" smtClean="0"/>
               <a:pPr/>
-              <a:t>‹n.›</a:t>
+              <a:t>‹N›</a:t>
             </a:fld>
             <a:endParaRPr lang="en-US" dirty="0"/>
           </a:p>
@@ -2682,7 +2683,7 @@
           <a:p>
             <a:fld id="{2BE451C3-0FF4-47C4-B829-773ADF60F88C}" type="datetimeFigureOut">
               <a:rPr lang="en-US" smtClean="0"/>
-              <a:t>2/6/16</a:t>
+              <a:t>2/7/2016</a:t>
             </a:fld>
             <a:endParaRPr lang="en-US" dirty="0"/>
           </a:p>
@@ -2766,7 +2767,7 @@
             <a:fld id="{D57F1E4F-1CFF-5643-939E-217C01CDF565}" type="slidenum">
               <a:rPr lang="en-US" smtClean="0"/>
               <a:pPr/>
-              <a:t>‹n.›</a:t>
+              <a:t>‹N›</a:t>
             </a:fld>
             <a:endParaRPr lang="en-US" dirty="0"/>
           </a:p>
@@ -17460,9 +17461,9 @@
                 </a:effectLst>
                 <a:latin typeface="+mn-lt"/>
               </a:rPr>
-              <a:t>Assignment </a:t>
+              <a:t>Assignment 4:</a:t>
             </a:r>
-            <a:r>
+            <a:br>
               <a:rPr lang="en-GB" sz="7200" b="1" dirty="0" smtClean="0">
                 <a:ln w="19050">
                   <a:solidFill>
@@ -17488,65 +17489,9 @@
                 </a:effectLst>
                 <a:latin typeface="+mn-lt"/>
               </a:rPr>
-              <a:t>4:</a:t>
-            </a:r>
-            <a:r>
-              <a:rPr lang="en-GB" sz="7200" b="1" smtClean="0">
-                <a:ln w="19050">
-                  <a:solidFill>
-                    <a:schemeClr val="tx1"/>
-                  </a:solidFill>
-                </a:ln>
-                <a:gradFill>
-                  <a:gsLst>
-                    <a:gs pos="0">
-                      <a:srgbClr val="A51502"/>
-                    </a:gs>
-                    <a:gs pos="75000">
-                      <a:srgbClr val="FF0000"/>
-                    </a:gs>
-                    <a:gs pos="100000">
-                      <a:srgbClr val="DE918F"/>
-                    </a:gs>
-                  </a:gsLst>
-                  <a:lin ang="5400000"/>
-                </a:gradFill>
-                <a:effectLst>
-                  <a:reflection blurRad="101600" stA="28000" endPos="35500" dist="12700" dir="5400000" sy="-90000" algn="bl" rotWithShape="0"/>
-                </a:effectLst>
-                <a:latin typeface="+mn-lt"/>
-              </a:rPr>
-              <a:t/>
-            </a:r>
-            <a:br>
-              <a:rPr lang="en-GB" sz="7200" b="1" smtClean="0">
-                <a:ln w="19050">
-                  <a:solidFill>
-                    <a:schemeClr val="tx1"/>
-                  </a:solidFill>
-                </a:ln>
-                <a:gradFill>
-                  <a:gsLst>
-                    <a:gs pos="0">
-                      <a:srgbClr val="A51502"/>
-                    </a:gs>
-                    <a:gs pos="75000">
-                      <a:srgbClr val="FF0000"/>
-                    </a:gs>
-                    <a:gs pos="100000">
-                      <a:srgbClr val="DE918F"/>
-                    </a:gs>
-                  </a:gsLst>
-                  <a:lin ang="5400000"/>
-                </a:gradFill>
-                <a:effectLst>
-                  <a:reflection blurRad="101600" stA="28000" endPos="35500" dist="12700" dir="5400000" sy="-90000" algn="bl" rotWithShape="0"/>
-                </a:effectLst>
-                <a:latin typeface="+mn-lt"/>
-              </a:rPr>
             </a:br>
             <a:r>
-              <a:rPr lang="en-GB" sz="7200" b="1" smtClean="0">
+              <a:rPr lang="en-GB" sz="7200" b="1" dirty="0" smtClean="0">
                 <a:ln w="19050">
                   <a:solidFill>
                     <a:schemeClr val="tx1"/>
@@ -17604,31 +17549,6 @@
               </a:rPr>
               <a:t>TEST PLAN</a:t>
             </a:r>
-            <a:endParaRPr lang="en-GB" sz="7200" b="1" dirty="0" smtClean="0">
-              <a:ln w="19050">
-                <a:solidFill>
-                  <a:schemeClr val="tx1"/>
-                </a:solidFill>
-              </a:ln>
-              <a:gradFill>
-                <a:gsLst>
-                  <a:gs pos="0">
-                    <a:srgbClr val="A51502"/>
-                  </a:gs>
-                  <a:gs pos="75000">
-                    <a:srgbClr val="FF0000"/>
-                  </a:gs>
-                  <a:gs pos="100000">
-                    <a:srgbClr val="DE918F"/>
-                  </a:gs>
-                </a:gsLst>
-                <a:lin ang="5400000"/>
-              </a:gradFill>
-              <a:effectLst>
-                <a:reflection blurRad="101600" stA="28000" endPos="35500" dist="12700" dir="5400000" sy="-90000" algn="bl" rotWithShape="0"/>
-              </a:effectLst>
-              <a:latin typeface="+mn-lt"/>
-            </a:endParaRPr>
           </a:p>
         </p:txBody>
       </p:sp>
@@ -18723,6 +18643,1236 @@
           <a:chExt cx="0" cy="0"/>
         </a:xfrm>
       </p:grpSpPr>
+      <p:sp>
+        <p:nvSpPr>
+          <p:cNvPr id="2" name="Titolo 1"/>
+          <p:cNvSpPr>
+            <a:spLocks noGrp="1"/>
+          </p:cNvSpPr>
+          <p:nvPr>
+            <p:ph type="title"/>
+          </p:nvPr>
+        </p:nvSpPr>
+        <p:spPr/>
+        <p:txBody>
+          <a:bodyPr>
+            <a:normAutofit/>
+          </a:bodyPr>
+          <a:lstStyle/>
+          <a:p>
+            <a:r>
+              <a:rPr lang="it-IT" sz="7200" b="1" dirty="0" err="1">
+                <a:ln w="19050">
+                  <a:solidFill>
+                    <a:schemeClr val="tx1"/>
+                  </a:solidFill>
+                </a:ln>
+                <a:gradFill>
+                  <a:gsLst>
+                    <a:gs pos="0">
+                      <a:srgbClr val="A51502"/>
+                    </a:gs>
+                    <a:gs pos="75000">
+                      <a:srgbClr val="FF0000"/>
+                    </a:gs>
+                    <a:gs pos="100000">
+                      <a:srgbClr val="DE918F"/>
+                    </a:gs>
+                  </a:gsLst>
+                  <a:lin ang="5400000"/>
+                </a:gradFill>
+                <a:effectLst>
+                  <a:reflection blurRad="101600" stA="28000" endPos="35500" dist="12700" dir="5400000" sy="-90000" algn="bl" rotWithShape="0"/>
+                </a:effectLst>
+                <a:latin typeface="+mn-lt"/>
+              </a:rPr>
+              <a:t>T</a:t>
+            </a:r>
+            <a:r>
+              <a:rPr lang="it-IT" sz="6000" b="1" dirty="0" err="1">
+                <a:ln w="19050">
+                  <a:solidFill>
+                    <a:schemeClr val="tx1"/>
+                  </a:solidFill>
+                </a:ln>
+                <a:gradFill>
+                  <a:gsLst>
+                    <a:gs pos="0">
+                      <a:srgbClr val="A51502"/>
+                    </a:gs>
+                    <a:gs pos="75000">
+                      <a:srgbClr val="FF0000"/>
+                    </a:gs>
+                    <a:gs pos="100000">
+                      <a:srgbClr val="DE918F"/>
+                    </a:gs>
+                  </a:gsLst>
+                  <a:lin ang="5400000"/>
+                </a:gradFill>
+                <a:effectLst>
+                  <a:reflection blurRad="101600" stA="28000" endPos="35500" dist="12700" dir="5400000" sy="-90000" algn="bl" rotWithShape="0"/>
+                </a:effectLst>
+                <a:latin typeface="+mn-lt"/>
+              </a:rPr>
+              <a:t>able</a:t>
+            </a:r>
+            <a:r>
+              <a:rPr lang="it-IT" sz="7200" b="1" dirty="0">
+                <a:ln w="19050">
+                  <a:solidFill>
+                    <a:schemeClr val="tx1"/>
+                  </a:solidFill>
+                </a:ln>
+                <a:gradFill>
+                  <a:gsLst>
+                    <a:gs pos="0">
+                      <a:srgbClr val="A51502"/>
+                    </a:gs>
+                    <a:gs pos="75000">
+                      <a:srgbClr val="FF0000"/>
+                    </a:gs>
+                    <a:gs pos="100000">
+                      <a:srgbClr val="DE918F"/>
+                    </a:gs>
+                  </a:gsLst>
+                  <a:lin ang="5400000"/>
+                </a:gradFill>
+                <a:effectLst>
+                  <a:reflection blurRad="101600" stA="28000" endPos="35500" dist="12700" dir="5400000" sy="-90000" algn="bl" rotWithShape="0"/>
+                </a:effectLst>
+                <a:latin typeface="+mn-lt"/>
+              </a:rPr>
+              <a:t> </a:t>
+            </a:r>
+            <a:r>
+              <a:rPr lang="it-IT" sz="6000" b="1" dirty="0">
+                <a:ln w="19050">
+                  <a:solidFill>
+                    <a:schemeClr val="tx1"/>
+                  </a:solidFill>
+                </a:ln>
+                <a:gradFill>
+                  <a:gsLst>
+                    <a:gs pos="0">
+                      <a:srgbClr val="A51502"/>
+                    </a:gs>
+                    <a:gs pos="75000">
+                      <a:srgbClr val="FF0000"/>
+                    </a:gs>
+                    <a:gs pos="100000">
+                      <a:srgbClr val="DE918F"/>
+                    </a:gs>
+                  </a:gsLst>
+                  <a:lin ang="5400000"/>
+                </a:gradFill>
+                <a:effectLst>
+                  <a:reflection blurRad="101600" stA="28000" endPos="35500" dist="12700" dir="5400000" sy="-90000" algn="bl" rotWithShape="0"/>
+                </a:effectLst>
+                <a:latin typeface="+mn-lt"/>
+              </a:rPr>
+              <a:t>of</a:t>
+            </a:r>
+            <a:r>
+              <a:rPr lang="it-IT" sz="7200" b="1" dirty="0">
+                <a:ln w="19050">
+                  <a:solidFill>
+                    <a:schemeClr val="tx1"/>
+                  </a:solidFill>
+                </a:ln>
+                <a:gradFill>
+                  <a:gsLst>
+                    <a:gs pos="0">
+                      <a:srgbClr val="A51502"/>
+                    </a:gs>
+                    <a:gs pos="75000">
+                      <a:srgbClr val="FF0000"/>
+                    </a:gs>
+                    <a:gs pos="100000">
+                      <a:srgbClr val="DE918F"/>
+                    </a:gs>
+                  </a:gsLst>
+                  <a:lin ang="5400000"/>
+                </a:gradFill>
+                <a:effectLst>
+                  <a:reflection blurRad="101600" stA="28000" endPos="35500" dist="12700" dir="5400000" sy="-90000" algn="bl" rotWithShape="0"/>
+                </a:effectLst>
+                <a:latin typeface="+mn-lt"/>
+              </a:rPr>
+              <a:t> I</a:t>
+            </a:r>
+            <a:r>
+              <a:rPr lang="it-IT" sz="6000" b="1" dirty="0">
+                <a:ln w="19050">
+                  <a:solidFill>
+                    <a:schemeClr val="tx1"/>
+                  </a:solidFill>
+                </a:ln>
+                <a:gradFill>
+                  <a:gsLst>
+                    <a:gs pos="0">
+                      <a:srgbClr val="A51502"/>
+                    </a:gs>
+                    <a:gs pos="75000">
+                      <a:srgbClr val="FF0000"/>
+                    </a:gs>
+                    <a:gs pos="100000">
+                      <a:srgbClr val="DE918F"/>
+                    </a:gs>
+                  </a:gsLst>
+                  <a:lin ang="5400000"/>
+                </a:gradFill>
+                <a:effectLst>
+                  <a:reflection blurRad="101600" stA="28000" endPos="35500" dist="12700" dir="5400000" sy="-90000" algn="bl" rotWithShape="0"/>
+                </a:effectLst>
+                <a:latin typeface="+mn-lt"/>
+              </a:rPr>
+              <a:t>ntegration</a:t>
+            </a:r>
+            <a:endParaRPr lang="it-IT" sz="6000" b="1" dirty="0">
+              <a:ln w="19050">
+                <a:solidFill>
+                  <a:schemeClr val="tx1"/>
+                </a:solidFill>
+              </a:ln>
+              <a:gradFill>
+                <a:gsLst>
+                  <a:gs pos="0">
+                    <a:srgbClr val="A51502"/>
+                  </a:gs>
+                  <a:gs pos="75000">
+                    <a:srgbClr val="FF0000"/>
+                  </a:gs>
+                  <a:gs pos="100000">
+                    <a:srgbClr val="DE918F"/>
+                  </a:gs>
+                </a:gsLst>
+                <a:lin ang="5400000"/>
+              </a:gradFill>
+              <a:effectLst>
+                <a:reflection blurRad="101600" stA="28000" endPos="35500" dist="12700" dir="5400000" sy="-90000" algn="bl" rotWithShape="0"/>
+              </a:effectLst>
+              <a:latin typeface="+mn-lt"/>
+            </a:endParaRPr>
+          </a:p>
+        </p:txBody>
+      </p:sp>
+      <p:graphicFrame>
+        <p:nvGraphicFramePr>
+          <p:cNvPr id="4" name="Segnaposto contenuto 3"/>
+          <p:cNvGraphicFramePr>
+            <a:graphicFrameLocks noGrp="1"/>
+          </p:cNvGraphicFramePr>
+          <p:nvPr>
+            <p:ph idx="1"/>
+            <p:extLst>
+              <p:ext uri="{D42A27DB-BD31-4B8C-83A1-F6EECF244321}">
+                <p14:modId xmlns:p14="http://schemas.microsoft.com/office/powerpoint/2010/main" val="3336690305"/>
+              </p:ext>
+            </p:extLst>
+          </p:nvPr>
+        </p:nvGraphicFramePr>
+        <p:xfrm>
+          <a:off x="592541" y="1704336"/>
+          <a:ext cx="10407555" cy="4339987"/>
+        </p:xfrm>
+        <a:graphic>
+          <a:graphicData uri="http://schemas.openxmlformats.org/drawingml/2006/table">
+            <a:tbl>
+              <a:tblPr firstRow="1" firstCol="1" bandRow="1">
+                <a:tableStyleId>{5C22544A-7EE6-4342-B048-85BDC9FD1C3A}</a:tableStyleId>
+              </a:tblPr>
+              <a:tblGrid>
+                <a:gridCol w="878534"/>
+                <a:gridCol w="4879946"/>
+                <a:gridCol w="3054435"/>
+                <a:gridCol w="1594640"/>
+              </a:tblGrid>
+              <a:tr h="418529">
+                <a:tc>
+                  <a:txBody>
+                    <a:bodyPr/>
+                    <a:lstStyle/>
+                    <a:p>
+                      <a:pPr>
+                        <a:spcAft>
+                          <a:spcPts val="0"/>
+                        </a:spcAft>
+                      </a:pPr>
+                      <a:r>
+                        <a:rPr lang="en-GB" sz="1800" dirty="0">
+                          <a:effectLst/>
+                        </a:rPr>
+                        <a:t>ID</a:t>
+                      </a:r>
+                      <a:endParaRPr lang="it-IT" sz="1800" dirty="0">
+                        <a:effectLst/>
+                        <a:latin typeface="Cambria" panose="02040503050406030204" pitchFamily="18" charset="0"/>
+                        <a:ea typeface="MS Mincho"/>
+                        <a:cs typeface="Times New Roman" panose="02020603050405020304" pitchFamily="18" charset="0"/>
+                      </a:endParaRPr>
+                    </a:p>
+                  </a:txBody>
+                  <a:tcPr marL="68580" marR="68580" marT="0" marB="0" anchor="ctr"/>
+                </a:tc>
+                <a:tc gridSpan="2">
+                  <a:txBody>
+                    <a:bodyPr/>
+                    <a:lstStyle/>
+                    <a:p>
+                      <a:pPr>
+                        <a:spcAft>
+                          <a:spcPts val="0"/>
+                        </a:spcAft>
+                      </a:pPr>
+                      <a:r>
+                        <a:rPr lang="en-GB" sz="1800" dirty="0">
+                          <a:effectLst/>
+                        </a:rPr>
+                        <a:t>Integration </a:t>
+                      </a:r>
+                      <a:r>
+                        <a:rPr lang="en-GB" sz="1800" dirty="0" smtClean="0">
+                          <a:effectLst/>
+                        </a:rPr>
+                        <a:t>Test</a:t>
+                      </a:r>
+                      <a:endParaRPr lang="it-IT" sz="1800" dirty="0">
+                        <a:effectLst/>
+                        <a:latin typeface="Cambria" panose="02040503050406030204" pitchFamily="18" charset="0"/>
+                        <a:ea typeface="MS Mincho"/>
+                        <a:cs typeface="Times New Roman" panose="02020603050405020304" pitchFamily="18" charset="0"/>
+                      </a:endParaRPr>
+                    </a:p>
+                  </a:txBody>
+                  <a:tcPr marL="68580" marR="68580" marT="0" marB="0" anchor="ctr"/>
+                </a:tc>
+                <a:tc hMerge="1">
+                  <a:txBody>
+                    <a:bodyPr/>
+                    <a:lstStyle/>
+                    <a:p>
+                      <a:endParaRPr lang="it-IT"/>
+                    </a:p>
+                  </a:txBody>
+                  <a:tcPr/>
+                </a:tc>
+                <a:tc>
+                  <a:txBody>
+                    <a:bodyPr/>
+                    <a:lstStyle/>
+                    <a:p>
+                      <a:pPr>
+                        <a:spcAft>
+                          <a:spcPts val="0"/>
+                        </a:spcAft>
+                      </a:pPr>
+                      <a:r>
+                        <a:rPr lang="en-GB" sz="1800">
+                          <a:effectLst/>
+                        </a:rPr>
+                        <a:t>Paragraphs</a:t>
+                      </a:r>
+                      <a:endParaRPr lang="it-IT" sz="1800">
+                        <a:effectLst/>
+                        <a:latin typeface="Cambria" panose="02040503050406030204" pitchFamily="18" charset="0"/>
+                        <a:ea typeface="MS Mincho"/>
+                        <a:cs typeface="Times New Roman" panose="02020603050405020304" pitchFamily="18" charset="0"/>
+                      </a:endParaRPr>
+                    </a:p>
+                  </a:txBody>
+                  <a:tcPr marL="68580" marR="68580" marT="0" marB="0" anchor="ctr"/>
+                </a:tc>
+              </a:tr>
+              <a:tr h="418529">
+                <a:tc>
+                  <a:txBody>
+                    <a:bodyPr/>
+                    <a:lstStyle/>
+                    <a:p>
+                      <a:pPr>
+                        <a:spcAft>
+                          <a:spcPts val="0"/>
+                        </a:spcAft>
+                      </a:pPr>
+                      <a:r>
+                        <a:rPr lang="en-GB" sz="1800">
+                          <a:effectLst/>
+                        </a:rPr>
+                        <a:t>I1</a:t>
+                      </a:r>
+                      <a:endParaRPr lang="it-IT" sz="1800">
+                        <a:effectLst/>
+                        <a:latin typeface="Cambria" panose="02040503050406030204" pitchFamily="18" charset="0"/>
+                        <a:ea typeface="MS Mincho"/>
+                        <a:cs typeface="Times New Roman" panose="02020603050405020304" pitchFamily="18" charset="0"/>
+                      </a:endParaRPr>
+                    </a:p>
+                  </a:txBody>
+                  <a:tcPr marL="68580" marR="68580" marT="0" marB="0" anchor="ctr"/>
+                </a:tc>
+                <a:tc gridSpan="2">
+                  <a:txBody>
+                    <a:bodyPr/>
+                    <a:lstStyle/>
+                    <a:p>
+                      <a:pPr>
+                        <a:spcAft>
+                          <a:spcPts val="0"/>
+                        </a:spcAft>
+                      </a:pPr>
+                      <a:r>
+                        <a:rPr lang="en-GB" sz="1800" dirty="0">
+                          <a:effectLst/>
+                        </a:rPr>
+                        <a:t>RequestManager </a:t>
+                      </a:r>
+                      <a:r>
+                        <a:rPr lang="en-GB" sz="1800" dirty="0">
+                          <a:effectLst/>
+                          <a:sym typeface="Wingdings" panose="05000000000000000000" pitchFamily="2" charset="2"/>
+                        </a:rPr>
+                        <a:t></a:t>
+                      </a:r>
+                      <a:r>
+                        <a:rPr lang="en-GB" sz="1800" dirty="0">
+                          <a:effectLst/>
+                        </a:rPr>
+                        <a:t> Authentication</a:t>
+                      </a:r>
+                      <a:endParaRPr lang="it-IT" sz="1800" dirty="0">
+                        <a:effectLst/>
+                        <a:latin typeface="Cambria" panose="02040503050406030204" pitchFamily="18" charset="0"/>
+                        <a:ea typeface="MS Mincho"/>
+                        <a:cs typeface="Times New Roman" panose="02020603050405020304" pitchFamily="18" charset="0"/>
+                      </a:endParaRPr>
+                    </a:p>
+                  </a:txBody>
+                  <a:tcPr marL="68580" marR="68580" marT="0" marB="0" anchor="ctr"/>
+                </a:tc>
+                <a:tc hMerge="1">
+                  <a:txBody>
+                    <a:bodyPr/>
+                    <a:lstStyle/>
+                    <a:p>
+                      <a:endParaRPr lang="it-IT"/>
+                    </a:p>
+                  </a:txBody>
+                  <a:tcPr/>
+                </a:tc>
+                <a:tc>
+                  <a:txBody>
+                    <a:bodyPr/>
+                    <a:lstStyle/>
+                    <a:p>
+                      <a:pPr>
+                        <a:spcAft>
+                          <a:spcPts val="0"/>
+                        </a:spcAft>
+                      </a:pPr>
+                      <a:r>
+                        <a:rPr lang="en-GB" sz="1800">
+                          <a:effectLst/>
+                        </a:rPr>
+                        <a:t>3.1</a:t>
+                      </a:r>
+                      <a:endParaRPr lang="it-IT" sz="1800">
+                        <a:effectLst/>
+                        <a:latin typeface="Cambria" panose="02040503050406030204" pitchFamily="18" charset="0"/>
+                        <a:ea typeface="MS Mincho"/>
+                        <a:cs typeface="Times New Roman" panose="02020603050405020304" pitchFamily="18" charset="0"/>
+                      </a:endParaRPr>
+                    </a:p>
+                  </a:txBody>
+                  <a:tcPr marL="68580" marR="68580" marT="0" marB="0" anchor="ctr"/>
+                </a:tc>
+              </a:tr>
+              <a:tr h="418529">
+                <a:tc>
+                  <a:txBody>
+                    <a:bodyPr/>
+                    <a:lstStyle/>
+                    <a:p>
+                      <a:pPr>
+                        <a:spcAft>
+                          <a:spcPts val="0"/>
+                        </a:spcAft>
+                      </a:pPr>
+                      <a:r>
+                        <a:rPr lang="en-GB" sz="1800">
+                          <a:effectLst/>
+                        </a:rPr>
+                        <a:t>I2</a:t>
+                      </a:r>
+                      <a:endParaRPr lang="it-IT" sz="1800">
+                        <a:effectLst/>
+                        <a:latin typeface="Cambria" panose="02040503050406030204" pitchFamily="18" charset="0"/>
+                        <a:ea typeface="MS Mincho"/>
+                        <a:cs typeface="Times New Roman" panose="02020603050405020304" pitchFamily="18" charset="0"/>
+                      </a:endParaRPr>
+                    </a:p>
+                  </a:txBody>
+                  <a:tcPr marL="68580" marR="68580" marT="0" marB="0" anchor="ctr"/>
+                </a:tc>
+                <a:tc gridSpan="2">
+                  <a:txBody>
+                    <a:bodyPr/>
+                    <a:lstStyle/>
+                    <a:p>
+                      <a:pPr>
+                        <a:spcAft>
+                          <a:spcPts val="0"/>
+                        </a:spcAft>
+                      </a:pPr>
+                      <a:r>
+                        <a:rPr lang="en-GB" sz="1800" dirty="0">
+                          <a:effectLst/>
+                        </a:rPr>
+                        <a:t>RequestManager </a:t>
+                      </a:r>
+                      <a:r>
+                        <a:rPr lang="en-GB" sz="1800" dirty="0">
+                          <a:effectLst/>
+                          <a:sym typeface="Wingdings" panose="05000000000000000000" pitchFamily="2" charset="2"/>
+                        </a:rPr>
+                        <a:t></a:t>
+                      </a:r>
+                      <a:r>
+                        <a:rPr lang="en-GB" sz="1800" dirty="0">
+                          <a:effectLst/>
+                        </a:rPr>
+                        <a:t> </a:t>
+                      </a:r>
+                      <a:r>
+                        <a:rPr lang="en-GB" sz="1800" dirty="0" err="1">
+                          <a:effectLst/>
+                        </a:rPr>
+                        <a:t>RequestQueueManager</a:t>
+                      </a:r>
+                      <a:endParaRPr lang="it-IT" sz="1800" dirty="0">
+                        <a:effectLst/>
+                        <a:latin typeface="Cambria" panose="02040503050406030204" pitchFamily="18" charset="0"/>
+                        <a:ea typeface="MS Mincho"/>
+                        <a:cs typeface="Times New Roman" panose="02020603050405020304" pitchFamily="18" charset="0"/>
+                      </a:endParaRPr>
+                    </a:p>
+                  </a:txBody>
+                  <a:tcPr marL="68580" marR="68580" marT="0" marB="0" anchor="ctr"/>
+                </a:tc>
+                <a:tc hMerge="1">
+                  <a:txBody>
+                    <a:bodyPr/>
+                    <a:lstStyle/>
+                    <a:p>
+                      <a:endParaRPr lang="it-IT"/>
+                    </a:p>
+                  </a:txBody>
+                  <a:tcPr/>
+                </a:tc>
+                <a:tc>
+                  <a:txBody>
+                    <a:bodyPr/>
+                    <a:lstStyle/>
+                    <a:p>
+                      <a:pPr>
+                        <a:spcAft>
+                          <a:spcPts val="0"/>
+                        </a:spcAft>
+                      </a:pPr>
+                      <a:r>
+                        <a:rPr lang="en-GB" sz="1800">
+                          <a:effectLst/>
+                        </a:rPr>
+                        <a:t>3.2</a:t>
+                      </a:r>
+                      <a:endParaRPr lang="it-IT" sz="1800">
+                        <a:effectLst/>
+                        <a:latin typeface="Cambria" panose="02040503050406030204" pitchFamily="18" charset="0"/>
+                        <a:ea typeface="MS Mincho"/>
+                        <a:cs typeface="Times New Roman" panose="02020603050405020304" pitchFamily="18" charset="0"/>
+                      </a:endParaRPr>
+                    </a:p>
+                  </a:txBody>
+                  <a:tcPr marL="68580" marR="68580" marT="0" marB="0" anchor="ctr"/>
+                </a:tc>
+              </a:tr>
+              <a:tr h="418529">
+                <a:tc>
+                  <a:txBody>
+                    <a:bodyPr/>
+                    <a:lstStyle/>
+                    <a:p>
+                      <a:pPr>
+                        <a:spcAft>
+                          <a:spcPts val="0"/>
+                        </a:spcAft>
+                      </a:pPr>
+                      <a:r>
+                        <a:rPr lang="en-GB" sz="1800">
+                          <a:effectLst/>
+                        </a:rPr>
+                        <a:t>I3</a:t>
+                      </a:r>
+                      <a:endParaRPr lang="it-IT" sz="1800">
+                        <a:effectLst/>
+                        <a:latin typeface="Cambria" panose="02040503050406030204" pitchFamily="18" charset="0"/>
+                        <a:ea typeface="MS Mincho"/>
+                        <a:cs typeface="Times New Roman" panose="02020603050405020304" pitchFamily="18" charset="0"/>
+                      </a:endParaRPr>
+                    </a:p>
+                  </a:txBody>
+                  <a:tcPr marL="68580" marR="68580" marT="0" marB="0" anchor="ctr"/>
+                </a:tc>
+                <a:tc gridSpan="2">
+                  <a:txBody>
+                    <a:bodyPr/>
+                    <a:lstStyle/>
+                    <a:p>
+                      <a:pPr>
+                        <a:spcAft>
+                          <a:spcPts val="0"/>
+                        </a:spcAft>
+                      </a:pPr>
+                      <a:r>
+                        <a:rPr lang="en-GB" sz="1800">
+                          <a:effectLst/>
+                        </a:rPr>
+                        <a:t>RequestManager </a:t>
+                      </a:r>
+                      <a:r>
+                        <a:rPr lang="en-GB" sz="1800">
+                          <a:effectLst/>
+                          <a:sym typeface="Wingdings" panose="05000000000000000000" pitchFamily="2" charset="2"/>
+                        </a:rPr>
+                        <a:t></a:t>
+                      </a:r>
+                      <a:r>
+                        <a:rPr lang="en-GB" sz="1800">
+                          <a:effectLst/>
+                        </a:rPr>
+                        <a:t> TaxiQueueManager</a:t>
+                      </a:r>
+                      <a:endParaRPr lang="it-IT" sz="1800">
+                        <a:effectLst/>
+                        <a:latin typeface="Cambria" panose="02040503050406030204" pitchFamily="18" charset="0"/>
+                        <a:ea typeface="MS Mincho"/>
+                        <a:cs typeface="Times New Roman" panose="02020603050405020304" pitchFamily="18" charset="0"/>
+                      </a:endParaRPr>
+                    </a:p>
+                  </a:txBody>
+                  <a:tcPr marL="68580" marR="68580" marT="0" marB="0" anchor="ctr"/>
+                </a:tc>
+                <a:tc hMerge="1">
+                  <a:txBody>
+                    <a:bodyPr/>
+                    <a:lstStyle/>
+                    <a:p>
+                      <a:endParaRPr lang="it-IT"/>
+                    </a:p>
+                  </a:txBody>
+                  <a:tcPr/>
+                </a:tc>
+                <a:tc>
+                  <a:txBody>
+                    <a:bodyPr/>
+                    <a:lstStyle/>
+                    <a:p>
+                      <a:pPr>
+                        <a:spcAft>
+                          <a:spcPts val="0"/>
+                        </a:spcAft>
+                      </a:pPr>
+                      <a:r>
+                        <a:rPr lang="en-GB" sz="1800">
+                          <a:effectLst/>
+                        </a:rPr>
+                        <a:t>3.3</a:t>
+                      </a:r>
+                      <a:endParaRPr lang="it-IT" sz="1800">
+                        <a:effectLst/>
+                        <a:latin typeface="Cambria" panose="02040503050406030204" pitchFamily="18" charset="0"/>
+                        <a:ea typeface="MS Mincho"/>
+                        <a:cs typeface="Times New Roman" panose="02020603050405020304" pitchFamily="18" charset="0"/>
+                      </a:endParaRPr>
+                    </a:p>
+                  </a:txBody>
+                  <a:tcPr marL="68580" marR="68580" marT="0" marB="0" anchor="ctr"/>
+                </a:tc>
+              </a:tr>
+              <a:tr h="418529">
+                <a:tc>
+                  <a:txBody>
+                    <a:bodyPr/>
+                    <a:lstStyle/>
+                    <a:p>
+                      <a:pPr>
+                        <a:spcAft>
+                          <a:spcPts val="0"/>
+                        </a:spcAft>
+                      </a:pPr>
+                      <a:r>
+                        <a:rPr lang="en-GB" sz="1800">
+                          <a:effectLst/>
+                        </a:rPr>
+                        <a:t>I4</a:t>
+                      </a:r>
+                      <a:endParaRPr lang="it-IT" sz="1800">
+                        <a:effectLst/>
+                        <a:latin typeface="Cambria" panose="02040503050406030204" pitchFamily="18" charset="0"/>
+                        <a:ea typeface="MS Mincho"/>
+                        <a:cs typeface="Times New Roman" panose="02020603050405020304" pitchFamily="18" charset="0"/>
+                      </a:endParaRPr>
+                    </a:p>
+                  </a:txBody>
+                  <a:tcPr marL="68580" marR="68580" marT="0" marB="0" anchor="ctr"/>
+                </a:tc>
+                <a:tc gridSpan="2">
+                  <a:txBody>
+                    <a:bodyPr/>
+                    <a:lstStyle/>
+                    <a:p>
+                      <a:pPr>
+                        <a:spcAft>
+                          <a:spcPts val="0"/>
+                        </a:spcAft>
+                      </a:pPr>
+                      <a:r>
+                        <a:rPr lang="en-GB" sz="1800">
+                          <a:effectLst/>
+                        </a:rPr>
+                        <a:t>RequestManager, Authentication </a:t>
+                      </a:r>
+                      <a:r>
+                        <a:rPr lang="en-GB" sz="1800">
+                          <a:effectLst/>
+                          <a:sym typeface="Wingdings" panose="05000000000000000000" pitchFamily="2" charset="2"/>
+                        </a:rPr>
+                        <a:t></a:t>
+                      </a:r>
+                      <a:r>
+                        <a:rPr lang="en-GB" sz="1800">
+                          <a:effectLst/>
+                        </a:rPr>
+                        <a:t> MobileApp</a:t>
+                      </a:r>
+                      <a:endParaRPr lang="it-IT" sz="1800">
+                        <a:effectLst/>
+                        <a:latin typeface="Cambria" panose="02040503050406030204" pitchFamily="18" charset="0"/>
+                        <a:ea typeface="MS Mincho"/>
+                        <a:cs typeface="Times New Roman" panose="02020603050405020304" pitchFamily="18" charset="0"/>
+                      </a:endParaRPr>
+                    </a:p>
+                  </a:txBody>
+                  <a:tcPr marL="68580" marR="68580" marT="0" marB="0" anchor="ctr"/>
+                </a:tc>
+                <a:tc hMerge="1">
+                  <a:txBody>
+                    <a:bodyPr/>
+                    <a:lstStyle/>
+                    <a:p>
+                      <a:endParaRPr lang="it-IT"/>
+                    </a:p>
+                  </a:txBody>
+                  <a:tcPr/>
+                </a:tc>
+                <a:tc>
+                  <a:txBody>
+                    <a:bodyPr/>
+                    <a:lstStyle/>
+                    <a:p>
+                      <a:pPr>
+                        <a:spcAft>
+                          <a:spcPts val="0"/>
+                        </a:spcAft>
+                      </a:pPr>
+                      <a:r>
+                        <a:rPr lang="en-GB" sz="1800">
+                          <a:effectLst/>
+                        </a:rPr>
+                        <a:t>3.4</a:t>
+                      </a:r>
+                      <a:endParaRPr lang="it-IT" sz="1800">
+                        <a:effectLst/>
+                        <a:latin typeface="Cambria" panose="02040503050406030204" pitchFamily="18" charset="0"/>
+                        <a:ea typeface="MS Mincho"/>
+                        <a:cs typeface="Times New Roman" panose="02020603050405020304" pitchFamily="18" charset="0"/>
+                      </a:endParaRPr>
+                    </a:p>
+                  </a:txBody>
+                  <a:tcPr marL="68580" marR="68580" marT="0" marB="0" anchor="ctr"/>
+                </a:tc>
+              </a:tr>
+              <a:tr h="418529">
+                <a:tc>
+                  <a:txBody>
+                    <a:bodyPr/>
+                    <a:lstStyle/>
+                    <a:p>
+                      <a:pPr>
+                        <a:spcAft>
+                          <a:spcPts val="0"/>
+                        </a:spcAft>
+                      </a:pPr>
+                      <a:r>
+                        <a:rPr lang="en-GB" sz="1800">
+                          <a:effectLst/>
+                        </a:rPr>
+                        <a:t>I5</a:t>
+                      </a:r>
+                      <a:endParaRPr lang="it-IT" sz="1800">
+                        <a:effectLst/>
+                        <a:latin typeface="Cambria" panose="02040503050406030204" pitchFamily="18" charset="0"/>
+                        <a:ea typeface="MS Mincho"/>
+                        <a:cs typeface="Times New Roman" panose="02020603050405020304" pitchFamily="18" charset="0"/>
+                      </a:endParaRPr>
+                    </a:p>
+                  </a:txBody>
+                  <a:tcPr marL="68580" marR="68580" marT="0" marB="0" anchor="ctr"/>
+                </a:tc>
+                <a:tc gridSpan="2">
+                  <a:txBody>
+                    <a:bodyPr/>
+                    <a:lstStyle/>
+                    <a:p>
+                      <a:pPr>
+                        <a:spcAft>
+                          <a:spcPts val="0"/>
+                        </a:spcAft>
+                      </a:pPr>
+                      <a:r>
+                        <a:rPr lang="en-GB" sz="1800">
+                          <a:effectLst/>
+                        </a:rPr>
+                        <a:t>RequestManager, Authentication </a:t>
+                      </a:r>
+                      <a:r>
+                        <a:rPr lang="en-GB" sz="1800">
+                          <a:effectLst/>
+                          <a:sym typeface="Wingdings" panose="05000000000000000000" pitchFamily="2" charset="2"/>
+                        </a:rPr>
+                        <a:t></a:t>
+                      </a:r>
+                      <a:r>
+                        <a:rPr lang="en-GB" sz="1800">
+                          <a:effectLst/>
+                        </a:rPr>
+                        <a:t> WebServer</a:t>
+                      </a:r>
+                      <a:endParaRPr lang="it-IT" sz="1800">
+                        <a:effectLst/>
+                        <a:latin typeface="Cambria" panose="02040503050406030204" pitchFamily="18" charset="0"/>
+                        <a:ea typeface="MS Mincho"/>
+                        <a:cs typeface="Times New Roman" panose="02020603050405020304" pitchFamily="18" charset="0"/>
+                      </a:endParaRPr>
+                    </a:p>
+                  </a:txBody>
+                  <a:tcPr marL="68580" marR="68580" marT="0" marB="0" anchor="ctr"/>
+                </a:tc>
+                <a:tc hMerge="1">
+                  <a:txBody>
+                    <a:bodyPr/>
+                    <a:lstStyle/>
+                    <a:p>
+                      <a:endParaRPr lang="it-IT"/>
+                    </a:p>
+                  </a:txBody>
+                  <a:tcPr/>
+                </a:tc>
+                <a:tc>
+                  <a:txBody>
+                    <a:bodyPr/>
+                    <a:lstStyle/>
+                    <a:p>
+                      <a:pPr>
+                        <a:spcAft>
+                          <a:spcPts val="0"/>
+                        </a:spcAft>
+                      </a:pPr>
+                      <a:r>
+                        <a:rPr lang="en-GB" sz="1800">
+                          <a:effectLst/>
+                        </a:rPr>
+                        <a:t>3.5</a:t>
+                      </a:r>
+                      <a:endParaRPr lang="it-IT" sz="1800">
+                        <a:effectLst/>
+                        <a:latin typeface="Cambria" panose="02040503050406030204" pitchFamily="18" charset="0"/>
+                        <a:ea typeface="MS Mincho"/>
+                        <a:cs typeface="Times New Roman" panose="02020603050405020304" pitchFamily="18" charset="0"/>
+                      </a:endParaRPr>
+                    </a:p>
+                  </a:txBody>
+                  <a:tcPr marL="68580" marR="68580" marT="0" marB="0" anchor="ctr"/>
+                </a:tc>
+              </a:tr>
+              <a:tr h="418529">
+                <a:tc>
+                  <a:txBody>
+                    <a:bodyPr/>
+                    <a:lstStyle/>
+                    <a:p>
+                      <a:pPr>
+                        <a:spcAft>
+                          <a:spcPts val="0"/>
+                        </a:spcAft>
+                      </a:pPr>
+                      <a:r>
+                        <a:rPr lang="en-GB" sz="1800">
+                          <a:effectLst/>
+                        </a:rPr>
+                        <a:t>I6</a:t>
+                      </a:r>
+                      <a:endParaRPr lang="it-IT" sz="1800">
+                        <a:effectLst/>
+                        <a:latin typeface="Cambria" panose="02040503050406030204" pitchFamily="18" charset="0"/>
+                        <a:ea typeface="MS Mincho"/>
+                        <a:cs typeface="Times New Roman" panose="02020603050405020304" pitchFamily="18" charset="0"/>
+                      </a:endParaRPr>
+                    </a:p>
+                  </a:txBody>
+                  <a:tcPr marL="68580" marR="68580" marT="0" marB="0" anchor="ctr"/>
+                </a:tc>
+                <a:tc gridSpan="2">
+                  <a:txBody>
+                    <a:bodyPr/>
+                    <a:lstStyle/>
+                    <a:p>
+                      <a:pPr>
+                        <a:spcAft>
+                          <a:spcPts val="0"/>
+                        </a:spcAft>
+                      </a:pPr>
+                      <a:r>
+                        <a:rPr lang="en-GB" sz="1800">
+                          <a:effectLst/>
+                        </a:rPr>
+                        <a:t>RequestManager </a:t>
+                      </a:r>
+                      <a:r>
+                        <a:rPr lang="en-GB" sz="1800">
+                          <a:effectLst/>
+                          <a:sym typeface="Wingdings" panose="05000000000000000000" pitchFamily="2" charset="2"/>
+                        </a:rPr>
+                        <a:t></a:t>
+                      </a:r>
+                      <a:r>
+                        <a:rPr lang="en-GB" sz="1800">
+                          <a:effectLst/>
+                        </a:rPr>
+                        <a:t> PastRequest</a:t>
+                      </a:r>
+                      <a:endParaRPr lang="it-IT" sz="1800">
+                        <a:effectLst/>
+                        <a:latin typeface="Cambria" panose="02040503050406030204" pitchFamily="18" charset="0"/>
+                        <a:ea typeface="MS Mincho"/>
+                        <a:cs typeface="Times New Roman" panose="02020603050405020304" pitchFamily="18" charset="0"/>
+                      </a:endParaRPr>
+                    </a:p>
+                  </a:txBody>
+                  <a:tcPr marL="68580" marR="68580" marT="0" marB="0" anchor="ctr"/>
+                </a:tc>
+                <a:tc hMerge="1">
+                  <a:txBody>
+                    <a:bodyPr/>
+                    <a:lstStyle/>
+                    <a:p>
+                      <a:endParaRPr lang="it-IT"/>
+                    </a:p>
+                  </a:txBody>
+                  <a:tcPr/>
+                </a:tc>
+                <a:tc>
+                  <a:txBody>
+                    <a:bodyPr/>
+                    <a:lstStyle/>
+                    <a:p>
+                      <a:pPr>
+                        <a:spcAft>
+                          <a:spcPts val="0"/>
+                        </a:spcAft>
+                      </a:pPr>
+                      <a:r>
+                        <a:rPr lang="en-GB" sz="1800">
+                          <a:effectLst/>
+                        </a:rPr>
+                        <a:t>3.6</a:t>
+                      </a:r>
+                      <a:endParaRPr lang="it-IT" sz="1800">
+                        <a:effectLst/>
+                        <a:latin typeface="Cambria" panose="02040503050406030204" pitchFamily="18" charset="0"/>
+                        <a:ea typeface="MS Mincho"/>
+                        <a:cs typeface="Times New Roman" panose="02020603050405020304" pitchFamily="18" charset="0"/>
+                      </a:endParaRPr>
+                    </a:p>
+                  </a:txBody>
+                  <a:tcPr marL="68580" marR="68580" marT="0" marB="0" anchor="ctr"/>
+                </a:tc>
+              </a:tr>
+              <a:tr h="470845">
+                <a:tc>
+                  <a:txBody>
+                    <a:bodyPr/>
+                    <a:lstStyle/>
+                    <a:p>
+                      <a:pPr>
+                        <a:spcAft>
+                          <a:spcPts val="0"/>
+                        </a:spcAft>
+                      </a:pPr>
+                      <a:r>
+                        <a:rPr lang="en-GB" sz="1800">
+                          <a:effectLst/>
+                        </a:rPr>
+                        <a:t>I7</a:t>
+                      </a:r>
+                      <a:endParaRPr lang="it-IT" sz="1800">
+                        <a:effectLst/>
+                        <a:latin typeface="Cambria" panose="02040503050406030204" pitchFamily="18" charset="0"/>
+                        <a:ea typeface="MS Mincho"/>
+                        <a:cs typeface="Times New Roman" panose="02020603050405020304" pitchFamily="18" charset="0"/>
+                      </a:endParaRPr>
+                    </a:p>
+                  </a:txBody>
+                  <a:tcPr marL="68580" marR="68580" marT="0" marB="0" anchor="ctr"/>
+                </a:tc>
+                <a:tc gridSpan="2">
+                  <a:txBody>
+                    <a:bodyPr/>
+                    <a:lstStyle/>
+                    <a:p>
+                      <a:pPr>
+                        <a:spcAft>
+                          <a:spcPts val="0"/>
+                        </a:spcAft>
+                      </a:pPr>
+                      <a:r>
+                        <a:rPr lang="en-GB" sz="1800">
+                          <a:effectLst/>
+                        </a:rPr>
+                        <a:t>Authentication </a:t>
+                      </a:r>
+                      <a:r>
+                        <a:rPr lang="en-GB" sz="1800">
+                          <a:effectLst/>
+                          <a:sym typeface="Wingdings" panose="05000000000000000000" pitchFamily="2" charset="2"/>
+                        </a:rPr>
+                        <a:t></a:t>
+                      </a:r>
+                      <a:r>
+                        <a:rPr lang="en-GB" sz="1800">
+                          <a:effectLst/>
+                        </a:rPr>
+                        <a:t> Users</a:t>
+                      </a:r>
+                      <a:endParaRPr lang="it-IT" sz="1800">
+                        <a:effectLst/>
+                        <a:latin typeface="Cambria" panose="02040503050406030204" pitchFamily="18" charset="0"/>
+                        <a:ea typeface="MS Mincho"/>
+                        <a:cs typeface="Times New Roman" panose="02020603050405020304" pitchFamily="18" charset="0"/>
+                      </a:endParaRPr>
+                    </a:p>
+                  </a:txBody>
+                  <a:tcPr marL="68580" marR="68580" marT="0" marB="0" anchor="ctr"/>
+                </a:tc>
+                <a:tc hMerge="1">
+                  <a:txBody>
+                    <a:bodyPr/>
+                    <a:lstStyle/>
+                    <a:p>
+                      <a:endParaRPr lang="it-IT"/>
+                    </a:p>
+                  </a:txBody>
+                  <a:tcPr/>
+                </a:tc>
+                <a:tc>
+                  <a:txBody>
+                    <a:bodyPr/>
+                    <a:lstStyle/>
+                    <a:p>
+                      <a:pPr>
+                        <a:spcAft>
+                          <a:spcPts val="0"/>
+                        </a:spcAft>
+                      </a:pPr>
+                      <a:r>
+                        <a:rPr lang="en-GB" sz="1800">
+                          <a:effectLst/>
+                        </a:rPr>
+                        <a:t>3.7</a:t>
+                      </a:r>
+                      <a:endParaRPr lang="it-IT" sz="1800">
+                        <a:effectLst/>
+                        <a:latin typeface="Cambria" panose="02040503050406030204" pitchFamily="18" charset="0"/>
+                        <a:ea typeface="MS Mincho"/>
+                        <a:cs typeface="Times New Roman" panose="02020603050405020304" pitchFamily="18" charset="0"/>
+                      </a:endParaRPr>
+                    </a:p>
+                  </a:txBody>
+                  <a:tcPr marL="68580" marR="68580" marT="0" marB="0" anchor="ctr"/>
+                </a:tc>
+              </a:tr>
+              <a:tr h="939439">
+                <a:tc>
+                  <a:txBody>
+                    <a:bodyPr/>
+                    <a:lstStyle/>
+                    <a:p>
+                      <a:pPr>
+                        <a:spcAft>
+                          <a:spcPts val="0"/>
+                        </a:spcAft>
+                      </a:pPr>
+                      <a:r>
+                        <a:rPr lang="en-GB" sz="1800">
+                          <a:effectLst/>
+                        </a:rPr>
+                        <a:t>I8</a:t>
+                      </a:r>
+                      <a:endParaRPr lang="it-IT" sz="1800">
+                        <a:effectLst/>
+                        <a:latin typeface="Cambria" panose="02040503050406030204" pitchFamily="18" charset="0"/>
+                        <a:ea typeface="MS Mincho"/>
+                        <a:cs typeface="Times New Roman" panose="02020603050405020304" pitchFamily="18" charset="0"/>
+                      </a:endParaRPr>
+                    </a:p>
+                  </a:txBody>
+                  <a:tcPr marL="68580" marR="68580" marT="0" marB="0" anchor="ctr"/>
+                </a:tc>
+                <a:tc>
+                  <a:txBody>
+                    <a:bodyPr/>
+                    <a:lstStyle/>
+                    <a:p>
+                      <a:pPr>
+                        <a:spcAft>
+                          <a:spcPts val="0"/>
+                        </a:spcAft>
+                      </a:pPr>
+                      <a:r>
+                        <a:rPr lang="en-GB" sz="1800">
+                          <a:effectLst/>
+                        </a:rPr>
+                        <a:t>RequestManager, Authentication,</a:t>
+                      </a:r>
+                      <a:endParaRPr lang="it-IT" sz="1800">
+                        <a:effectLst/>
+                      </a:endParaRPr>
+                    </a:p>
+                    <a:p>
+                      <a:pPr>
+                        <a:spcAft>
+                          <a:spcPts val="0"/>
+                        </a:spcAft>
+                      </a:pPr>
+                      <a:r>
+                        <a:rPr lang="en-GB" sz="1800">
+                          <a:effectLst/>
+                        </a:rPr>
+                        <a:t>RequestQueueManager, TaxiQueueManager</a:t>
+                      </a:r>
+                      <a:endParaRPr lang="it-IT" sz="1800">
+                        <a:effectLst/>
+                        <a:latin typeface="Cambria" panose="02040503050406030204" pitchFamily="18" charset="0"/>
+                        <a:ea typeface="MS Mincho"/>
+                        <a:cs typeface="Times New Roman" panose="02020603050405020304" pitchFamily="18" charset="0"/>
+                      </a:endParaRPr>
+                    </a:p>
+                  </a:txBody>
+                  <a:tcPr marL="68580" marR="68580" marT="0" marB="0" anchor="ctr"/>
+                </a:tc>
+                <a:tc>
+                  <a:txBody>
+                    <a:bodyPr/>
+                    <a:lstStyle/>
+                    <a:p>
+                      <a:pPr>
+                        <a:spcAft>
+                          <a:spcPts val="0"/>
+                        </a:spcAft>
+                      </a:pPr>
+                      <a:r>
+                        <a:rPr lang="en-GB" sz="1800" dirty="0">
+                          <a:effectLst/>
+                          <a:sym typeface="Wingdings" panose="05000000000000000000" pitchFamily="2" charset="2"/>
+                        </a:rPr>
+                        <a:t></a:t>
+                      </a:r>
+                      <a:r>
+                        <a:rPr lang="en-GB" sz="1800" dirty="0">
+                          <a:effectLst/>
+                        </a:rPr>
+                        <a:t> GoogleMapsAPI</a:t>
+                      </a:r>
+                      <a:endParaRPr lang="it-IT" sz="1800" dirty="0">
+                        <a:effectLst/>
+                        <a:latin typeface="Cambria" panose="02040503050406030204" pitchFamily="18" charset="0"/>
+                        <a:ea typeface="MS Mincho"/>
+                        <a:cs typeface="Times New Roman" panose="02020603050405020304" pitchFamily="18" charset="0"/>
+                      </a:endParaRPr>
+                    </a:p>
+                  </a:txBody>
+                  <a:tcPr marL="68580" marR="68580" marT="0" marB="0" anchor="ctr"/>
+                </a:tc>
+                <a:tc>
+                  <a:txBody>
+                    <a:bodyPr/>
+                    <a:lstStyle/>
+                    <a:p>
+                      <a:pPr>
+                        <a:spcAft>
+                          <a:spcPts val="0"/>
+                        </a:spcAft>
+                      </a:pPr>
+                      <a:r>
+                        <a:rPr lang="en-GB" sz="1800" dirty="0">
+                          <a:effectLst/>
+                        </a:rPr>
+                        <a:t>3.8</a:t>
+                      </a:r>
+                      <a:endParaRPr lang="it-IT" sz="1800" dirty="0">
+                        <a:effectLst/>
+                        <a:latin typeface="Cambria" panose="02040503050406030204" pitchFamily="18" charset="0"/>
+                        <a:ea typeface="MS Mincho"/>
+                        <a:cs typeface="Times New Roman" panose="02020603050405020304" pitchFamily="18" charset="0"/>
+                      </a:endParaRPr>
+                    </a:p>
+                  </a:txBody>
+                  <a:tcPr marL="68580" marR="68580" marT="0" marB="0" anchor="ctr"/>
+                </a:tc>
+              </a:tr>
+            </a:tbl>
+          </a:graphicData>
+        </a:graphic>
+      </p:graphicFrame>
+    </p:spTree>
+    <p:extLst>
+      <p:ext uri="{BB962C8B-B14F-4D97-AF65-F5344CB8AC3E}">
+        <p14:creationId xmlns:p14="http://schemas.microsoft.com/office/powerpoint/2010/main" val="471249337"/>
+      </p:ext>
+    </p:extLst>
+  </p:cSld>
+  <p:clrMapOvr>
+    <a:masterClrMapping/>
+  </p:clrMapOvr>
+</p:sld>
+</file>
+
+<file path=ppt/slides/slide27.xml><?xml version="1.0" encoding="utf-8"?>
+<p:sld xmlns:a="http://schemas.openxmlformats.org/drawingml/2006/main" xmlns:r="http://schemas.openxmlformats.org/officeDocument/2006/relationships" xmlns:p="http://schemas.openxmlformats.org/presentationml/2006/main">
+  <p:cSld>
+    <p:spTree>
+      <p:nvGrpSpPr>
+        <p:cNvPr id="1" name=""/>
+        <p:cNvGrpSpPr/>
+        <p:nvPr/>
+      </p:nvGrpSpPr>
+      <p:grpSpPr>
+        <a:xfrm>
+          <a:off x="0" y="0"/>
+          <a:ext cx="0" cy="0"/>
+          <a:chOff x="0" y="0"/>
+          <a:chExt cx="0" cy="0"/>
+        </a:xfrm>
+      </p:grpSpPr>
       <p:pic>
         <p:nvPicPr>
           <p:cNvPr id="4" name="Immagine 3"/>
@@ -18818,63 +19968,7 @@
                 </a:effectLst>
                 <a:latin typeface="+mn-lt"/>
               </a:rPr>
-              <a:t>Assignment </a:t>
-            </a:r>
-            <a:r>
-              <a:rPr lang="en-GB" sz="7200" b="1" dirty="0" smtClean="0">
-                <a:ln w="19050">
-                  <a:solidFill>
-                    <a:schemeClr val="tx1"/>
-                  </a:solidFill>
-                </a:ln>
-                <a:gradFill>
-                  <a:gsLst>
-                    <a:gs pos="0">
-                      <a:srgbClr val="A51502"/>
-                    </a:gs>
-                    <a:gs pos="75000">
-                      <a:srgbClr val="FF0000"/>
-                    </a:gs>
-                    <a:gs pos="100000">
-                      <a:srgbClr val="DE918F"/>
-                    </a:gs>
-                  </a:gsLst>
-                  <a:lin ang="5400000"/>
-                </a:gradFill>
-                <a:effectLst>
-                  <a:reflection blurRad="101600" stA="28000" endPos="35500" dist="12700" dir="5400000" sy="-90000" algn="bl" rotWithShape="0"/>
-                </a:effectLst>
-                <a:latin typeface="+mn-lt"/>
-              </a:rPr>
-              <a:t>5:</a:t>
-            </a:r>
-            <a:r>
-              <a:rPr lang="en-GB" sz="7200" b="1" dirty="0" smtClean="0">
-                <a:ln w="19050">
-                  <a:solidFill>
-                    <a:schemeClr val="tx1"/>
-                  </a:solidFill>
-                </a:ln>
-                <a:gradFill>
-                  <a:gsLst>
-                    <a:gs pos="0">
-                      <a:srgbClr val="A51502"/>
-                    </a:gs>
-                    <a:gs pos="75000">
-                      <a:srgbClr val="FF0000"/>
-                    </a:gs>
-                    <a:gs pos="100000">
-                      <a:srgbClr val="DE918F"/>
-                    </a:gs>
-                  </a:gsLst>
-                  <a:lin ang="5400000"/>
-                </a:gradFill>
-                <a:effectLst>
-                  <a:reflection blurRad="101600" stA="28000" endPos="35500" dist="12700" dir="5400000" sy="-90000" algn="bl" rotWithShape="0"/>
-                </a:effectLst>
-                <a:latin typeface="+mn-lt"/>
-              </a:rPr>
-              <a:t/>
+              <a:t>Assignment 5:</a:t>
             </a:r>
             <a:br>
               <a:rPr lang="en-GB" sz="7200" b="1" dirty="0" smtClean="0">
@@ -18931,31 +20025,6 @@
               </a:rPr>
               <a:t>PROJECT REPORTING</a:t>
             </a:r>
-            <a:endParaRPr lang="en-GB" sz="7200" b="1" dirty="0" smtClean="0">
-              <a:ln w="19050">
-                <a:solidFill>
-                  <a:schemeClr val="tx1"/>
-                </a:solidFill>
-              </a:ln>
-              <a:gradFill>
-                <a:gsLst>
-                  <a:gs pos="0">
-                    <a:srgbClr val="A51502"/>
-                  </a:gs>
-                  <a:gs pos="75000">
-                    <a:srgbClr val="FF0000"/>
-                  </a:gs>
-                  <a:gs pos="100000">
-                    <a:srgbClr val="DE918F"/>
-                  </a:gs>
-                </a:gsLst>
-                <a:lin ang="5400000"/>
-              </a:gradFill>
-              <a:effectLst>
-                <a:reflection blurRad="101600" stA="28000" endPos="35500" dist="12700" dir="5400000" sy="-90000" algn="bl" rotWithShape="0"/>
-              </a:effectLst>
-              <a:latin typeface="+mn-lt"/>
-            </a:endParaRPr>
           </a:p>
         </p:txBody>
       </p:sp>
@@ -19070,7 +20139,7 @@
 </p:sld>
 </file>
 
-<file path=ppt/slides/slide27.xml><?xml version="1.0" encoding="utf-8"?>
+<file path=ppt/slides/slide28.xml><?xml version="1.0" encoding="utf-8"?>
 <p:sld xmlns:a="http://schemas.openxmlformats.org/drawingml/2006/main" xmlns:r="http://schemas.openxmlformats.org/officeDocument/2006/relationships" xmlns:p="http://schemas.openxmlformats.org/presentationml/2006/main">
   <p:cSld>
     <p:spTree>
@@ -19124,7 +20193,7 @@
         </p:nvSpPr>
         <p:spPr>
           <a:xfrm>
-            <a:off x="1524000" y="-484723"/>
+            <a:off x="1524000" y="465141"/>
             <a:ext cx="9144000" cy="1991762"/>
           </a:xfrm>
           <a:prstGeom prst="rect">
@@ -19133,7 +20202,7 @@
         </p:spPr>
         <p:txBody>
           <a:bodyPr vert="horz" lIns="91440" tIns="45720" rIns="91440" bIns="45720" rtlCol="0" anchor="ctr">
-            <a:normAutofit/>
+            <a:normAutofit lnSpcReduction="10000"/>
           </a:bodyPr>
           <a:lstStyle>
             <a:lvl1pPr algn="l" defTabSz="914400" rtl="0" eaLnBrk="1" latinLnBrk="0" hangingPunct="1">
@@ -19155,7 +20224,6 @@
             </a:lvl1pPr>
           </a:lstStyle>
           <a:p>
-            <a:pPr algn="ctr"/>
             <a:r>
               <a:rPr lang="en-GB" sz="7200" b="1" dirty="0" smtClean="0">
                 <a:ln w="19050">
@@ -19182,8 +20250,63 @@
                 </a:effectLst>
                 <a:latin typeface="+mn-lt"/>
               </a:rPr>
-              <a:t>FUNCTION POINTS</a:t>
+              <a:t>FUNCTION</a:t>
             </a:r>
+          </a:p>
+          <a:p>
+            <a:r>
+              <a:rPr lang="en-GB" sz="7200" b="1" dirty="0" smtClean="0">
+                <a:ln w="19050">
+                  <a:solidFill>
+                    <a:schemeClr val="tx1"/>
+                  </a:solidFill>
+                </a:ln>
+                <a:gradFill>
+                  <a:gsLst>
+                    <a:gs pos="0">
+                      <a:srgbClr val="A51502"/>
+                    </a:gs>
+                    <a:gs pos="75000">
+                      <a:srgbClr val="FF0000"/>
+                    </a:gs>
+                    <a:gs pos="100000">
+                      <a:srgbClr val="DE918F"/>
+                    </a:gs>
+                  </a:gsLst>
+                  <a:lin ang="5400000"/>
+                </a:gradFill>
+                <a:effectLst>
+                  <a:reflection blurRad="101600" stA="28000" endPos="35500" dist="12700" dir="5400000" sy="-90000" algn="bl" rotWithShape="0"/>
+                </a:effectLst>
+                <a:latin typeface="+mn-lt"/>
+              </a:rPr>
+              <a:t>   POINTS</a:t>
+            </a:r>
+            <a:endParaRPr lang="en-GB" sz="7200" b="1" dirty="0" smtClean="0">
+              <a:ln w="19050">
+                <a:solidFill>
+                  <a:schemeClr val="tx1"/>
+                </a:solidFill>
+              </a:ln>
+              <a:gradFill>
+                <a:gsLst>
+                  <a:gs pos="0">
+                    <a:srgbClr val="A51502"/>
+                  </a:gs>
+                  <a:gs pos="75000">
+                    <a:srgbClr val="FF0000"/>
+                  </a:gs>
+                  <a:gs pos="100000">
+                    <a:srgbClr val="DE918F"/>
+                  </a:gs>
+                </a:gsLst>
+                <a:lin ang="5400000"/>
+              </a:gradFill>
+              <a:effectLst>
+                <a:reflection blurRad="101600" stA="28000" endPos="35500" dist="12700" dir="5400000" sy="-90000" algn="bl" rotWithShape="0"/>
+              </a:effectLst>
+              <a:latin typeface="+mn-lt"/>
+            </a:endParaRPr>
           </a:p>
         </p:txBody>
       </p:sp>
@@ -19196,20 +20319,20 @@
           <p:nvPr>
             <p:extLst>
               <p:ext uri="{D42A27DB-BD31-4B8C-83A1-F6EECF244321}">
-                <p14:modId xmlns:p14="http://schemas.microsoft.com/office/powerpoint/2010/main" val="1548754694"/>
+                <p14:modId xmlns:p14="http://schemas.microsoft.com/office/powerpoint/2010/main" val="899197373"/>
               </p:ext>
             </p:extLst>
           </p:nvPr>
         </p:nvGraphicFramePr>
         <p:xfrm>
-          <a:off x="4092427" y="932354"/>
-          <a:ext cx="4007147" cy="5925646"/>
+          <a:off x="6974006" y="26980"/>
+          <a:ext cx="4619395" cy="6831020"/>
         </p:xfrm>
         <a:graphic>
           <a:graphicData uri="http://schemas.openxmlformats.org/presentationml/2006/ole">
             <mc:AlternateContent xmlns:mc="http://schemas.openxmlformats.org/markup-compatibility/2006">
               <mc:Choice xmlns:v="urn:schemas-microsoft-com:vml" Requires="v">
-                <p:oleObj spid="_x0000_s3076" name="Foglio di lavoro" r:id="rId4" imgW="5918200" imgH="8750300" progId="Excel.Sheet.12">
+                <p:oleObj spid="_x0000_s3079" name="Foglio di lavoro" r:id="rId4" imgW="5918200" imgH="8750300" progId="Excel.Sheet.12">
                   <p:embed/>
                 </p:oleObj>
               </mc:Choice>
@@ -19230,8 +20353,8 @@
                     </p:blipFill>
                     <p:spPr>
                       <a:xfrm>
-                        <a:off x="4092427" y="932354"/>
-                        <a:ext cx="4007147" cy="5925646"/>
+                        <a:off x="6974006" y="26980"/>
+                        <a:ext cx="4619395" cy="6831020"/>
                       </a:xfrm>
                       <a:prstGeom prst="rect">
                         <a:avLst/>
@@ -19442,7 +20565,7 @@
 </p:sld>
 </file>
 
-<file path=ppt/slides/slide28.xml><?xml version="1.0" encoding="utf-8"?>
+<file path=ppt/slides/slide29.xml><?xml version="1.0" encoding="utf-8"?>
 <p:sld xmlns:a="http://schemas.openxmlformats.org/drawingml/2006/main" xmlns:r="http://schemas.openxmlformats.org/officeDocument/2006/relationships" xmlns:p="http://schemas.openxmlformats.org/presentationml/2006/main">
   <p:cSld>
     <p:spTree>
@@ -19809,295 +20932,6 @@
     <p:bldLst>
       <p:bldP spid="5" grpId="0"/>
     </p:bldLst>
-  </p:timing>
-</p:sld>
-</file>
-
-<file path=ppt/slides/slide29.xml><?xml version="1.0" encoding="utf-8"?>
-<p:sld xmlns:a="http://schemas.openxmlformats.org/drawingml/2006/main" xmlns:r="http://schemas.openxmlformats.org/officeDocument/2006/relationships" xmlns:p="http://schemas.openxmlformats.org/presentationml/2006/main">
-  <p:cSld>
-    <p:spTree>
-      <p:nvGrpSpPr>
-        <p:cNvPr id="1" name=""/>
-        <p:cNvGrpSpPr/>
-        <p:nvPr/>
-      </p:nvGrpSpPr>
-      <p:grpSpPr>
-        <a:xfrm>
-          <a:off x="0" y="0"/>
-          <a:ext cx="0" cy="0"/>
-          <a:chOff x="0" y="0"/>
-          <a:chExt cx="0" cy="0"/>
-        </a:xfrm>
-      </p:grpSpPr>
-      <p:pic>
-        <p:nvPicPr>
-          <p:cNvPr id="4" name="Immagine 3"/>
-          <p:cNvPicPr>
-            <a:picLocks noChangeAspect="1"/>
-          </p:cNvPicPr>
-          <p:nvPr/>
-        </p:nvPicPr>
-        <p:blipFill>
-          <a:blip r:embed="rId2">
-            <a:alphaModFix amt="9000"/>
-          </a:blip>
-          <a:stretch>
-            <a:fillRect/>
-          </a:stretch>
-        </p:blipFill>
-        <p:spPr>
-          <a:xfrm>
-            <a:off x="-444063" y="2456903"/>
-            <a:ext cx="4716518" cy="4716518"/>
-          </a:xfrm>
-          <a:prstGeom prst="rect">
-            <a:avLst/>
-          </a:prstGeom>
-          <a:effectLst/>
-        </p:spPr>
-      </p:pic>
-      <p:sp>
-        <p:nvSpPr>
-          <p:cNvPr id="5" name="Titolo 1"/>
-          <p:cNvSpPr txBox="1">
-            <a:spLocks/>
-          </p:cNvSpPr>
-          <p:nvPr/>
-        </p:nvSpPr>
-        <p:spPr>
-          <a:xfrm>
-            <a:off x="1524000" y="-484723"/>
-            <a:ext cx="9144000" cy="1991762"/>
-          </a:xfrm>
-          <a:prstGeom prst="rect">
-            <a:avLst/>
-          </a:prstGeom>
-        </p:spPr>
-        <p:txBody>
-          <a:bodyPr vert="horz" lIns="91440" tIns="45720" rIns="91440" bIns="45720" rtlCol="0" anchor="ctr">
-            <a:normAutofit/>
-          </a:bodyPr>
-          <a:lstStyle>
-            <a:lvl1pPr algn="l" defTabSz="914400" rtl="0" eaLnBrk="1" latinLnBrk="0" hangingPunct="1">
-              <a:lnSpc>
-                <a:spcPct val="90000"/>
-              </a:lnSpc>
-              <a:spcBef>
-                <a:spcPct val="0"/>
-              </a:spcBef>
-              <a:buNone/>
-              <a:defRPr sz="4400" kern="1200">
-                <a:solidFill>
-                  <a:schemeClr val="tx1"/>
-                </a:solidFill>
-                <a:latin typeface="+mj-lt"/>
-                <a:ea typeface="+mj-ea"/>
-                <a:cs typeface="+mj-cs"/>
-              </a:defRPr>
-            </a:lvl1pPr>
-          </a:lstStyle>
-          <a:p>
-            <a:pPr algn="ctr"/>
-            <a:r>
-              <a:rPr lang="en-GB" sz="7200" b="1" dirty="0" smtClean="0">
-                <a:ln w="19050">
-                  <a:solidFill>
-                    <a:schemeClr val="tx1"/>
-                  </a:solidFill>
-                </a:ln>
-                <a:gradFill>
-                  <a:gsLst>
-                    <a:gs pos="0">
-                      <a:srgbClr val="A51502"/>
-                    </a:gs>
-                    <a:gs pos="75000">
-                      <a:srgbClr val="FF0000"/>
-                    </a:gs>
-                    <a:gs pos="100000">
-                      <a:srgbClr val="DE918F"/>
-                    </a:gs>
-                  </a:gsLst>
-                  <a:lin ang="5400000"/>
-                </a:gradFill>
-                <a:effectLst>
-                  <a:reflection blurRad="101600" stA="28000" endPos="35500" dist="12700" dir="5400000" sy="-90000" algn="bl" rotWithShape="0"/>
-                </a:effectLst>
-                <a:latin typeface="+mn-lt"/>
-              </a:rPr>
-              <a:t>COCOMO APPROACH</a:t>
-            </a:r>
-          </a:p>
-        </p:txBody>
-      </p:sp>
-      <p:pic>
-        <p:nvPicPr>
-          <p:cNvPr id="8" name="Immagine 7"/>
-          <p:cNvPicPr>
-            <a:picLocks noChangeAspect="1"/>
-          </p:cNvPicPr>
-          <p:nvPr/>
-        </p:nvPicPr>
-        <p:blipFill>
-          <a:blip r:embed="rId3">
-            <a:extLst>
-              <a:ext uri="{28A0092B-C50C-407E-A947-70E740481C1C}">
-                <a14:useLocalDpi xmlns:a14="http://schemas.microsoft.com/office/drawing/2010/main" val="0"/>
-              </a:ext>
-            </a:extLst>
-          </a:blip>
-          <a:stretch>
-            <a:fillRect/>
-          </a:stretch>
-        </p:blipFill>
-        <p:spPr>
-          <a:xfrm>
-            <a:off x="2570217" y="1071176"/>
-            <a:ext cx="7051566" cy="5723323"/>
-          </a:xfrm>
-          <a:prstGeom prst="rect">
-            <a:avLst/>
-          </a:prstGeom>
-        </p:spPr>
-      </p:pic>
-    </p:spTree>
-    <p:extLst>
-      <p:ext uri="{BB962C8B-B14F-4D97-AF65-F5344CB8AC3E}">
-        <p14:creationId xmlns:p14="http://schemas.microsoft.com/office/powerpoint/2010/main" val="610384167"/>
-      </p:ext>
-    </p:extLst>
-  </p:cSld>
-  <p:clrMapOvr>
-    <a:masterClrMapping/>
-  </p:clrMapOvr>
-  <p:timing>
-    <p:tnLst>
-      <p:par>
-        <p:cTn id="1" dur="indefinite" restart="never" nodeType="tmRoot">
-          <p:childTnLst>
-            <p:seq concurrent="1" nextAc="seek">
-              <p:cTn id="2" dur="indefinite" nodeType="mainSeq">
-                <p:childTnLst>
-                  <p:par>
-                    <p:cTn id="3" fill="hold">
-                      <p:stCondLst>
-                        <p:cond delay="indefinite"/>
-                      </p:stCondLst>
-                      <p:childTnLst>
-                        <p:par>
-                          <p:cTn id="4" fill="hold">
-                            <p:stCondLst>
-                              <p:cond delay="0"/>
-                            </p:stCondLst>
-                            <p:childTnLst>
-                              <p:par>
-                                <p:cTn id="5" presetID="53" presetClass="entr" presetSubtype="16" fill="hold" nodeType="clickEffect">
-                                  <p:stCondLst>
-                                    <p:cond delay="0"/>
-                                  </p:stCondLst>
-                                  <p:childTnLst>
-                                    <p:set>
-                                      <p:cBhvr>
-                                        <p:cTn id="6" dur="1" fill="hold">
-                                          <p:stCondLst>
-                                            <p:cond delay="0"/>
-                                          </p:stCondLst>
-                                        </p:cTn>
-                                        <p:tgtEl>
-                                          <p:spTgt spid="8"/>
-                                        </p:tgtEl>
-                                        <p:attrNameLst>
-                                          <p:attrName>style.visibility</p:attrName>
-                                        </p:attrNameLst>
-                                      </p:cBhvr>
-                                      <p:to>
-                                        <p:strVal val="visible"/>
-                                      </p:to>
-                                    </p:set>
-                                    <p:anim calcmode="lin" valueType="num">
-                                      <p:cBhvr>
-                                        <p:cTn id="7" dur="500" fill="hold"/>
-                                        <p:tgtEl>
-                                          <p:spTgt spid="8"/>
-                                        </p:tgtEl>
-                                        <p:attrNameLst>
-                                          <p:attrName>ppt_w</p:attrName>
-                                        </p:attrNameLst>
-                                      </p:cBhvr>
-                                      <p:tavLst>
-                                        <p:tav tm="0">
-                                          <p:val>
-                                            <p:fltVal val="0"/>
-                                          </p:val>
-                                        </p:tav>
-                                        <p:tav tm="100000">
-                                          <p:val>
-                                            <p:strVal val="#ppt_w"/>
-                                          </p:val>
-                                        </p:tav>
-                                      </p:tavLst>
-                                    </p:anim>
-                                    <p:anim calcmode="lin" valueType="num">
-                                      <p:cBhvr>
-                                        <p:cTn id="8" dur="500" fill="hold"/>
-                                        <p:tgtEl>
-                                          <p:spTgt spid="8"/>
-                                        </p:tgtEl>
-                                        <p:attrNameLst>
-                                          <p:attrName>ppt_h</p:attrName>
-                                        </p:attrNameLst>
-                                      </p:cBhvr>
-                                      <p:tavLst>
-                                        <p:tav tm="0">
-                                          <p:val>
-                                            <p:fltVal val="0"/>
-                                          </p:val>
-                                        </p:tav>
-                                        <p:tav tm="100000">
-                                          <p:val>
-                                            <p:strVal val="#ppt_h"/>
-                                          </p:val>
-                                        </p:tav>
-                                      </p:tavLst>
-                                    </p:anim>
-                                    <p:animEffect transition="in" filter="fade">
-                                      <p:cBhvr>
-                                        <p:cTn id="9" dur="500"/>
-                                        <p:tgtEl>
-                                          <p:spTgt spid="8"/>
-                                        </p:tgtEl>
-                                      </p:cBhvr>
-                                    </p:animEffect>
-                                  </p:childTnLst>
-                                </p:cTn>
-                              </p:par>
-                            </p:childTnLst>
-                          </p:cTn>
-                        </p:par>
-                      </p:childTnLst>
-                    </p:cTn>
-                  </p:par>
-                </p:childTnLst>
-              </p:cTn>
-              <p:prevCondLst>
-                <p:cond evt="onPrev" delay="0">
-                  <p:tgtEl>
-                    <p:sldTgt/>
-                  </p:tgtEl>
-                </p:cond>
-              </p:prevCondLst>
-              <p:nextCondLst>
-                <p:cond evt="onNext" delay="0">
-                  <p:tgtEl>
-                    <p:sldTgt/>
-                  </p:tgtEl>
-                </p:cond>
-              </p:nextCondLst>
-            </p:seq>
-          </p:childTnLst>
-        </p:cTn>
-      </p:par>
-    </p:tnLst>
   </p:timing>
 </p:sld>
 </file>
@@ -21738,6 +22572,295 @@
       <p:bldP spid="13" grpId="0"/>
       <p:bldP spid="21" grpId="0"/>
     </p:bldLst>
+  </p:timing>
+</p:sld>
+</file>
+
+<file path=ppt/slides/slide30.xml><?xml version="1.0" encoding="utf-8"?>
+<p:sld xmlns:a="http://schemas.openxmlformats.org/drawingml/2006/main" xmlns:r="http://schemas.openxmlformats.org/officeDocument/2006/relationships" xmlns:p="http://schemas.openxmlformats.org/presentationml/2006/main">
+  <p:cSld>
+    <p:spTree>
+      <p:nvGrpSpPr>
+        <p:cNvPr id="1" name=""/>
+        <p:cNvGrpSpPr/>
+        <p:nvPr/>
+      </p:nvGrpSpPr>
+      <p:grpSpPr>
+        <a:xfrm>
+          <a:off x="0" y="0"/>
+          <a:ext cx="0" cy="0"/>
+          <a:chOff x="0" y="0"/>
+          <a:chExt cx="0" cy="0"/>
+        </a:xfrm>
+      </p:grpSpPr>
+      <p:pic>
+        <p:nvPicPr>
+          <p:cNvPr id="4" name="Immagine 3"/>
+          <p:cNvPicPr>
+            <a:picLocks noChangeAspect="1"/>
+          </p:cNvPicPr>
+          <p:nvPr/>
+        </p:nvPicPr>
+        <p:blipFill>
+          <a:blip r:embed="rId2">
+            <a:alphaModFix amt="9000"/>
+          </a:blip>
+          <a:stretch>
+            <a:fillRect/>
+          </a:stretch>
+        </p:blipFill>
+        <p:spPr>
+          <a:xfrm>
+            <a:off x="-444063" y="2456903"/>
+            <a:ext cx="4716518" cy="4716518"/>
+          </a:xfrm>
+          <a:prstGeom prst="rect">
+            <a:avLst/>
+          </a:prstGeom>
+          <a:effectLst/>
+        </p:spPr>
+      </p:pic>
+      <p:sp>
+        <p:nvSpPr>
+          <p:cNvPr id="5" name="Titolo 1"/>
+          <p:cNvSpPr txBox="1">
+            <a:spLocks/>
+          </p:cNvSpPr>
+          <p:nvPr/>
+        </p:nvSpPr>
+        <p:spPr>
+          <a:xfrm>
+            <a:off x="1524000" y="-484723"/>
+            <a:ext cx="9144000" cy="1991762"/>
+          </a:xfrm>
+          <a:prstGeom prst="rect">
+            <a:avLst/>
+          </a:prstGeom>
+        </p:spPr>
+        <p:txBody>
+          <a:bodyPr vert="horz" lIns="91440" tIns="45720" rIns="91440" bIns="45720" rtlCol="0" anchor="ctr">
+            <a:normAutofit/>
+          </a:bodyPr>
+          <a:lstStyle>
+            <a:lvl1pPr algn="l" defTabSz="914400" rtl="0" eaLnBrk="1" latinLnBrk="0" hangingPunct="1">
+              <a:lnSpc>
+                <a:spcPct val="90000"/>
+              </a:lnSpc>
+              <a:spcBef>
+                <a:spcPct val="0"/>
+              </a:spcBef>
+              <a:buNone/>
+              <a:defRPr sz="4400" kern="1200">
+                <a:solidFill>
+                  <a:schemeClr val="tx1"/>
+                </a:solidFill>
+                <a:latin typeface="+mj-lt"/>
+                <a:ea typeface="+mj-ea"/>
+                <a:cs typeface="+mj-cs"/>
+              </a:defRPr>
+            </a:lvl1pPr>
+          </a:lstStyle>
+          <a:p>
+            <a:pPr algn="ctr"/>
+            <a:r>
+              <a:rPr lang="en-GB" sz="7200" b="1" dirty="0" smtClean="0">
+                <a:ln w="19050">
+                  <a:solidFill>
+                    <a:schemeClr val="tx1"/>
+                  </a:solidFill>
+                </a:ln>
+                <a:gradFill>
+                  <a:gsLst>
+                    <a:gs pos="0">
+                      <a:srgbClr val="A51502"/>
+                    </a:gs>
+                    <a:gs pos="75000">
+                      <a:srgbClr val="FF0000"/>
+                    </a:gs>
+                    <a:gs pos="100000">
+                      <a:srgbClr val="DE918F"/>
+                    </a:gs>
+                  </a:gsLst>
+                  <a:lin ang="5400000"/>
+                </a:gradFill>
+                <a:effectLst>
+                  <a:reflection blurRad="101600" stA="28000" endPos="35500" dist="12700" dir="5400000" sy="-90000" algn="bl" rotWithShape="0"/>
+                </a:effectLst>
+                <a:latin typeface="+mn-lt"/>
+              </a:rPr>
+              <a:t>COCOMO APPROACH</a:t>
+            </a:r>
+          </a:p>
+        </p:txBody>
+      </p:sp>
+      <p:pic>
+        <p:nvPicPr>
+          <p:cNvPr id="8" name="Immagine 7"/>
+          <p:cNvPicPr>
+            <a:picLocks noChangeAspect="1"/>
+          </p:cNvPicPr>
+          <p:nvPr/>
+        </p:nvPicPr>
+        <p:blipFill>
+          <a:blip r:embed="rId3">
+            <a:extLst>
+              <a:ext uri="{28A0092B-C50C-407E-A947-70E740481C1C}">
+                <a14:useLocalDpi xmlns:a14="http://schemas.microsoft.com/office/drawing/2010/main" val="0"/>
+              </a:ext>
+            </a:extLst>
+          </a:blip>
+          <a:stretch>
+            <a:fillRect/>
+          </a:stretch>
+        </p:blipFill>
+        <p:spPr>
+          <a:xfrm>
+            <a:off x="2570217" y="1071176"/>
+            <a:ext cx="7051566" cy="5723323"/>
+          </a:xfrm>
+          <a:prstGeom prst="rect">
+            <a:avLst/>
+          </a:prstGeom>
+        </p:spPr>
+      </p:pic>
+    </p:spTree>
+    <p:extLst>
+      <p:ext uri="{BB962C8B-B14F-4D97-AF65-F5344CB8AC3E}">
+        <p14:creationId xmlns:p14="http://schemas.microsoft.com/office/powerpoint/2010/main" val="610384167"/>
+      </p:ext>
+    </p:extLst>
+  </p:cSld>
+  <p:clrMapOvr>
+    <a:masterClrMapping/>
+  </p:clrMapOvr>
+  <p:timing>
+    <p:tnLst>
+      <p:par>
+        <p:cTn id="1" dur="indefinite" restart="never" nodeType="tmRoot">
+          <p:childTnLst>
+            <p:seq concurrent="1" nextAc="seek">
+              <p:cTn id="2" dur="indefinite" nodeType="mainSeq">
+                <p:childTnLst>
+                  <p:par>
+                    <p:cTn id="3" fill="hold">
+                      <p:stCondLst>
+                        <p:cond delay="indefinite"/>
+                      </p:stCondLst>
+                      <p:childTnLst>
+                        <p:par>
+                          <p:cTn id="4" fill="hold">
+                            <p:stCondLst>
+                              <p:cond delay="0"/>
+                            </p:stCondLst>
+                            <p:childTnLst>
+                              <p:par>
+                                <p:cTn id="5" presetID="53" presetClass="entr" presetSubtype="16" fill="hold" nodeType="clickEffect">
+                                  <p:stCondLst>
+                                    <p:cond delay="0"/>
+                                  </p:stCondLst>
+                                  <p:childTnLst>
+                                    <p:set>
+                                      <p:cBhvr>
+                                        <p:cTn id="6" dur="1" fill="hold">
+                                          <p:stCondLst>
+                                            <p:cond delay="0"/>
+                                          </p:stCondLst>
+                                        </p:cTn>
+                                        <p:tgtEl>
+                                          <p:spTgt spid="8"/>
+                                        </p:tgtEl>
+                                        <p:attrNameLst>
+                                          <p:attrName>style.visibility</p:attrName>
+                                        </p:attrNameLst>
+                                      </p:cBhvr>
+                                      <p:to>
+                                        <p:strVal val="visible"/>
+                                      </p:to>
+                                    </p:set>
+                                    <p:anim calcmode="lin" valueType="num">
+                                      <p:cBhvr>
+                                        <p:cTn id="7" dur="500" fill="hold"/>
+                                        <p:tgtEl>
+                                          <p:spTgt spid="8"/>
+                                        </p:tgtEl>
+                                        <p:attrNameLst>
+                                          <p:attrName>ppt_w</p:attrName>
+                                        </p:attrNameLst>
+                                      </p:cBhvr>
+                                      <p:tavLst>
+                                        <p:tav tm="0">
+                                          <p:val>
+                                            <p:fltVal val="0"/>
+                                          </p:val>
+                                        </p:tav>
+                                        <p:tav tm="100000">
+                                          <p:val>
+                                            <p:strVal val="#ppt_w"/>
+                                          </p:val>
+                                        </p:tav>
+                                      </p:tavLst>
+                                    </p:anim>
+                                    <p:anim calcmode="lin" valueType="num">
+                                      <p:cBhvr>
+                                        <p:cTn id="8" dur="500" fill="hold"/>
+                                        <p:tgtEl>
+                                          <p:spTgt spid="8"/>
+                                        </p:tgtEl>
+                                        <p:attrNameLst>
+                                          <p:attrName>ppt_h</p:attrName>
+                                        </p:attrNameLst>
+                                      </p:cBhvr>
+                                      <p:tavLst>
+                                        <p:tav tm="0">
+                                          <p:val>
+                                            <p:fltVal val="0"/>
+                                          </p:val>
+                                        </p:tav>
+                                        <p:tav tm="100000">
+                                          <p:val>
+                                            <p:strVal val="#ppt_h"/>
+                                          </p:val>
+                                        </p:tav>
+                                      </p:tavLst>
+                                    </p:anim>
+                                    <p:animEffect transition="in" filter="fade">
+                                      <p:cBhvr>
+                                        <p:cTn id="9" dur="500"/>
+                                        <p:tgtEl>
+                                          <p:spTgt spid="8"/>
+                                        </p:tgtEl>
+                                      </p:cBhvr>
+                                    </p:animEffect>
+                                  </p:childTnLst>
+                                </p:cTn>
+                              </p:par>
+                            </p:childTnLst>
+                          </p:cTn>
+                        </p:par>
+                      </p:childTnLst>
+                    </p:cTn>
+                  </p:par>
+                </p:childTnLst>
+              </p:cTn>
+              <p:prevCondLst>
+                <p:cond evt="onPrev" delay="0">
+                  <p:tgtEl>
+                    <p:sldTgt/>
+                  </p:tgtEl>
+                </p:cond>
+              </p:prevCondLst>
+              <p:nextCondLst>
+                <p:cond evt="onNext" delay="0">
+                  <p:tgtEl>
+                    <p:sldTgt/>
+                  </p:tgtEl>
+                </p:cond>
+              </p:nextCondLst>
+            </p:seq>
+          </p:childTnLst>
+        </p:cTn>
+      </p:par>
+    </p:tnLst>
   </p:timing>
 </p:sld>
 </file>

</xml_diff>